<commit_message>
Sarah: Updated plots in presentation and report
</commit_message>
<xml_diff>
--- a/Project3_presentation.pptx
+++ b/Project3_presentation.pptx
@@ -1,11 +1,11 @@
 
 <file path=ppt/presentation.xml><?xml version="1.0" encoding="utf-8"?>
-<p:presentation xmlns:a="http://schemas.openxmlformats.org/drawingml/2006/main" xmlns:r="http://schemas.openxmlformats.org/officeDocument/2006/relationships" xmlns:p="http://schemas.openxmlformats.org/presentationml/2006/main" saveSubsetFonts="1">
+<p:presentation xmlns:a="http://schemas.openxmlformats.org/drawingml/2006/main" xmlns:r="http://schemas.openxmlformats.org/officeDocument/2006/relationships" xmlns:mc="http://schemas.openxmlformats.org/markup-compatibility/2006" xmlns:mv="urn:schemas-microsoft-com:mac:vml" xmlns:p="http://schemas.openxmlformats.org/presentationml/2006/main" mc:Ignorable="mv" mc:PreserveAttributes="mv:*" saveSubsetFonts="1">
   <p:sldMasterIdLst>
     <p:sldMasterId id="2147483660" r:id="rId1"/>
   </p:sldMasterIdLst>
   <p:notesMasterIdLst>
-    <p:notesMasterId r:id="rId12"/>
+    <p:notesMasterId r:id="rId14"/>
   </p:notesMasterIdLst>
   <p:sldIdLst>
     <p:sldId id="257" r:id="rId2"/>
@@ -15,9 +15,11 @@
     <p:sldId id="268" r:id="rId6"/>
     <p:sldId id="269" r:id="rId7"/>
     <p:sldId id="270" r:id="rId8"/>
-    <p:sldId id="271" r:id="rId9"/>
-    <p:sldId id="272" r:id="rId10"/>
-    <p:sldId id="265" r:id="rId11"/>
+    <p:sldId id="274" r:id="rId9"/>
+    <p:sldId id="273" r:id="rId10"/>
+    <p:sldId id="271" r:id="rId11"/>
+    <p:sldId id="272" r:id="rId12"/>
+    <p:sldId id="265" r:id="rId13"/>
   </p:sldIdLst>
   <p:sldSz cx="9144000" cy="6858000" type="screen4x3"/>
   <p:notesSz cx="6858000" cy="9144000"/>
@@ -120,7 +122,7 @@
 </file>
 
 <file path=ppt/notesMasters/notesMaster1.xml><?xml version="1.0" encoding="utf-8"?>
-<p:notesMaster xmlns:a="http://schemas.openxmlformats.org/drawingml/2006/main" xmlns:r="http://schemas.openxmlformats.org/officeDocument/2006/relationships" xmlns:p="http://schemas.openxmlformats.org/presentationml/2006/main">
+<p:notesMaster xmlns:a="http://schemas.openxmlformats.org/drawingml/2006/main" xmlns:r="http://schemas.openxmlformats.org/officeDocument/2006/relationships" xmlns:mc="http://schemas.openxmlformats.org/markup-compatibility/2006" xmlns:mv="urn:schemas-microsoft-com:mac:vml" xmlns:p="http://schemas.openxmlformats.org/presentationml/2006/main" mc:Ignorable="mv" mc:PreserveAttributes="mv:*">
   <p:cSld>
     <p:bg>
       <p:bgRef idx="1001">
@@ -201,7 +203,8 @@
           <a:p>
             <a:fld id="{75E2F141-3BF4-41B4-8A22-B2C832AFABE3}" type="datetimeFigureOut">
               <a:rPr lang="en-US" smtClean="0"/>
-              <a:t>5/29/2014</a:t>
+              <a:pPr/>
+              <a:t>5/31/14</a:t>
             </a:fld>
             <a:endParaRPr lang="en-US"/>
           </a:p>
@@ -360,6 +363,7 @@
           <a:p>
             <a:fld id="{455CFC28-9D59-4D12-B647-75BCBE6E8E28}" type="slidenum">
               <a:rPr lang="en-US" smtClean="0"/>
+              <a:pPr/>
               <a:t>‹#›</a:t>
             </a:fld>
             <a:endParaRPr lang="en-US"/>
@@ -369,7 +373,7 @@
     </p:spTree>
     <p:extLst>
       <p:ext uri="{BB962C8B-B14F-4D97-AF65-F5344CB8AC3E}">
-        <p14:creationId xmlns:p14="http://schemas.microsoft.com/office/powerpoint/2010/main" val="387075886"/>
+        <p14:creationId xmlns:p14="http://schemas.microsoft.com/office/powerpoint/2010/main" xmlns:p="http://schemas.openxmlformats.org/presentationml/2006/main" xmlns:r="http://schemas.openxmlformats.org/officeDocument/2006/relationships" xmlns:a="http://schemas.openxmlformats.org/drawingml/2006/main" xmlns="" val="387075886"/>
       </p:ext>
     </p:extLst>
   </p:cSld>
@@ -470,7 +474,7 @@
 </file>
 
 <file path=ppt/notesSlides/notesSlide1.xml><?xml version="1.0" encoding="utf-8"?>
-<p:notes xmlns:a="http://schemas.openxmlformats.org/drawingml/2006/main" xmlns:r="http://schemas.openxmlformats.org/officeDocument/2006/relationships" xmlns:p="http://schemas.openxmlformats.org/presentationml/2006/main">
+<p:notes xmlns:a="http://schemas.openxmlformats.org/drawingml/2006/main" xmlns:r="http://schemas.openxmlformats.org/officeDocument/2006/relationships" xmlns:mc="http://schemas.openxmlformats.org/markup-compatibility/2006" xmlns:mv="urn:schemas-microsoft-com:mac:vml" xmlns:p="http://schemas.openxmlformats.org/presentationml/2006/main" mc:Ignorable="mv" mc:PreserveAttributes="mv:*">
   <p:cSld>
     <p:spTree>
       <p:nvGrpSpPr>
@@ -557,7 +561,7 @@
     </p:spTree>
     <p:extLst>
       <p:ext uri="{BB962C8B-B14F-4D97-AF65-F5344CB8AC3E}">
-        <p14:creationId xmlns:p14="http://schemas.microsoft.com/office/powerpoint/2010/main" val="3839019637"/>
+        <p14:creationId xmlns:p14="http://schemas.microsoft.com/office/powerpoint/2010/main" xmlns:p="http://schemas.openxmlformats.org/presentationml/2006/main" xmlns:r="http://schemas.openxmlformats.org/officeDocument/2006/relationships" xmlns:a="http://schemas.openxmlformats.org/drawingml/2006/main" xmlns="" val="3839019637"/>
       </p:ext>
     </p:extLst>
   </p:cSld>
@@ -568,7 +572,7 @@
 </file>
 
 <file path=ppt/notesSlides/notesSlide2.xml><?xml version="1.0" encoding="utf-8"?>
-<p:notes xmlns:a="http://schemas.openxmlformats.org/drawingml/2006/main" xmlns:r="http://schemas.openxmlformats.org/officeDocument/2006/relationships" xmlns:p="http://schemas.openxmlformats.org/presentationml/2006/main">
+<p:notes xmlns:a="http://schemas.openxmlformats.org/drawingml/2006/main" xmlns:r="http://schemas.openxmlformats.org/officeDocument/2006/relationships" xmlns:mc="http://schemas.openxmlformats.org/markup-compatibility/2006" xmlns:mv="urn:schemas-microsoft-com:mac:vml" xmlns:p="http://schemas.openxmlformats.org/presentationml/2006/main" mc:Ignorable="mv" mc:PreserveAttributes="mv:*">
   <p:cSld>
     <p:spTree>
       <p:nvGrpSpPr>
@@ -653,7 +657,7 @@
     </p:spTree>
     <p:extLst>
       <p:ext uri="{BB962C8B-B14F-4D97-AF65-F5344CB8AC3E}">
-        <p14:creationId xmlns:p14="http://schemas.microsoft.com/office/powerpoint/2010/main" val="847528997"/>
+        <p14:creationId xmlns:p14="http://schemas.microsoft.com/office/powerpoint/2010/main" xmlns:p="http://schemas.openxmlformats.org/presentationml/2006/main" xmlns:r="http://schemas.openxmlformats.org/officeDocument/2006/relationships" xmlns:a="http://schemas.openxmlformats.org/drawingml/2006/main" xmlns="" val="847528997"/>
       </p:ext>
     </p:extLst>
   </p:cSld>
@@ -664,7 +668,7 @@
 </file>
 
 <file path=ppt/notesSlides/notesSlide3.xml><?xml version="1.0" encoding="utf-8"?>
-<p:notes xmlns:a="http://schemas.openxmlformats.org/drawingml/2006/main" xmlns:r="http://schemas.openxmlformats.org/officeDocument/2006/relationships" xmlns:p="http://schemas.openxmlformats.org/presentationml/2006/main">
+<p:notes xmlns:a="http://schemas.openxmlformats.org/drawingml/2006/main" xmlns:r="http://schemas.openxmlformats.org/officeDocument/2006/relationships" xmlns:mc="http://schemas.openxmlformats.org/markup-compatibility/2006" xmlns:mv="urn:schemas-microsoft-com:mac:vml" xmlns:p="http://schemas.openxmlformats.org/presentationml/2006/main" mc:Ignorable="mv" mc:PreserveAttributes="mv:*">
   <p:cSld>
     <p:spTree>
       <p:nvGrpSpPr>
@@ -771,6 +775,7 @@
           <a:p>
             <a:fld id="{DB34B17C-0F30-4E49-87BD-B713E7BA160F}" type="slidenum">
               <a:rPr lang="en-US" smtClean="0"/>
+              <a:pPr/>
               <a:t>3</a:t>
             </a:fld>
             <a:endParaRPr lang="en-US"/>
@@ -780,7 +785,7 @@
     </p:spTree>
     <p:extLst>
       <p:ext uri="{BB962C8B-B14F-4D97-AF65-F5344CB8AC3E}">
-        <p14:creationId xmlns:p14="http://schemas.microsoft.com/office/powerpoint/2010/main" val="1542757321"/>
+        <p14:creationId xmlns:p14="http://schemas.microsoft.com/office/powerpoint/2010/main" xmlns:p="http://schemas.openxmlformats.org/presentationml/2006/main" xmlns:r="http://schemas.openxmlformats.org/officeDocument/2006/relationships" xmlns:a="http://schemas.openxmlformats.org/drawingml/2006/main" xmlns="" val="1542757321"/>
       </p:ext>
     </p:extLst>
   </p:cSld>
@@ -791,7 +796,7 @@
 </file>
 
 <file path=ppt/notesSlides/notesSlide4.xml><?xml version="1.0" encoding="utf-8"?>
-<p:notes xmlns:a="http://schemas.openxmlformats.org/drawingml/2006/main" xmlns:r="http://schemas.openxmlformats.org/officeDocument/2006/relationships" xmlns:p="http://schemas.openxmlformats.org/presentationml/2006/main">
+<p:notes xmlns:a="http://schemas.openxmlformats.org/drawingml/2006/main" xmlns:r="http://schemas.openxmlformats.org/officeDocument/2006/relationships" xmlns:mc="http://schemas.openxmlformats.org/markup-compatibility/2006" xmlns:mv="urn:schemas-microsoft-com:mac:vml" xmlns:p="http://schemas.openxmlformats.org/presentationml/2006/main" mc:Ignorable="mv" mc:PreserveAttributes="mv:*">
   <p:cSld>
     <p:spTree>
       <p:nvGrpSpPr>
@@ -831,9 +836,101 @@
         </p:nvSpPr>
         <p:spPr/>
         <p:txBody>
-          <a:bodyPr/>
+          <a:bodyPr>
+            <a:normAutofit/>
+          </a:bodyPr>
           <a:lstStyle/>
           <a:p>
+            <a:r>
+              <a:rPr lang="en-US" sz="1500" baseline="0" dirty="0" smtClean="0"/>
+              <a:t>Original distribution of songs in dataset</a:t>
+            </a:r>
+            <a:endParaRPr lang="en-US" sz="1500" baseline="0" dirty="0"/>
+          </a:p>
+        </p:txBody>
+      </p:sp>
+      <p:sp>
+        <p:nvSpPr>
+          <p:cNvPr id="4" name="Slide Number Placeholder 3"/>
+          <p:cNvSpPr>
+            <a:spLocks noGrp="1"/>
+          </p:cNvSpPr>
+          <p:nvPr>
+            <p:ph type="sldNum" sz="quarter" idx="10"/>
+          </p:nvPr>
+        </p:nvSpPr>
+        <p:spPr/>
+        <p:txBody>
+          <a:bodyPr/>
+          <a:lstStyle/>
+          <a:p>
+            <a:fld id="{455CFC28-9D59-4D12-B647-75BCBE6E8E28}" type="slidenum">
+              <a:rPr lang="en-US" smtClean="0"/>
+              <a:pPr/>
+              <a:t>7</a:t>
+            </a:fld>
+            <a:endParaRPr lang="en-US"/>
+          </a:p>
+        </p:txBody>
+      </p:sp>
+    </p:spTree>
+  </p:cSld>
+  <p:clrMapOvr>
+    <a:masterClrMapping/>
+  </p:clrMapOvr>
+</p:notes>
+</file>
+
+<file path=ppt/notesSlides/notesSlide5.xml><?xml version="1.0" encoding="utf-8"?>
+<p:notes xmlns:a="http://schemas.openxmlformats.org/drawingml/2006/main" xmlns:r="http://schemas.openxmlformats.org/officeDocument/2006/relationships" xmlns:mc="http://schemas.openxmlformats.org/markup-compatibility/2006" xmlns:mv="urn:schemas-microsoft-com:mac:vml" xmlns:p="http://schemas.openxmlformats.org/presentationml/2006/main" mc:Ignorable="mv" mc:PreserveAttributes="mv:*">
+  <p:cSld>
+    <p:spTree>
+      <p:nvGrpSpPr>
+        <p:cNvPr id="1" name=""/>
+        <p:cNvGrpSpPr/>
+        <p:nvPr/>
+      </p:nvGrpSpPr>
+      <p:grpSpPr>
+        <a:xfrm>
+          <a:off x="0" y="0"/>
+          <a:ext cx="0" cy="0"/>
+          <a:chOff x="0" y="0"/>
+          <a:chExt cx="0" cy="0"/>
+        </a:xfrm>
+      </p:grpSpPr>
+      <p:sp>
+        <p:nvSpPr>
+          <p:cNvPr id="2" name="Slide Image Placeholder 1"/>
+          <p:cNvSpPr>
+            <a:spLocks noGrp="1" noRot="1" noChangeAspect="1"/>
+          </p:cNvSpPr>
+          <p:nvPr>
+            <p:ph type="sldImg"/>
+          </p:nvPr>
+        </p:nvSpPr>
+        <p:spPr/>
+      </p:sp>
+      <p:sp>
+        <p:nvSpPr>
+          <p:cNvPr id="3" name="Notes Placeholder 2"/>
+          <p:cNvSpPr>
+            <a:spLocks noGrp="1"/>
+          </p:cNvSpPr>
+          <p:nvPr>
+            <p:ph type="body" idx="1"/>
+          </p:nvPr>
+        </p:nvSpPr>
+        <p:spPr/>
+        <p:txBody>
+          <a:bodyPr>
+            <a:normAutofit/>
+          </a:bodyPr>
+          <a:lstStyle/>
+          <a:p>
+            <a:r>
+              <a:rPr lang="en-US" dirty="0" smtClean="0"/>
+              <a:t>Predicted years for songs</a:t>
+            </a:r>
             <a:endParaRPr lang="en-US" dirty="0"/>
           </a:p>
         </p:txBody>
@@ -853,9 +950,172 @@
           <a:bodyPr/>
           <a:lstStyle/>
           <a:p>
+            <a:fld id="{455CFC28-9D59-4D12-B647-75BCBE6E8E28}" type="slidenum">
+              <a:rPr lang="en-US" smtClean="0"/>
+              <a:pPr/>
+              <a:t>8</a:t>
+            </a:fld>
+            <a:endParaRPr lang="en-US"/>
+          </a:p>
+        </p:txBody>
+      </p:sp>
+    </p:spTree>
+  </p:cSld>
+  <p:clrMapOvr>
+    <a:masterClrMapping/>
+  </p:clrMapOvr>
+</p:notes>
+</file>
+
+<file path=ppt/notesSlides/notesSlide6.xml><?xml version="1.0" encoding="utf-8"?>
+<p:notes xmlns:a="http://schemas.openxmlformats.org/drawingml/2006/main" xmlns:r="http://schemas.openxmlformats.org/officeDocument/2006/relationships" xmlns:mc="http://schemas.openxmlformats.org/markup-compatibility/2006" xmlns:mv="urn:schemas-microsoft-com:mac:vml" xmlns:p="http://schemas.openxmlformats.org/presentationml/2006/main" mc:Ignorable="mv" mc:PreserveAttributes="mv:*">
+  <p:cSld>
+    <p:spTree>
+      <p:nvGrpSpPr>
+        <p:cNvPr id="1" name=""/>
+        <p:cNvGrpSpPr/>
+        <p:nvPr/>
+      </p:nvGrpSpPr>
+      <p:grpSpPr>
+        <a:xfrm>
+          <a:off x="0" y="0"/>
+          <a:ext cx="0" cy="0"/>
+          <a:chOff x="0" y="0"/>
+          <a:chExt cx="0" cy="0"/>
+        </a:xfrm>
+      </p:grpSpPr>
+      <p:sp>
+        <p:nvSpPr>
+          <p:cNvPr id="2" name="Slide Image Placeholder 1"/>
+          <p:cNvSpPr>
+            <a:spLocks noGrp="1" noRot="1" noChangeAspect="1"/>
+          </p:cNvSpPr>
+          <p:nvPr>
+            <p:ph type="sldImg"/>
+          </p:nvPr>
+        </p:nvSpPr>
+        <p:spPr/>
+      </p:sp>
+      <p:sp>
+        <p:nvSpPr>
+          <p:cNvPr id="3" name="Notes Placeholder 2"/>
+          <p:cNvSpPr>
+            <a:spLocks noGrp="1"/>
+          </p:cNvSpPr>
+          <p:nvPr>
+            <p:ph type="body" idx="1"/>
+          </p:nvPr>
+        </p:nvSpPr>
+        <p:spPr/>
+        <p:txBody>
+          <a:bodyPr>
+            <a:normAutofit/>
+          </a:bodyPr>
+          <a:lstStyle/>
+          <a:p>
+            <a:endParaRPr lang="en-US" dirty="0"/>
+          </a:p>
+        </p:txBody>
+      </p:sp>
+      <p:sp>
+        <p:nvSpPr>
+          <p:cNvPr id="4" name="Slide Number Placeholder 3"/>
+          <p:cNvSpPr>
+            <a:spLocks noGrp="1"/>
+          </p:cNvSpPr>
+          <p:nvPr>
+            <p:ph type="sldNum" sz="quarter" idx="10"/>
+          </p:nvPr>
+        </p:nvSpPr>
+        <p:spPr/>
+        <p:txBody>
+          <a:bodyPr/>
+          <a:lstStyle/>
+          <a:p>
+            <a:fld id="{455CFC28-9D59-4D12-B647-75BCBE6E8E28}" type="slidenum">
+              <a:rPr lang="en-US" smtClean="0"/>
+              <a:pPr/>
+              <a:t>9</a:t>
+            </a:fld>
+            <a:endParaRPr lang="en-US"/>
+          </a:p>
+        </p:txBody>
+      </p:sp>
+    </p:spTree>
+  </p:cSld>
+  <p:clrMapOvr>
+    <a:masterClrMapping/>
+  </p:clrMapOvr>
+</p:notes>
+</file>
+
+<file path=ppt/notesSlides/notesSlide7.xml><?xml version="1.0" encoding="utf-8"?>
+<p:notes xmlns:a="http://schemas.openxmlformats.org/drawingml/2006/main" xmlns:r="http://schemas.openxmlformats.org/officeDocument/2006/relationships" xmlns:mc="http://schemas.openxmlformats.org/markup-compatibility/2006" xmlns:mv="urn:schemas-microsoft-com:mac:vml" xmlns:p="http://schemas.openxmlformats.org/presentationml/2006/main" mc:Ignorable="mv" mc:PreserveAttributes="mv:*">
+  <p:cSld>
+    <p:spTree>
+      <p:nvGrpSpPr>
+        <p:cNvPr id="1" name=""/>
+        <p:cNvGrpSpPr/>
+        <p:nvPr/>
+      </p:nvGrpSpPr>
+      <p:grpSpPr>
+        <a:xfrm>
+          <a:off x="0" y="0"/>
+          <a:ext cx="0" cy="0"/>
+          <a:chOff x="0" y="0"/>
+          <a:chExt cx="0" cy="0"/>
+        </a:xfrm>
+      </p:grpSpPr>
+      <p:sp>
+        <p:nvSpPr>
+          <p:cNvPr id="2" name="Slide Image Placeholder 1"/>
+          <p:cNvSpPr>
+            <a:spLocks noGrp="1" noRot="1" noChangeAspect="1"/>
+          </p:cNvSpPr>
+          <p:nvPr>
+            <p:ph type="sldImg"/>
+          </p:nvPr>
+        </p:nvSpPr>
+        <p:spPr/>
+      </p:sp>
+      <p:sp>
+        <p:nvSpPr>
+          <p:cNvPr id="3" name="Notes Placeholder 2"/>
+          <p:cNvSpPr>
+            <a:spLocks noGrp="1"/>
+          </p:cNvSpPr>
+          <p:nvPr>
+            <p:ph type="body" idx="1"/>
+          </p:nvPr>
+        </p:nvSpPr>
+        <p:spPr/>
+        <p:txBody>
+          <a:bodyPr/>
+          <a:lstStyle/>
+          <a:p>
+            <a:endParaRPr lang="en-US" dirty="0"/>
+          </a:p>
+        </p:txBody>
+      </p:sp>
+      <p:sp>
+        <p:nvSpPr>
+          <p:cNvPr id="4" name="Slide Number Placeholder 3"/>
+          <p:cNvSpPr>
+            <a:spLocks noGrp="1"/>
+          </p:cNvSpPr>
+          <p:nvPr>
+            <p:ph type="sldNum" sz="quarter" idx="10"/>
+          </p:nvPr>
+        </p:nvSpPr>
+        <p:spPr/>
+        <p:txBody>
+          <a:bodyPr/>
+          <a:lstStyle/>
+          <a:p>
             <a:fld id="{DB34B17C-0F30-4E49-87BD-B713E7BA160F}" type="slidenum">
               <a:rPr lang="en-US" smtClean="0"/>
-              <a:t>10</a:t>
+              <a:pPr/>
+              <a:t>12</a:t>
             </a:fld>
             <a:endParaRPr lang="en-US"/>
           </a:p>
@@ -864,7 +1124,7 @@
     </p:spTree>
     <p:extLst>
       <p:ext uri="{BB962C8B-B14F-4D97-AF65-F5344CB8AC3E}">
-        <p14:creationId xmlns:p14="http://schemas.microsoft.com/office/powerpoint/2010/main" val="3886919401"/>
+        <p14:creationId xmlns:p14="http://schemas.microsoft.com/office/powerpoint/2010/main" xmlns:p="http://schemas.openxmlformats.org/presentationml/2006/main" xmlns:r="http://schemas.openxmlformats.org/officeDocument/2006/relationships" xmlns:a="http://schemas.openxmlformats.org/drawingml/2006/main" xmlns="" val="3886919401"/>
       </p:ext>
     </p:extLst>
   </p:cSld>
@@ -875,7 +1135,7 @@
 </file>
 
 <file path=ppt/slideLayouts/slideLayout1.xml><?xml version="1.0" encoding="utf-8"?>
-<p:sldLayout xmlns:a="http://schemas.openxmlformats.org/drawingml/2006/main" xmlns:r="http://schemas.openxmlformats.org/officeDocument/2006/relationships" xmlns:p="http://schemas.openxmlformats.org/presentationml/2006/main" type="title" preserve="1">
+<p:sldLayout xmlns:a="http://schemas.openxmlformats.org/drawingml/2006/main" xmlns:r="http://schemas.openxmlformats.org/officeDocument/2006/relationships" xmlns:mc="http://schemas.openxmlformats.org/markup-compatibility/2006" xmlns:mv="urn:schemas-microsoft-com:mac:vml" xmlns:p="http://schemas.openxmlformats.org/presentationml/2006/main" mc:Ignorable="mv" mc:PreserveAttributes="mv:*" type="title" preserve="1">
   <p:cSld name="Title Slide Option 1">
     <p:spTree>
       <p:nvGrpSpPr>
@@ -915,7 +1175,7 @@
           </a:ln>
           <a:extLst>
             <a:ext uri="{91240B29-F687-4F45-9708-019B960494DF}">
-              <a14:hiddenLine xmlns:a14="http://schemas.microsoft.com/office/drawing/2010/main" w="9525">
+              <a14:hiddenLine xmlns:a14="http://schemas.microsoft.com/office/drawing/2010/main" xmlns:p="http://schemas.openxmlformats.org/presentationml/2006/main" xmlns:r="http://schemas.openxmlformats.org/officeDocument/2006/relationships" xmlns:a="http://schemas.openxmlformats.org/drawingml/2006/main" xmlns="" w="9525">
                 <a:solidFill>
                   <a:srgbClr val="000000"/>
                 </a:solidFill>
@@ -971,7 +1231,7 @@
           </a:ln>
           <a:extLst>
             <a:ext uri="{91240B29-F687-4F45-9708-019B960494DF}">
-              <a14:hiddenLine xmlns:a14="http://schemas.microsoft.com/office/drawing/2010/main" w="9525">
+              <a14:hiddenLine xmlns:a14="http://schemas.microsoft.com/office/drawing/2010/main" xmlns:p="http://schemas.openxmlformats.org/presentationml/2006/main" xmlns:r="http://schemas.openxmlformats.org/officeDocument/2006/relationships" xmlns:a="http://schemas.openxmlformats.org/drawingml/2006/main" xmlns="" w="9525">
                 <a:solidFill>
                   <a:srgbClr val="000000"/>
                 </a:solidFill>
@@ -1015,7 +1275,7 @@
           <a:blip r:embed="rId2">
             <a:extLst>
               <a:ext uri="{28A0092B-C50C-407E-A947-70E740481C1C}">
-                <a14:useLocalDpi xmlns:a14="http://schemas.microsoft.com/office/drawing/2010/main" val="0"/>
+                <a14:useLocalDpi xmlns:a14="http://schemas.microsoft.com/office/drawing/2010/main" xmlns:p="http://schemas.openxmlformats.org/presentationml/2006/main" xmlns:r="http://schemas.openxmlformats.org/officeDocument/2006/relationships" xmlns:a="http://schemas.openxmlformats.org/drawingml/2006/main" xmlns="" val="0"/>
               </a:ext>
             </a:extLst>
           </a:blip>
@@ -1038,14 +1298,14 @@
           </a:ln>
           <a:extLst>
             <a:ext uri="{909E8E84-426E-40DD-AFC4-6F175D3DCCD1}">
-              <a14:hiddenFill xmlns:a14="http://schemas.microsoft.com/office/drawing/2010/main">
+              <a14:hiddenFill xmlns:a14="http://schemas.microsoft.com/office/drawing/2010/main" xmlns:p="http://schemas.openxmlformats.org/presentationml/2006/main" xmlns:r="http://schemas.openxmlformats.org/officeDocument/2006/relationships" xmlns:a="http://schemas.openxmlformats.org/drawingml/2006/main" xmlns="">
                 <a:solidFill>
                   <a:srgbClr val="FFFFFF"/>
                 </a:solidFill>
               </a14:hiddenFill>
             </a:ext>
             <a:ext uri="{91240B29-F687-4F45-9708-019B960494DF}">
-              <a14:hiddenLine xmlns:a14="http://schemas.microsoft.com/office/drawing/2010/main" w="9525">
+              <a14:hiddenLine xmlns:a14="http://schemas.microsoft.com/office/drawing/2010/main" xmlns:p="http://schemas.openxmlformats.org/presentationml/2006/main" xmlns:r="http://schemas.openxmlformats.org/officeDocument/2006/relationships" xmlns:a="http://schemas.openxmlformats.org/drawingml/2006/main" xmlns="" w="9525">
                 <a:solidFill>
                   <a:srgbClr val="000000"/>
                 </a:solidFill>
@@ -1135,7 +1395,7 @@
     </p:spTree>
     <p:extLst>
       <p:ext uri="{BB962C8B-B14F-4D97-AF65-F5344CB8AC3E}">
-        <p14:creationId xmlns:p14="http://schemas.microsoft.com/office/powerpoint/2010/main" val="3300341227"/>
+        <p14:creationId xmlns:p14="http://schemas.microsoft.com/office/powerpoint/2010/main" xmlns:p="http://schemas.openxmlformats.org/presentationml/2006/main" xmlns:r="http://schemas.openxmlformats.org/officeDocument/2006/relationships" xmlns:a="http://schemas.openxmlformats.org/drawingml/2006/main" xmlns="" val="3300341227"/>
       </p:ext>
     </p:extLst>
   </p:cSld>
@@ -1149,7 +1409,7 @@
 </file>
 
 <file path=ppt/slideLayouts/slideLayout10.xml><?xml version="1.0" encoding="utf-8"?>
-<p:sldLayout xmlns:a="http://schemas.openxmlformats.org/drawingml/2006/main" xmlns:r="http://schemas.openxmlformats.org/officeDocument/2006/relationships" xmlns:p="http://schemas.openxmlformats.org/presentationml/2006/main" preserve="1" userDrawn="1">
+<p:sldLayout xmlns:a="http://schemas.openxmlformats.org/drawingml/2006/main" xmlns:r="http://schemas.openxmlformats.org/officeDocument/2006/relationships" xmlns:mc="http://schemas.openxmlformats.org/markup-compatibility/2006" xmlns:mv="urn:schemas-microsoft-com:mac:vml" xmlns:p="http://schemas.openxmlformats.org/presentationml/2006/main" mc:Ignorable="mv" mc:PreserveAttributes="mv:*" preserve="1" userDrawn="1">
   <p:cSld name="1 column w/number">
     <p:spTree>
       <p:nvGrpSpPr>
@@ -1330,7 +1590,7 @@
               <a:pPr>
                 <a:defRPr/>
               </a:pPr>
-              <a:t>May 29, 2014</a:t>
+              <a:t>May 31, 2014</a:t>
             </a:fld>
             <a:endParaRPr lang="en-US"/>
           </a:p>
@@ -1398,7 +1658,7 @@
     </p:spTree>
     <p:extLst>
       <p:ext uri="{BB962C8B-B14F-4D97-AF65-F5344CB8AC3E}">
-        <p14:creationId xmlns:p14="http://schemas.microsoft.com/office/powerpoint/2010/main" val="4144772904"/>
+        <p14:creationId xmlns:p14="http://schemas.microsoft.com/office/powerpoint/2010/main" xmlns:p="http://schemas.openxmlformats.org/presentationml/2006/main" xmlns:r="http://schemas.openxmlformats.org/officeDocument/2006/relationships" xmlns:a="http://schemas.openxmlformats.org/drawingml/2006/main" xmlns="" val="4144772904"/>
       </p:ext>
     </p:extLst>
   </p:cSld>
@@ -1412,7 +1672,7 @@
 </file>
 
 <file path=ppt/slideLayouts/slideLayout11.xml><?xml version="1.0" encoding="utf-8"?>
-<p:sldLayout xmlns:a="http://schemas.openxmlformats.org/drawingml/2006/main" xmlns:r="http://schemas.openxmlformats.org/officeDocument/2006/relationships" xmlns:p="http://schemas.openxmlformats.org/presentationml/2006/main" preserve="1" userDrawn="1">
+<p:sldLayout xmlns:a="http://schemas.openxmlformats.org/drawingml/2006/main" xmlns:r="http://schemas.openxmlformats.org/officeDocument/2006/relationships" xmlns:mc="http://schemas.openxmlformats.org/markup-compatibility/2006" xmlns:mv="urn:schemas-microsoft-com:mac:vml" xmlns:p="http://schemas.openxmlformats.org/presentationml/2006/main" mc:Ignorable="mv" mc:PreserveAttributes="mv:*" preserve="1" userDrawn="1">
   <p:cSld name="1 column no bullets and thumbnail">
     <p:spTree>
       <p:nvGrpSpPr>
@@ -1628,7 +1888,7 @@
               <a:pPr>
                 <a:defRPr/>
               </a:pPr>
-              <a:t>May 29, 2014</a:t>
+              <a:t>May 31, 2014</a:t>
             </a:fld>
             <a:endParaRPr lang="en-US"/>
           </a:p>
@@ -1696,7 +1956,7 @@
     </p:spTree>
     <p:extLst>
       <p:ext uri="{BB962C8B-B14F-4D97-AF65-F5344CB8AC3E}">
-        <p14:creationId xmlns:p14="http://schemas.microsoft.com/office/powerpoint/2010/main" val="403905213"/>
+        <p14:creationId xmlns:p14="http://schemas.microsoft.com/office/powerpoint/2010/main" xmlns:p="http://schemas.openxmlformats.org/presentationml/2006/main" xmlns:r="http://schemas.openxmlformats.org/officeDocument/2006/relationships" xmlns:a="http://schemas.openxmlformats.org/drawingml/2006/main" xmlns="" val="403905213"/>
       </p:ext>
     </p:extLst>
   </p:cSld>
@@ -1710,7 +1970,7 @@
 </file>
 
 <file path=ppt/slideLayouts/slideLayout12.xml><?xml version="1.0" encoding="utf-8"?>
-<p:sldLayout xmlns:a="http://schemas.openxmlformats.org/drawingml/2006/main" xmlns:r="http://schemas.openxmlformats.org/officeDocument/2006/relationships" xmlns:p="http://schemas.openxmlformats.org/presentationml/2006/main" preserve="1" userDrawn="1">
+<p:sldLayout xmlns:a="http://schemas.openxmlformats.org/drawingml/2006/main" xmlns:r="http://schemas.openxmlformats.org/officeDocument/2006/relationships" xmlns:mc="http://schemas.openxmlformats.org/markup-compatibility/2006" xmlns:mv="urn:schemas-microsoft-com:mac:vml" xmlns:p="http://schemas.openxmlformats.org/presentationml/2006/main" mc:Ignorable="mv" mc:PreserveAttributes="mv:*" preserve="1" userDrawn="1">
   <p:cSld name="1 column w/number and thumbnail">
     <p:spTree>
       <p:nvGrpSpPr>
@@ -1922,7 +2182,7 @@
               <a:pPr>
                 <a:defRPr/>
               </a:pPr>
-              <a:t>May 29, 2014</a:t>
+              <a:t>May 31, 2014</a:t>
             </a:fld>
             <a:endParaRPr lang="en-US"/>
           </a:p>
@@ -1990,7 +2250,7 @@
     </p:spTree>
     <p:extLst>
       <p:ext uri="{BB962C8B-B14F-4D97-AF65-F5344CB8AC3E}">
-        <p14:creationId xmlns:p14="http://schemas.microsoft.com/office/powerpoint/2010/main" val="2925629604"/>
+        <p14:creationId xmlns:p14="http://schemas.microsoft.com/office/powerpoint/2010/main" xmlns:p="http://schemas.openxmlformats.org/presentationml/2006/main" xmlns:r="http://schemas.openxmlformats.org/officeDocument/2006/relationships" xmlns:a="http://schemas.openxmlformats.org/drawingml/2006/main" xmlns="" val="2925629604"/>
       </p:ext>
     </p:extLst>
   </p:cSld>
@@ -2004,7 +2264,7 @@
 </file>
 
 <file path=ppt/slideLayouts/slideLayout13.xml><?xml version="1.0" encoding="utf-8"?>
-<p:sldLayout xmlns:a="http://schemas.openxmlformats.org/drawingml/2006/main" xmlns:r="http://schemas.openxmlformats.org/officeDocument/2006/relationships" xmlns:p="http://schemas.openxmlformats.org/presentationml/2006/main" preserve="1" userDrawn="1">
+<p:sldLayout xmlns:a="http://schemas.openxmlformats.org/drawingml/2006/main" xmlns:r="http://schemas.openxmlformats.org/officeDocument/2006/relationships" xmlns:mc="http://schemas.openxmlformats.org/markup-compatibility/2006" xmlns:mv="urn:schemas-microsoft-com:mac:vml" xmlns:p="http://schemas.openxmlformats.org/presentationml/2006/main" mc:Ignorable="mv" mc:PreserveAttributes="mv:*" preserve="1" userDrawn="1">
   <p:cSld name="2 column w/bullets">
     <p:spTree>
       <p:nvGrpSpPr>
@@ -2241,7 +2501,7 @@
               <a:pPr>
                 <a:defRPr/>
               </a:pPr>
-              <a:t>May 29, 2014</a:t>
+              <a:t>May 31, 2014</a:t>
             </a:fld>
             <a:endParaRPr lang="en-US"/>
           </a:p>
@@ -2309,7 +2569,7 @@
     </p:spTree>
     <p:extLst>
       <p:ext uri="{BB962C8B-B14F-4D97-AF65-F5344CB8AC3E}">
-        <p14:creationId xmlns:p14="http://schemas.microsoft.com/office/powerpoint/2010/main" val="431892090"/>
+        <p14:creationId xmlns:p14="http://schemas.microsoft.com/office/powerpoint/2010/main" xmlns:p="http://schemas.openxmlformats.org/presentationml/2006/main" xmlns:r="http://schemas.openxmlformats.org/officeDocument/2006/relationships" xmlns:a="http://schemas.openxmlformats.org/drawingml/2006/main" xmlns="" val="431892090"/>
       </p:ext>
     </p:extLst>
   </p:cSld>
@@ -2323,7 +2583,7 @@
 </file>
 
 <file path=ppt/slideLayouts/slideLayout14.xml><?xml version="1.0" encoding="utf-8"?>
-<p:sldLayout xmlns:a="http://schemas.openxmlformats.org/drawingml/2006/main" xmlns:r="http://schemas.openxmlformats.org/officeDocument/2006/relationships" xmlns:p="http://schemas.openxmlformats.org/presentationml/2006/main" preserve="1" userDrawn="1">
+<p:sldLayout xmlns:a="http://schemas.openxmlformats.org/drawingml/2006/main" xmlns:r="http://schemas.openxmlformats.org/officeDocument/2006/relationships" xmlns:mc="http://schemas.openxmlformats.org/markup-compatibility/2006" xmlns:mv="urn:schemas-microsoft-com:mac:vml" xmlns:p="http://schemas.openxmlformats.org/presentationml/2006/main" mc:Ignorable="mv" mc:PreserveAttributes="mv:*" preserve="1" userDrawn="1">
   <p:cSld name="2 column no bullets">
     <p:spTree>
       <p:nvGrpSpPr>
@@ -2560,7 +2820,7 @@
               <a:pPr>
                 <a:defRPr/>
               </a:pPr>
-              <a:t>May 29, 2014</a:t>
+              <a:t>May 31, 2014</a:t>
             </a:fld>
             <a:endParaRPr lang="en-US"/>
           </a:p>
@@ -2628,7 +2888,7 @@
     </p:spTree>
     <p:extLst>
       <p:ext uri="{BB962C8B-B14F-4D97-AF65-F5344CB8AC3E}">
-        <p14:creationId xmlns:p14="http://schemas.microsoft.com/office/powerpoint/2010/main" val="4108607386"/>
+        <p14:creationId xmlns:p14="http://schemas.microsoft.com/office/powerpoint/2010/main" xmlns:p="http://schemas.openxmlformats.org/presentationml/2006/main" xmlns:r="http://schemas.openxmlformats.org/officeDocument/2006/relationships" xmlns:a="http://schemas.openxmlformats.org/drawingml/2006/main" xmlns="" val="4108607386"/>
       </p:ext>
     </p:extLst>
   </p:cSld>
@@ -2642,7 +2902,7 @@
 </file>
 
 <file path=ppt/slideLayouts/slideLayout15.xml><?xml version="1.0" encoding="utf-8"?>
-<p:sldLayout xmlns:a="http://schemas.openxmlformats.org/drawingml/2006/main" xmlns:r="http://schemas.openxmlformats.org/officeDocument/2006/relationships" xmlns:p="http://schemas.openxmlformats.org/presentationml/2006/main" preserve="1" userDrawn="1">
+<p:sldLayout xmlns:a="http://schemas.openxmlformats.org/drawingml/2006/main" xmlns:r="http://schemas.openxmlformats.org/officeDocument/2006/relationships" xmlns:mc="http://schemas.openxmlformats.org/markup-compatibility/2006" xmlns:mv="urn:schemas-microsoft-com:mac:vml" xmlns:p="http://schemas.openxmlformats.org/presentationml/2006/main" mc:Ignorable="mv" mc:PreserveAttributes="mv:*" preserve="1" userDrawn="1">
   <p:cSld name="2 column w/number">
     <p:spTree>
       <p:nvGrpSpPr>
@@ -2871,7 +3131,7 @@
               <a:pPr>
                 <a:defRPr/>
               </a:pPr>
-              <a:t>May 29, 2014</a:t>
+              <a:t>May 31, 2014</a:t>
             </a:fld>
             <a:endParaRPr lang="en-US"/>
           </a:p>
@@ -2939,7 +3199,7 @@
     </p:spTree>
     <p:extLst>
       <p:ext uri="{BB962C8B-B14F-4D97-AF65-F5344CB8AC3E}">
-        <p14:creationId xmlns:p14="http://schemas.microsoft.com/office/powerpoint/2010/main" val="3966559409"/>
+        <p14:creationId xmlns:p14="http://schemas.microsoft.com/office/powerpoint/2010/main" xmlns:p="http://schemas.openxmlformats.org/presentationml/2006/main" xmlns:r="http://schemas.openxmlformats.org/officeDocument/2006/relationships" xmlns:a="http://schemas.openxmlformats.org/drawingml/2006/main" xmlns="" val="3966559409"/>
       </p:ext>
     </p:extLst>
   </p:cSld>
@@ -2953,7 +3213,7 @@
 </file>
 
 <file path=ppt/slideLayouts/slideLayout16.xml><?xml version="1.0" encoding="utf-8"?>
-<p:sldLayout xmlns:a="http://schemas.openxmlformats.org/drawingml/2006/main" xmlns:r="http://schemas.openxmlformats.org/officeDocument/2006/relationships" xmlns:p="http://schemas.openxmlformats.org/presentationml/2006/main" type="blank" preserve="1">
+<p:sldLayout xmlns:a="http://schemas.openxmlformats.org/drawingml/2006/main" xmlns:r="http://schemas.openxmlformats.org/officeDocument/2006/relationships" xmlns:mc="http://schemas.openxmlformats.org/markup-compatibility/2006" xmlns:mv="urn:schemas-microsoft-com:mac:vml" xmlns:p="http://schemas.openxmlformats.org/presentationml/2006/main" mc:Ignorable="mv" mc:PreserveAttributes="mv:*" type="blank" preserve="1">
   <p:cSld name="Blank">
     <p:spTree>
       <p:nvGrpSpPr>
@@ -2996,7 +3256,7 @@
               <a:pPr>
                 <a:defRPr/>
               </a:pPr>
-              <a:t>May 29, 2014</a:t>
+              <a:t>May 31, 2014</a:t>
             </a:fld>
             <a:endParaRPr lang="en-US"/>
           </a:p>
@@ -3064,7 +3324,7 @@
     </p:spTree>
     <p:extLst>
       <p:ext uri="{BB962C8B-B14F-4D97-AF65-F5344CB8AC3E}">
-        <p14:creationId xmlns:p14="http://schemas.microsoft.com/office/powerpoint/2010/main" val="626709248"/>
+        <p14:creationId xmlns:p14="http://schemas.microsoft.com/office/powerpoint/2010/main" xmlns:p="http://schemas.openxmlformats.org/presentationml/2006/main" xmlns:r="http://schemas.openxmlformats.org/officeDocument/2006/relationships" xmlns:a="http://schemas.openxmlformats.org/drawingml/2006/main" xmlns="" val="626709248"/>
       </p:ext>
     </p:extLst>
   </p:cSld>
@@ -3078,7 +3338,7 @@
 </file>
 
 <file path=ppt/slideLayouts/slideLayout17.xml><?xml version="1.0" encoding="utf-8"?>
-<p:sldLayout xmlns:a="http://schemas.openxmlformats.org/drawingml/2006/main" xmlns:r="http://schemas.openxmlformats.org/officeDocument/2006/relationships" xmlns:p="http://schemas.openxmlformats.org/presentationml/2006/main" preserve="1" userDrawn="1">
+<p:sldLayout xmlns:a="http://schemas.openxmlformats.org/drawingml/2006/main" xmlns:r="http://schemas.openxmlformats.org/officeDocument/2006/relationships" xmlns:mc="http://schemas.openxmlformats.org/markup-compatibility/2006" xmlns:mv="urn:schemas-microsoft-com:mac:vml" xmlns:p="http://schemas.openxmlformats.org/presentationml/2006/main" mc:Ignorable="mv" mc:PreserveAttributes="mv:*" preserve="1" userDrawn="1">
   <p:cSld name="Blank Layout No Tag">
     <p:bg>
       <p:bgPr>
@@ -3159,7 +3419,7 @@
               <a:pPr>
                 <a:defRPr/>
               </a:pPr>
-              <a:t>May 29, 2014</a:t>
+              <a:t>May 31, 2014</a:t>
             </a:fld>
             <a:endParaRPr lang="en-US" dirty="0"/>
           </a:p>
@@ -3201,7 +3461,7 @@
     </p:spTree>
     <p:extLst>
       <p:ext uri="{BB962C8B-B14F-4D97-AF65-F5344CB8AC3E}">
-        <p14:creationId xmlns:p14="http://schemas.microsoft.com/office/powerpoint/2010/main" val="2632892429"/>
+        <p14:creationId xmlns:p14="http://schemas.microsoft.com/office/powerpoint/2010/main" xmlns:p="http://schemas.openxmlformats.org/presentationml/2006/main" xmlns:r="http://schemas.openxmlformats.org/officeDocument/2006/relationships" xmlns:a="http://schemas.openxmlformats.org/drawingml/2006/main" xmlns="" val="2632892429"/>
       </p:ext>
     </p:extLst>
   </p:cSld>
@@ -3212,7 +3472,7 @@
 </file>
 
 <file path=ppt/slideLayouts/slideLayout2.xml><?xml version="1.0" encoding="utf-8"?>
-<p:sldLayout xmlns:a="http://schemas.openxmlformats.org/drawingml/2006/main" xmlns:r="http://schemas.openxmlformats.org/officeDocument/2006/relationships" xmlns:p="http://schemas.openxmlformats.org/presentationml/2006/main" preserve="1">
+<p:sldLayout xmlns:a="http://schemas.openxmlformats.org/drawingml/2006/main" xmlns:r="http://schemas.openxmlformats.org/officeDocument/2006/relationships" xmlns:mc="http://schemas.openxmlformats.org/markup-compatibility/2006" xmlns:mv="urn:schemas-microsoft-com:mac:vml" xmlns:p="http://schemas.openxmlformats.org/presentationml/2006/main" mc:Ignorable="mv" mc:PreserveAttributes="mv:*" preserve="1">
   <p:cSld name="Full width w/bullets">
     <p:spTree>
       <p:nvGrpSpPr>
@@ -3362,7 +3622,7 @@
               <a:pPr>
                 <a:defRPr/>
               </a:pPr>
-              <a:t>May 29, 2014</a:t>
+              <a:t>May 31, 2014</a:t>
             </a:fld>
             <a:endParaRPr lang="en-US"/>
           </a:p>
@@ -3430,7 +3690,7 @@
     </p:spTree>
     <p:extLst>
       <p:ext uri="{BB962C8B-B14F-4D97-AF65-F5344CB8AC3E}">
-        <p14:creationId xmlns:p14="http://schemas.microsoft.com/office/powerpoint/2010/main" val="1168923685"/>
+        <p14:creationId xmlns:p14="http://schemas.microsoft.com/office/powerpoint/2010/main" xmlns:p="http://schemas.openxmlformats.org/presentationml/2006/main" xmlns:r="http://schemas.openxmlformats.org/officeDocument/2006/relationships" xmlns:a="http://schemas.openxmlformats.org/drawingml/2006/main" xmlns="" val="1168923685"/>
       </p:ext>
     </p:extLst>
   </p:cSld>
@@ -3444,7 +3704,7 @@
 </file>
 
 <file path=ppt/slideLayouts/slideLayout3.xml><?xml version="1.0" encoding="utf-8"?>
-<p:sldLayout xmlns:a="http://schemas.openxmlformats.org/drawingml/2006/main" xmlns:r="http://schemas.openxmlformats.org/officeDocument/2006/relationships" xmlns:p="http://schemas.openxmlformats.org/presentationml/2006/main" preserve="1" userDrawn="1">
+<p:sldLayout xmlns:a="http://schemas.openxmlformats.org/drawingml/2006/main" xmlns:r="http://schemas.openxmlformats.org/officeDocument/2006/relationships" xmlns:mc="http://schemas.openxmlformats.org/markup-compatibility/2006" xmlns:mv="urn:schemas-microsoft-com:mac:vml" xmlns:p="http://schemas.openxmlformats.org/presentationml/2006/main" mc:Ignorable="mv" mc:PreserveAttributes="mv:*" preserve="1" userDrawn="1">
   <p:cSld name="1 column w/bullets">
     <p:spTree>
       <p:nvGrpSpPr>
@@ -3629,7 +3889,7 @@
               <a:pPr>
                 <a:defRPr/>
               </a:pPr>
-              <a:t>May 29, 2014</a:t>
+              <a:t>May 31, 2014</a:t>
             </a:fld>
             <a:endParaRPr lang="en-US"/>
           </a:p>
@@ -3697,7 +3957,7 @@
     </p:spTree>
     <p:extLst>
       <p:ext uri="{BB962C8B-B14F-4D97-AF65-F5344CB8AC3E}">
-        <p14:creationId xmlns:p14="http://schemas.microsoft.com/office/powerpoint/2010/main" val="2969271736"/>
+        <p14:creationId xmlns:p14="http://schemas.microsoft.com/office/powerpoint/2010/main" xmlns:p="http://schemas.openxmlformats.org/presentationml/2006/main" xmlns:r="http://schemas.openxmlformats.org/officeDocument/2006/relationships" xmlns:a="http://schemas.openxmlformats.org/drawingml/2006/main" xmlns="" val="2969271736"/>
       </p:ext>
     </p:extLst>
   </p:cSld>
@@ -3711,7 +3971,7 @@
 </file>
 
 <file path=ppt/slideLayouts/slideLayout4.xml><?xml version="1.0" encoding="utf-8"?>
-<p:sldLayout xmlns:a="http://schemas.openxmlformats.org/drawingml/2006/main" xmlns:r="http://schemas.openxmlformats.org/officeDocument/2006/relationships" xmlns:p="http://schemas.openxmlformats.org/presentationml/2006/main" preserve="1">
+<p:sldLayout xmlns:a="http://schemas.openxmlformats.org/drawingml/2006/main" xmlns:r="http://schemas.openxmlformats.org/officeDocument/2006/relationships" xmlns:mc="http://schemas.openxmlformats.org/markup-compatibility/2006" xmlns:mv="urn:schemas-microsoft-com:mac:vml" xmlns:p="http://schemas.openxmlformats.org/presentationml/2006/main" mc:Ignorable="mv" mc:PreserveAttributes="mv:*" preserve="1">
   <p:cSld name="1 column w/bullets and thumbnail">
     <p:spTree>
       <p:nvGrpSpPr>
@@ -3927,7 +4187,7 @@
               <a:pPr>
                 <a:defRPr/>
               </a:pPr>
-              <a:t>May 29, 2014</a:t>
+              <a:t>May 31, 2014</a:t>
             </a:fld>
             <a:endParaRPr lang="en-US"/>
           </a:p>
@@ -3995,7 +4255,7 @@
     </p:spTree>
     <p:extLst>
       <p:ext uri="{BB962C8B-B14F-4D97-AF65-F5344CB8AC3E}">
-        <p14:creationId xmlns:p14="http://schemas.microsoft.com/office/powerpoint/2010/main" val="2931305199"/>
+        <p14:creationId xmlns:p14="http://schemas.microsoft.com/office/powerpoint/2010/main" xmlns:p="http://schemas.openxmlformats.org/presentationml/2006/main" xmlns:r="http://schemas.openxmlformats.org/officeDocument/2006/relationships" xmlns:a="http://schemas.openxmlformats.org/drawingml/2006/main" xmlns="" val="2931305199"/>
       </p:ext>
     </p:extLst>
   </p:cSld>
@@ -4009,7 +4269,7 @@
 </file>
 
 <file path=ppt/slideLayouts/slideLayout5.xml><?xml version="1.0" encoding="utf-8"?>
-<p:sldLayout xmlns:a="http://schemas.openxmlformats.org/drawingml/2006/main" xmlns:r="http://schemas.openxmlformats.org/officeDocument/2006/relationships" xmlns:p="http://schemas.openxmlformats.org/presentationml/2006/main" preserve="1" userDrawn="1">
+<p:sldLayout xmlns:a="http://schemas.openxmlformats.org/drawingml/2006/main" xmlns:r="http://schemas.openxmlformats.org/officeDocument/2006/relationships" xmlns:mc="http://schemas.openxmlformats.org/markup-compatibility/2006" xmlns:mv="urn:schemas-microsoft-com:mac:vml" xmlns:p="http://schemas.openxmlformats.org/presentationml/2006/main" mc:Ignorable="mv" mc:PreserveAttributes="mv:*" preserve="1" userDrawn="1">
   <p:cSld name="Full width picture">
     <p:spTree>
       <p:nvGrpSpPr>
@@ -4116,7 +4376,7 @@
               <a:pPr>
                 <a:defRPr/>
               </a:pPr>
-              <a:t>May 29, 2014</a:t>
+              <a:t>May 31, 2014</a:t>
             </a:fld>
             <a:endParaRPr lang="en-US"/>
           </a:p>
@@ -4184,7 +4444,7 @@
     </p:spTree>
     <p:extLst>
       <p:ext uri="{BB962C8B-B14F-4D97-AF65-F5344CB8AC3E}">
-        <p14:creationId xmlns:p14="http://schemas.microsoft.com/office/powerpoint/2010/main" val="1336574129"/>
+        <p14:creationId xmlns:p14="http://schemas.microsoft.com/office/powerpoint/2010/main" xmlns:p="http://schemas.openxmlformats.org/presentationml/2006/main" xmlns:r="http://schemas.openxmlformats.org/officeDocument/2006/relationships" xmlns:a="http://schemas.openxmlformats.org/drawingml/2006/main" xmlns="" val="1336574129"/>
       </p:ext>
     </p:extLst>
   </p:cSld>
@@ -4198,7 +4458,7 @@
 </file>
 
 <file path=ppt/slideLayouts/slideLayout6.xml><?xml version="1.0" encoding="utf-8"?>
-<p:sldLayout xmlns:a="http://schemas.openxmlformats.org/drawingml/2006/main" xmlns:r="http://schemas.openxmlformats.org/officeDocument/2006/relationships" xmlns:p="http://schemas.openxmlformats.org/presentationml/2006/main" preserve="1" userDrawn="1">
+<p:sldLayout xmlns:a="http://schemas.openxmlformats.org/drawingml/2006/main" xmlns:r="http://schemas.openxmlformats.org/officeDocument/2006/relationships" xmlns:mc="http://schemas.openxmlformats.org/markup-compatibility/2006" xmlns:mv="urn:schemas-microsoft-com:mac:vml" xmlns:p="http://schemas.openxmlformats.org/presentationml/2006/main" mc:Ignorable="mv" mc:PreserveAttributes="mv:*" preserve="1" userDrawn="1">
   <p:cSld name="Title Only">
     <p:spTree>
       <p:nvGrpSpPr>
@@ -4269,7 +4529,7 @@
               <a:pPr>
                 <a:defRPr/>
               </a:pPr>
-              <a:t>May 29, 2014</a:t>
+              <a:t>May 31, 2014</a:t>
             </a:fld>
             <a:endParaRPr lang="en-US"/>
           </a:p>
@@ -4337,7 +4597,7 @@
     </p:spTree>
     <p:extLst>
       <p:ext uri="{BB962C8B-B14F-4D97-AF65-F5344CB8AC3E}">
-        <p14:creationId xmlns:p14="http://schemas.microsoft.com/office/powerpoint/2010/main" val="2520306882"/>
+        <p14:creationId xmlns:p14="http://schemas.microsoft.com/office/powerpoint/2010/main" xmlns:p="http://schemas.openxmlformats.org/presentationml/2006/main" xmlns:r="http://schemas.openxmlformats.org/officeDocument/2006/relationships" xmlns:a="http://schemas.openxmlformats.org/drawingml/2006/main" xmlns="" val="2520306882"/>
       </p:ext>
     </p:extLst>
   </p:cSld>
@@ -4351,7 +4611,7 @@
 </file>
 
 <file path=ppt/slideLayouts/slideLayout7.xml><?xml version="1.0" encoding="utf-8"?>
-<p:sldLayout xmlns:a="http://schemas.openxmlformats.org/drawingml/2006/main" xmlns:r="http://schemas.openxmlformats.org/officeDocument/2006/relationships" xmlns:p="http://schemas.openxmlformats.org/presentationml/2006/main" type="obj" preserve="1">
+<p:sldLayout xmlns:a="http://schemas.openxmlformats.org/drawingml/2006/main" xmlns:r="http://schemas.openxmlformats.org/officeDocument/2006/relationships" xmlns:mc="http://schemas.openxmlformats.org/markup-compatibility/2006" xmlns:mv="urn:schemas-microsoft-com:mac:vml" xmlns:p="http://schemas.openxmlformats.org/presentationml/2006/main" mc:Ignorable="mv" mc:PreserveAttributes="mv:*" type="obj" preserve="1">
   <p:cSld name="Full width no bullets">
     <p:spTree>
       <p:nvGrpSpPr>
@@ -4503,7 +4763,7 @@
               <a:pPr>
                 <a:defRPr/>
               </a:pPr>
-              <a:t>May 29, 2014</a:t>
+              <a:t>May 31, 2014</a:t>
             </a:fld>
             <a:endParaRPr lang="en-US"/>
           </a:p>
@@ -4571,7 +4831,7 @@
     </p:spTree>
     <p:extLst>
       <p:ext uri="{BB962C8B-B14F-4D97-AF65-F5344CB8AC3E}">
-        <p14:creationId xmlns:p14="http://schemas.microsoft.com/office/powerpoint/2010/main" val="3209058712"/>
+        <p14:creationId xmlns:p14="http://schemas.microsoft.com/office/powerpoint/2010/main" xmlns:p="http://schemas.openxmlformats.org/presentationml/2006/main" xmlns:r="http://schemas.openxmlformats.org/officeDocument/2006/relationships" xmlns:a="http://schemas.openxmlformats.org/drawingml/2006/main" xmlns="" val="3209058712"/>
       </p:ext>
     </p:extLst>
   </p:cSld>
@@ -4585,7 +4845,7 @@
 </file>
 
 <file path=ppt/slideLayouts/slideLayout8.xml><?xml version="1.0" encoding="utf-8"?>
-<p:sldLayout xmlns:a="http://schemas.openxmlformats.org/drawingml/2006/main" xmlns:r="http://schemas.openxmlformats.org/officeDocument/2006/relationships" xmlns:p="http://schemas.openxmlformats.org/presentationml/2006/main" preserve="1">
+<p:sldLayout xmlns:a="http://schemas.openxmlformats.org/drawingml/2006/main" xmlns:r="http://schemas.openxmlformats.org/officeDocument/2006/relationships" xmlns:mc="http://schemas.openxmlformats.org/markup-compatibility/2006" xmlns:mv="urn:schemas-microsoft-com:mac:vml" xmlns:p="http://schemas.openxmlformats.org/presentationml/2006/main" mc:Ignorable="mv" mc:PreserveAttributes="mv:*" preserve="1">
   <p:cSld name="Full width w/number">
     <p:spTree>
       <p:nvGrpSpPr>
@@ -4735,7 +4995,7 @@
               <a:pPr>
                 <a:defRPr/>
               </a:pPr>
-              <a:t>May 29, 2014</a:t>
+              <a:t>May 31, 2014</a:t>
             </a:fld>
             <a:endParaRPr lang="en-US"/>
           </a:p>
@@ -4803,7 +5063,7 @@
     </p:spTree>
     <p:extLst>
       <p:ext uri="{BB962C8B-B14F-4D97-AF65-F5344CB8AC3E}">
-        <p14:creationId xmlns:p14="http://schemas.microsoft.com/office/powerpoint/2010/main" val="946531670"/>
+        <p14:creationId xmlns:p14="http://schemas.microsoft.com/office/powerpoint/2010/main" xmlns:p="http://schemas.openxmlformats.org/presentationml/2006/main" xmlns:r="http://schemas.openxmlformats.org/officeDocument/2006/relationships" xmlns:a="http://schemas.openxmlformats.org/drawingml/2006/main" xmlns="" val="946531670"/>
       </p:ext>
     </p:extLst>
   </p:cSld>
@@ -4817,7 +5077,7 @@
 </file>
 
 <file path=ppt/slideLayouts/slideLayout9.xml><?xml version="1.0" encoding="utf-8"?>
-<p:sldLayout xmlns:a="http://schemas.openxmlformats.org/drawingml/2006/main" xmlns:r="http://schemas.openxmlformats.org/officeDocument/2006/relationships" xmlns:p="http://schemas.openxmlformats.org/presentationml/2006/main" preserve="1" userDrawn="1">
+<p:sldLayout xmlns:a="http://schemas.openxmlformats.org/drawingml/2006/main" xmlns:r="http://schemas.openxmlformats.org/officeDocument/2006/relationships" xmlns:mc="http://schemas.openxmlformats.org/markup-compatibility/2006" xmlns:mv="urn:schemas-microsoft-com:mac:vml" xmlns:p="http://schemas.openxmlformats.org/presentationml/2006/main" mc:Ignorable="mv" mc:PreserveAttributes="mv:*" preserve="1" userDrawn="1">
   <p:cSld name="1 column no bullets">
     <p:spTree>
       <p:nvGrpSpPr>
@@ -5002,7 +5262,7 @@
               <a:pPr>
                 <a:defRPr/>
               </a:pPr>
-              <a:t>May 29, 2014</a:t>
+              <a:t>May 31, 2014</a:t>
             </a:fld>
             <a:endParaRPr lang="en-US"/>
           </a:p>
@@ -5070,7 +5330,7 @@
     </p:spTree>
     <p:extLst>
       <p:ext uri="{BB962C8B-B14F-4D97-AF65-F5344CB8AC3E}">
-        <p14:creationId xmlns:p14="http://schemas.microsoft.com/office/powerpoint/2010/main" val="2052283023"/>
+        <p14:creationId xmlns:p14="http://schemas.microsoft.com/office/powerpoint/2010/main" xmlns:p="http://schemas.openxmlformats.org/presentationml/2006/main" xmlns:r="http://schemas.openxmlformats.org/officeDocument/2006/relationships" xmlns:a="http://schemas.openxmlformats.org/drawingml/2006/main" xmlns="" val="2052283023"/>
       </p:ext>
     </p:extLst>
   </p:cSld>
@@ -5084,7 +5344,7 @@
 </file>
 
 <file path=ppt/slideMasters/slideMaster1.xml><?xml version="1.0" encoding="utf-8"?>
-<p:sldMaster xmlns:a="http://schemas.openxmlformats.org/drawingml/2006/main" xmlns:r="http://schemas.openxmlformats.org/officeDocument/2006/relationships" xmlns:p="http://schemas.openxmlformats.org/presentationml/2006/main">
+<p:sldMaster xmlns:a="http://schemas.openxmlformats.org/drawingml/2006/main" xmlns:r="http://schemas.openxmlformats.org/officeDocument/2006/relationships" xmlns:mc="http://schemas.openxmlformats.org/markup-compatibility/2006" xmlns:mv="urn:schemas-microsoft-com:mac:vml" xmlns:p="http://schemas.openxmlformats.org/presentationml/2006/main" mc:Ignorable="mv" mc:PreserveAttributes="mv:*">
   <p:cSld>
     <p:bg>
       <p:bgPr>
@@ -5132,7 +5392,7 @@
           </a:ln>
           <a:extLst>
             <a:ext uri="{91240B29-F687-4F45-9708-019B960494DF}">
-              <a14:hiddenLine xmlns:a14="http://schemas.microsoft.com/office/drawing/2010/main" w="9525">
+              <a14:hiddenLine xmlns:a14="http://schemas.microsoft.com/office/drawing/2010/main" xmlns:p="http://schemas.openxmlformats.org/presentationml/2006/main" xmlns:r="http://schemas.openxmlformats.org/officeDocument/2006/relationships" xmlns:a="http://schemas.openxmlformats.org/drawingml/2006/main" xmlns="" w="9525">
                 <a:solidFill>
                   <a:srgbClr val="000000"/>
                 </a:solidFill>
@@ -5176,7 +5436,7 @@
           <a:blip r:embed="rId19">
             <a:extLst>
               <a:ext uri="{28A0092B-C50C-407E-A947-70E740481C1C}">
-                <a14:useLocalDpi xmlns:a14="http://schemas.microsoft.com/office/drawing/2010/main" val="0"/>
+                <a14:useLocalDpi xmlns:a14="http://schemas.microsoft.com/office/drawing/2010/main" xmlns:p="http://schemas.openxmlformats.org/presentationml/2006/main" xmlns:r="http://schemas.openxmlformats.org/officeDocument/2006/relationships" xmlns:a="http://schemas.openxmlformats.org/drawingml/2006/main" xmlns="" val="0"/>
               </a:ext>
             </a:extLst>
           </a:blip>
@@ -5199,14 +5459,14 @@
           </a:ln>
           <a:extLst>
             <a:ext uri="{909E8E84-426E-40DD-AFC4-6F175D3DCCD1}">
-              <a14:hiddenFill xmlns:a14="http://schemas.microsoft.com/office/drawing/2010/main">
+              <a14:hiddenFill xmlns:a14="http://schemas.microsoft.com/office/drawing/2010/main" xmlns:p="http://schemas.openxmlformats.org/presentationml/2006/main" xmlns:r="http://schemas.openxmlformats.org/officeDocument/2006/relationships" xmlns:a="http://schemas.openxmlformats.org/drawingml/2006/main" xmlns="">
                 <a:solidFill>
                   <a:srgbClr val="FFFFFF"/>
                 </a:solidFill>
               </a14:hiddenFill>
             </a:ext>
             <a:ext uri="{91240B29-F687-4F45-9708-019B960494DF}">
-              <a14:hiddenLine xmlns:a14="http://schemas.microsoft.com/office/drawing/2010/main" w="9525">
+              <a14:hiddenLine xmlns:a14="http://schemas.microsoft.com/office/drawing/2010/main" xmlns:p="http://schemas.openxmlformats.org/presentationml/2006/main" xmlns:r="http://schemas.openxmlformats.org/officeDocument/2006/relationships" xmlns:a="http://schemas.openxmlformats.org/drawingml/2006/main" xmlns="" w="9525">
                 <a:solidFill>
                   <a:srgbClr val="000000"/>
                 </a:solidFill>
@@ -5242,14 +5502,14 @@
           </a:ln>
           <a:extLst>
             <a:ext uri="{909E8E84-426E-40DD-AFC4-6F175D3DCCD1}">
-              <a14:hiddenFill xmlns:a14="http://schemas.microsoft.com/office/drawing/2010/main">
+              <a14:hiddenFill xmlns:a14="http://schemas.microsoft.com/office/drawing/2010/main" xmlns:p="http://schemas.openxmlformats.org/presentationml/2006/main" xmlns:r="http://schemas.openxmlformats.org/officeDocument/2006/relationships" xmlns:a="http://schemas.openxmlformats.org/drawingml/2006/main" xmlns="">
                 <a:solidFill>
                   <a:srgbClr val="FFFFFF"/>
                 </a:solidFill>
               </a14:hiddenFill>
             </a:ext>
             <a:ext uri="{91240B29-F687-4F45-9708-019B960494DF}">
-              <a14:hiddenLine xmlns:a14="http://schemas.microsoft.com/office/drawing/2010/main" w="9525">
+              <a14:hiddenLine xmlns:a14="http://schemas.microsoft.com/office/drawing/2010/main" xmlns:p="http://schemas.openxmlformats.org/presentationml/2006/main" xmlns:r="http://schemas.openxmlformats.org/officeDocument/2006/relationships" xmlns:a="http://schemas.openxmlformats.org/drawingml/2006/main" xmlns="" w="9525">
                 <a:solidFill>
                   <a:srgbClr val="000000"/>
                 </a:solidFill>
@@ -5259,7 +5519,7 @@
               </a14:hiddenLine>
             </a:ext>
             <a:ext uri="{FAA26D3D-D897-4be2-8F04-BA451C77F1D7}">
-              <ma14:placeholderFlag xmlns="" xmlns:ma14="http://schemas.microsoft.com/office/mac/drawingml/2011/main" val="1"/>
+              <ma14:placeholderFlag xmlns:ma14="http://schemas.microsoft.com/office/mac/drawingml/2011/main" xmlns="" xmlns:p="http://schemas.openxmlformats.org/presentationml/2006/main" xmlns:r="http://schemas.openxmlformats.org/officeDocument/2006/relationships" xmlns:a="http://schemas.openxmlformats.org/drawingml/2006/main" val="1"/>
             </a:ext>
           </a:extLst>
         </p:spPr>
@@ -5303,14 +5563,14 @@
           </a:ln>
           <a:extLst>
             <a:ext uri="{909E8E84-426E-40DD-AFC4-6F175D3DCCD1}">
-              <a14:hiddenFill xmlns:a14="http://schemas.microsoft.com/office/drawing/2010/main">
+              <a14:hiddenFill xmlns:a14="http://schemas.microsoft.com/office/drawing/2010/main" xmlns:p="http://schemas.openxmlformats.org/presentationml/2006/main" xmlns:r="http://schemas.openxmlformats.org/officeDocument/2006/relationships" xmlns:a="http://schemas.openxmlformats.org/drawingml/2006/main" xmlns="">
                 <a:solidFill>
                   <a:srgbClr val="FFFFFF"/>
                 </a:solidFill>
               </a14:hiddenFill>
             </a:ext>
             <a:ext uri="{91240B29-F687-4F45-9708-019B960494DF}">
-              <a14:hiddenLine xmlns:a14="http://schemas.microsoft.com/office/drawing/2010/main" w="9525">
+              <a14:hiddenLine xmlns:a14="http://schemas.microsoft.com/office/drawing/2010/main" xmlns:p="http://schemas.openxmlformats.org/presentationml/2006/main" xmlns:r="http://schemas.openxmlformats.org/officeDocument/2006/relationships" xmlns:a="http://schemas.openxmlformats.org/drawingml/2006/main" xmlns="" w="9525">
                 <a:solidFill>
                   <a:srgbClr val="000000"/>
                 </a:solidFill>
@@ -5320,7 +5580,7 @@
               </a14:hiddenLine>
             </a:ext>
             <a:ext uri="{FAA26D3D-D897-4be2-8F04-BA451C77F1D7}">
-              <ma14:placeholderFlag xmlns="" xmlns:ma14="http://schemas.microsoft.com/office/mac/drawingml/2011/main" val="1"/>
+              <ma14:placeholderFlag xmlns:ma14="http://schemas.microsoft.com/office/mac/drawingml/2011/main" xmlns="" xmlns:p="http://schemas.openxmlformats.org/presentationml/2006/main" xmlns:r="http://schemas.openxmlformats.org/officeDocument/2006/relationships" xmlns:a="http://schemas.openxmlformats.org/drawingml/2006/main" val="1"/>
             </a:ext>
           </a:extLst>
         </p:spPr>
@@ -5463,7 +5723,7 @@
               <a:pPr defTabSz="457200">
                 <a:defRPr/>
               </a:pPr>
-              <a:t>May 29, 2014</a:t>
+              <a:t>May 31, 2014</a:t>
             </a:fld>
             <a:endParaRPr lang="en-US" dirty="0"/>
           </a:p>
@@ -5526,7 +5786,7 @@
     </p:spTree>
     <p:extLst>
       <p:ext uri="{BB962C8B-B14F-4D97-AF65-F5344CB8AC3E}">
-        <p14:creationId xmlns:p14="http://schemas.microsoft.com/office/powerpoint/2010/main" val="1848995723"/>
+        <p14:creationId xmlns:p14="http://schemas.microsoft.com/office/powerpoint/2010/main" xmlns:p="http://schemas.openxmlformats.org/presentationml/2006/main" xmlns:r="http://schemas.openxmlformats.org/officeDocument/2006/relationships" xmlns:a="http://schemas.openxmlformats.org/drawingml/2006/main" xmlns="" val="1848995723"/>
       </p:ext>
     </p:extLst>
   </p:cSld>
@@ -5989,7 +6249,7 @@
 </file>
 
 <file path=ppt/slides/slide1.xml><?xml version="1.0" encoding="utf-8"?>
-<p:sld xmlns:a="http://schemas.openxmlformats.org/drawingml/2006/main" xmlns:r="http://schemas.openxmlformats.org/officeDocument/2006/relationships" xmlns:p="http://schemas.openxmlformats.org/presentationml/2006/main">
+<p:sld xmlns:a="http://schemas.openxmlformats.org/drawingml/2006/main" xmlns:r="http://schemas.openxmlformats.org/officeDocument/2006/relationships" xmlns:mc="http://schemas.openxmlformats.org/markup-compatibility/2006" xmlns:mv="urn:schemas-microsoft-com:mac:vml" xmlns:p="http://schemas.openxmlformats.org/presentationml/2006/main" mc:Ignorable="mv" mc:PreserveAttributes="mv:*">
   <p:cSld>
     <p:spTree>
       <p:nvGrpSpPr>
@@ -6075,8 +6335,26 @@
                 <a:latin typeface="Arial" panose="020B0604020202020204" pitchFamily="34" charset="0"/>
                 <a:cs typeface="Arial" panose="020B0604020202020204" pitchFamily="34" charset="0"/>
               </a:rPr>
-              <a:t>ST 599 – Big Data Project 2</a:t>
-            </a:r>
+              <a:t>ST 599 – Big Data Project</a:t>
+            </a:r>
+            <a:r>
+              <a:rPr lang="en-US" dirty="0" smtClean="0">
+                <a:latin typeface="Arial" panose="020B0604020202020204" pitchFamily="34" charset="0"/>
+                <a:cs typeface="Arial" panose="020B0604020202020204" pitchFamily="34" charset="0"/>
+              </a:rPr>
+              <a:t> </a:t>
+            </a:r>
+            <a:r>
+              <a:rPr dirty="0" smtClean="0">
+                <a:latin typeface="Arial" panose="020B0604020202020204" pitchFamily="34" charset="0"/>
+                <a:cs typeface="Arial" panose="020B0604020202020204" pitchFamily="34" charset="0"/>
+              </a:rPr>
+              <a:t>3</a:t>
+            </a:r>
+            <a:endParaRPr lang="en-US" dirty="0" smtClean="0">
+              <a:latin typeface="Arial" panose="020B0604020202020204" pitchFamily="34" charset="0"/>
+              <a:cs typeface="Arial" panose="020B0604020202020204" pitchFamily="34" charset="0"/>
+            </a:endParaRPr>
           </a:p>
           <a:p>
             <a:r>
@@ -6161,48 +6439,35 @@
           </a:p>
         </p:txBody>
       </p:sp>
-      <p:sp>
-        <p:nvSpPr>
-          <p:cNvPr id="2" name="TextBox 1"/>
-          <p:cNvSpPr txBox="1"/>
+      <p:pic>
+        <p:nvPicPr>
+          <p:cNvPr id="6" name="Picture 5"/>
+          <p:cNvPicPr>
+            <a:picLocks noChangeAspect="1"/>
+          </p:cNvPicPr>
           <p:nvPr/>
-        </p:nvSpPr>
+        </p:nvPicPr>
+        <p:blipFill>
+          <a:blip r:embed="rId3"/>
+          <a:srcRect t="12727" b="5455"/>
+          <a:stretch>
+            <a:fillRect/>
+          </a:stretch>
+        </p:blipFill>
         <p:spPr>
           <a:xfrm>
-            <a:off x="5486400" y="4038600"/>
-            <a:ext cx="2034531" cy="830997"/>
+            <a:off x="4953000" y="3429000"/>
+            <a:ext cx="4191000" cy="3429000"/>
           </a:xfrm>
           <a:prstGeom prst="rect">
             <a:avLst/>
           </a:prstGeom>
-          <a:noFill/>
         </p:spPr>
-        <p:txBody>
-          <a:bodyPr wrap="none" rtlCol="0">
-            <a:spAutoFit/>
-          </a:bodyPr>
-          <a:lstStyle/>
-          <a:p>
-            <a:r>
-              <a:rPr lang="en-US" sz="4800" dirty="0" smtClean="0">
-                <a:solidFill>
-                  <a:srgbClr val="FF0000"/>
-                </a:solidFill>
-              </a:rPr>
-              <a:t>picture</a:t>
-            </a:r>
-            <a:endParaRPr lang="en-US" sz="4800" dirty="0">
-              <a:solidFill>
-                <a:srgbClr val="FF0000"/>
-              </a:solidFill>
-            </a:endParaRPr>
-          </a:p>
-        </p:txBody>
-      </p:sp>
+      </p:pic>
     </p:spTree>
     <p:extLst>
       <p:ext uri="{BB962C8B-B14F-4D97-AF65-F5344CB8AC3E}">
-        <p14:creationId xmlns:p14="http://schemas.microsoft.com/office/powerpoint/2010/main" val="3386317806"/>
+        <p14:creationId xmlns:p14="http://schemas.microsoft.com/office/powerpoint/2010/main" xmlns:p="http://schemas.openxmlformats.org/presentationml/2006/main" xmlns:r="http://schemas.openxmlformats.org/officeDocument/2006/relationships" xmlns:a="http://schemas.openxmlformats.org/drawingml/2006/main" xmlns="" val="3386317806"/>
       </p:ext>
     </p:extLst>
   </p:cSld>
@@ -6220,7 +6485,7 @@
 </file>
 
 <file path=ppt/slides/slide10.xml><?xml version="1.0" encoding="utf-8"?>
-<p:sld xmlns:a="http://schemas.openxmlformats.org/drawingml/2006/main" xmlns:r="http://schemas.openxmlformats.org/officeDocument/2006/relationships" xmlns:p="http://schemas.openxmlformats.org/presentationml/2006/main">
+<p:sld xmlns:a="http://schemas.openxmlformats.org/drawingml/2006/main" xmlns:r="http://schemas.openxmlformats.org/officeDocument/2006/relationships" xmlns:mc="http://schemas.openxmlformats.org/markup-compatibility/2006" xmlns:mv="urn:schemas-microsoft-com:mac:vml" xmlns:p="http://schemas.openxmlformats.org/presentationml/2006/main" mc:Ignorable="mv" mc:PreserveAttributes="mv:*">
   <p:cSld>
     <p:spTree>
       <p:nvGrpSpPr>
@@ -6238,6 +6503,48 @@
       </p:grpSpPr>
       <p:sp>
         <p:nvSpPr>
+          <p:cNvPr id="2" name="Title 1"/>
+          <p:cNvSpPr>
+            <a:spLocks noGrp="1"/>
+          </p:cNvSpPr>
+          <p:nvPr>
+            <p:ph type="title"/>
+          </p:nvPr>
+        </p:nvSpPr>
+        <p:spPr/>
+        <p:txBody>
+          <a:bodyPr/>
+          <a:lstStyle/>
+          <a:p>
+            <a:r>
+              <a:rPr lang="en-US" sz="4400" dirty="0" smtClean="0"/>
+              <a:t>Assumptions &amp; Limitations</a:t>
+            </a:r>
+            <a:endParaRPr lang="en-US" sz="4400" dirty="0"/>
+          </a:p>
+        </p:txBody>
+      </p:sp>
+      <p:sp>
+        <p:nvSpPr>
+          <p:cNvPr id="3" name="Content Placeholder 2"/>
+          <p:cNvSpPr>
+            <a:spLocks noGrp="1"/>
+          </p:cNvSpPr>
+          <p:nvPr>
+            <p:ph idx="1"/>
+          </p:nvPr>
+        </p:nvSpPr>
+        <p:spPr/>
+        <p:txBody>
+          <a:bodyPr/>
+          <a:lstStyle/>
+          <a:p>
+            <a:endParaRPr lang="en-US" dirty="0"/>
+          </a:p>
+        </p:txBody>
+      </p:sp>
+      <p:sp>
+        <p:nvSpPr>
           <p:cNvPr id="4" name="Date Placeholder 3"/>
           <p:cNvSpPr>
             <a:spLocks noGrp="1"/>
@@ -6286,6 +6593,241 @@
                 <a:defRPr/>
               </a:pPr>
               <a:t>10</a:t>
+            </a:fld>
+            <a:endParaRPr lang="en-US"/>
+          </a:p>
+        </p:txBody>
+      </p:sp>
+    </p:spTree>
+    <p:extLst>
+      <p:ext uri="{BB962C8B-B14F-4D97-AF65-F5344CB8AC3E}">
+        <p14:creationId xmlns:p14="http://schemas.microsoft.com/office/powerpoint/2010/main" xmlns:p="http://schemas.openxmlformats.org/presentationml/2006/main" xmlns:r="http://schemas.openxmlformats.org/officeDocument/2006/relationships" xmlns:a="http://schemas.openxmlformats.org/drawingml/2006/main" xmlns="" val="2860658135"/>
+      </p:ext>
+    </p:extLst>
+  </p:cSld>
+  <p:clrMapOvr>
+    <a:masterClrMapping/>
+  </p:clrMapOvr>
+  <p:transition>
+    <p:fade/>
+  </p:transition>
+  <p:timing>
+    <p:tnLst>
+      <p:par>
+        <p:cTn id="1" dur="indefinite" restart="never" nodeType="tmRoot"/>
+      </p:par>
+    </p:tnLst>
+  </p:timing>
+</p:sld>
+</file>
+
+<file path=ppt/slides/slide11.xml><?xml version="1.0" encoding="utf-8"?>
+<p:sld xmlns:a="http://schemas.openxmlformats.org/drawingml/2006/main" xmlns:r="http://schemas.openxmlformats.org/officeDocument/2006/relationships" xmlns:mc="http://schemas.openxmlformats.org/markup-compatibility/2006" xmlns:mv="urn:schemas-microsoft-com:mac:vml" xmlns:p="http://schemas.openxmlformats.org/presentationml/2006/main" mc:Ignorable="mv" mc:PreserveAttributes="mv:*">
+  <p:cSld>
+    <p:spTree>
+      <p:nvGrpSpPr>
+        <p:cNvPr id="1" name=""/>
+        <p:cNvGrpSpPr/>
+        <p:nvPr/>
+      </p:nvGrpSpPr>
+      <p:grpSpPr>
+        <a:xfrm>
+          <a:off x="0" y="0"/>
+          <a:ext cx="0" cy="0"/>
+          <a:chOff x="0" y="0"/>
+          <a:chExt cx="0" cy="0"/>
+        </a:xfrm>
+      </p:grpSpPr>
+      <p:sp>
+        <p:nvSpPr>
+          <p:cNvPr id="2" name="Title 1"/>
+          <p:cNvSpPr>
+            <a:spLocks noGrp="1"/>
+          </p:cNvSpPr>
+          <p:nvPr>
+            <p:ph type="title"/>
+          </p:nvPr>
+        </p:nvSpPr>
+        <p:spPr/>
+        <p:txBody>
+          <a:bodyPr/>
+          <a:lstStyle/>
+          <a:p>
+            <a:r>
+              <a:rPr lang="en-US" sz="4400" dirty="0" smtClean="0"/>
+              <a:t>Scalability </a:t>
+            </a:r>
+            <a:endParaRPr lang="en-US" sz="4400" dirty="0"/>
+          </a:p>
+        </p:txBody>
+      </p:sp>
+      <p:sp>
+        <p:nvSpPr>
+          <p:cNvPr id="3" name="Content Placeholder 2"/>
+          <p:cNvSpPr>
+            <a:spLocks noGrp="1"/>
+          </p:cNvSpPr>
+          <p:nvPr>
+            <p:ph idx="1"/>
+          </p:nvPr>
+        </p:nvSpPr>
+        <p:spPr/>
+        <p:txBody>
+          <a:bodyPr/>
+          <a:lstStyle/>
+          <a:p>
+            <a:r>
+              <a:rPr lang="en-US" sz="3200" dirty="0" smtClean="0"/>
+              <a:t>Practiced with small subset (10,000 songs)</a:t>
+            </a:r>
+          </a:p>
+          <a:p>
+            <a:r>
+              <a:rPr lang="en-US" sz="3200" dirty="0" smtClean="0"/>
+              <a:t>Revealed same number of PCs as full data set (515,345 songs) with 80% of variance explained.</a:t>
+            </a:r>
+            <a:endParaRPr lang="en-US" sz="3200" dirty="0"/>
+          </a:p>
+        </p:txBody>
+      </p:sp>
+      <p:sp>
+        <p:nvSpPr>
+          <p:cNvPr id="4" name="Date Placeholder 3"/>
+          <p:cNvSpPr>
+            <a:spLocks noGrp="1"/>
+          </p:cNvSpPr>
+          <p:nvPr>
+            <p:ph type="dt" sz="half" idx="10"/>
+          </p:nvPr>
+        </p:nvSpPr>
+        <p:spPr/>
+        <p:txBody>
+          <a:bodyPr/>
+          <a:lstStyle/>
+          <a:p>
+            <a:pPr>
+              <a:defRPr/>
+            </a:pPr>
+            <a:r>
+              <a:rPr lang="en-US" dirty="0" smtClean="0"/>
+              <a:t>June 2, 2014</a:t>
+            </a:r>
+            <a:endParaRPr lang="en-US" dirty="0"/>
+          </a:p>
+        </p:txBody>
+      </p:sp>
+      <p:sp>
+        <p:nvSpPr>
+          <p:cNvPr id="5" name="Slide Number Placeholder 4"/>
+          <p:cNvSpPr>
+            <a:spLocks noGrp="1"/>
+          </p:cNvSpPr>
+          <p:nvPr>
+            <p:ph type="sldNum" sz="quarter" idx="11"/>
+          </p:nvPr>
+        </p:nvSpPr>
+        <p:spPr/>
+        <p:txBody>
+          <a:bodyPr/>
+          <a:lstStyle/>
+          <a:p>
+            <a:pPr>
+              <a:defRPr/>
+            </a:pPr>
+            <a:fld id="{8A8258B9-01E1-BA41-A991-9A187DF9FB72}" type="slidenum">
+              <a:rPr lang="en-US" smtClean="0"/>
+              <a:pPr>
+                <a:defRPr/>
+              </a:pPr>
+              <a:t>11</a:t>
+            </a:fld>
+            <a:endParaRPr lang="en-US"/>
+          </a:p>
+        </p:txBody>
+      </p:sp>
+    </p:spTree>
+    <p:extLst>
+      <p:ext uri="{BB962C8B-B14F-4D97-AF65-F5344CB8AC3E}">
+        <p14:creationId xmlns:p14="http://schemas.microsoft.com/office/powerpoint/2010/main" xmlns:p="http://schemas.openxmlformats.org/presentationml/2006/main" xmlns:r="http://schemas.openxmlformats.org/officeDocument/2006/relationships" xmlns:a="http://schemas.openxmlformats.org/drawingml/2006/main" xmlns="" val="655401942"/>
+      </p:ext>
+    </p:extLst>
+  </p:cSld>
+  <p:clrMapOvr>
+    <a:masterClrMapping/>
+  </p:clrMapOvr>
+  <p:transition>
+    <p:fade/>
+  </p:transition>
+</p:sld>
+</file>
+
+<file path=ppt/slides/slide12.xml><?xml version="1.0" encoding="utf-8"?>
+<p:sld xmlns:a="http://schemas.openxmlformats.org/drawingml/2006/main" xmlns:r="http://schemas.openxmlformats.org/officeDocument/2006/relationships" xmlns:mc="http://schemas.openxmlformats.org/markup-compatibility/2006" xmlns:mv="urn:schemas-microsoft-com:mac:vml" xmlns:p="http://schemas.openxmlformats.org/presentationml/2006/main" mc:Ignorable="mv" mc:PreserveAttributes="mv:*">
+  <p:cSld>
+    <p:spTree>
+      <p:nvGrpSpPr>
+        <p:cNvPr id="1" name=""/>
+        <p:cNvGrpSpPr/>
+        <p:nvPr/>
+      </p:nvGrpSpPr>
+      <p:grpSpPr>
+        <a:xfrm>
+          <a:off x="0" y="0"/>
+          <a:ext cx="0" cy="0"/>
+          <a:chOff x="0" y="0"/>
+          <a:chExt cx="0" cy="0"/>
+        </a:xfrm>
+      </p:grpSpPr>
+      <p:sp>
+        <p:nvSpPr>
+          <p:cNvPr id="4" name="Date Placeholder 3"/>
+          <p:cNvSpPr>
+            <a:spLocks noGrp="1"/>
+          </p:cNvSpPr>
+          <p:nvPr>
+            <p:ph type="dt" sz="half" idx="10"/>
+          </p:nvPr>
+        </p:nvSpPr>
+        <p:spPr/>
+        <p:txBody>
+          <a:bodyPr/>
+          <a:lstStyle/>
+          <a:p>
+            <a:pPr>
+              <a:defRPr/>
+            </a:pPr>
+            <a:r>
+              <a:rPr lang="en-US" dirty="0" smtClean="0"/>
+              <a:t>June 2, 2014</a:t>
+            </a:r>
+            <a:endParaRPr lang="en-US" dirty="0"/>
+          </a:p>
+        </p:txBody>
+      </p:sp>
+      <p:sp>
+        <p:nvSpPr>
+          <p:cNvPr id="5" name="Slide Number Placeholder 4"/>
+          <p:cNvSpPr>
+            <a:spLocks noGrp="1"/>
+          </p:cNvSpPr>
+          <p:nvPr>
+            <p:ph type="sldNum" sz="quarter" idx="11"/>
+          </p:nvPr>
+        </p:nvSpPr>
+        <p:spPr/>
+        <p:txBody>
+          <a:bodyPr/>
+          <a:lstStyle/>
+          <a:p>
+            <a:pPr>
+              <a:defRPr/>
+            </a:pPr>
+            <a:fld id="{8A8258B9-01E1-BA41-A991-9A187DF9FB72}" type="slidenum">
+              <a:rPr lang="en-US" smtClean="0"/>
+              <a:pPr>
+                <a:defRPr/>
+              </a:pPr>
+              <a:t>12</a:t>
             </a:fld>
             <a:endParaRPr lang="en-US"/>
           </a:p>
@@ -6453,7 +6995,7 @@
     </p:spTree>
     <p:extLst>
       <p:ext uri="{BB962C8B-B14F-4D97-AF65-F5344CB8AC3E}">
-        <p14:creationId xmlns:p14="http://schemas.microsoft.com/office/powerpoint/2010/main" val="704769989"/>
+        <p14:creationId xmlns:p14="http://schemas.microsoft.com/office/powerpoint/2010/main" xmlns:p="http://schemas.openxmlformats.org/presentationml/2006/main" xmlns:r="http://schemas.openxmlformats.org/officeDocument/2006/relationships" xmlns:a="http://schemas.openxmlformats.org/drawingml/2006/main" xmlns="" val="704769989"/>
       </p:ext>
     </p:extLst>
   </p:cSld>
@@ -6474,7 +7016,7 @@
 </file>
 
 <file path=ppt/slides/slide2.xml><?xml version="1.0" encoding="utf-8"?>
-<p:sld xmlns:a="http://schemas.openxmlformats.org/drawingml/2006/main" xmlns:r="http://schemas.openxmlformats.org/officeDocument/2006/relationships" xmlns:p="http://schemas.openxmlformats.org/presentationml/2006/main">
+<p:sld xmlns:a="http://schemas.openxmlformats.org/drawingml/2006/main" xmlns:r="http://schemas.openxmlformats.org/officeDocument/2006/relationships" xmlns:mc="http://schemas.openxmlformats.org/markup-compatibility/2006" xmlns:mv="urn:schemas-microsoft-com:mac:vml" xmlns:p="http://schemas.openxmlformats.org/presentationml/2006/main" mc:Ignorable="mv" mc:PreserveAttributes="mv:*">
   <p:cSld>
     <p:spTree>
       <p:nvGrpSpPr>
@@ -6667,7 +7209,7 @@
     </p:spTree>
     <p:extLst>
       <p:ext uri="{BB962C8B-B14F-4D97-AF65-F5344CB8AC3E}">
-        <p14:creationId xmlns:p14="http://schemas.microsoft.com/office/powerpoint/2010/main" val="468957901"/>
+        <p14:creationId xmlns:p14="http://schemas.microsoft.com/office/powerpoint/2010/main" xmlns:p="http://schemas.openxmlformats.org/presentationml/2006/main" xmlns:r="http://schemas.openxmlformats.org/officeDocument/2006/relationships" xmlns:a="http://schemas.openxmlformats.org/drawingml/2006/main" xmlns="" val="468957901"/>
       </p:ext>
     </p:extLst>
   </p:cSld>
@@ -6688,7 +7230,7 @@
 </file>
 
 <file path=ppt/slides/slide3.xml><?xml version="1.0" encoding="utf-8"?>
-<p:sld xmlns:a="http://schemas.openxmlformats.org/drawingml/2006/main" xmlns:r="http://schemas.openxmlformats.org/officeDocument/2006/relationships" xmlns:p="http://schemas.openxmlformats.org/presentationml/2006/main">
+<p:sld xmlns:a="http://schemas.openxmlformats.org/drawingml/2006/main" xmlns:r="http://schemas.openxmlformats.org/officeDocument/2006/relationships" xmlns:mc="http://schemas.openxmlformats.org/markup-compatibility/2006" xmlns:mv="urn:schemas-microsoft-com:mac:vml" xmlns:p="http://schemas.openxmlformats.org/presentationml/2006/main" mc:Ignorable="mv" mc:PreserveAttributes="mv:*">
   <p:cSld>
     <p:spTree>
       <p:nvGrpSpPr>
@@ -6813,7 +7355,27 @@
             <a:pPr lvl="2"/>
             <a:r>
               <a:rPr lang="en-US" sz="2600" dirty="0" smtClean="0"/>
-              <a:t>91 attributes (year, 12 mean timbre feature, 38 </a:t>
+              <a:t>91 attributes (year, 12 mean timbre </a:t>
+            </a:r>
+            <a:r>
+              <a:rPr lang="en-US" sz="2600" dirty="0" smtClean="0"/>
+              <a:t>feature</a:t>
+            </a:r>
+            <a:r>
+              <a:rPr sz="2600" dirty="0" smtClean="0"/>
+              <a:t>s</a:t>
+            </a:r>
+            <a:r>
+              <a:rPr lang="en-US" sz="2600" dirty="0" smtClean="0"/>
+              <a:t>, </a:t>
+            </a:r>
+            <a:r>
+              <a:rPr sz="2600" dirty="0" smtClean="0"/>
+              <a:t>7</a:t>
+            </a:r>
+            <a:r>
+              <a:rPr lang="en-US" sz="2600" dirty="0" smtClean="0"/>
+              <a:t>8 </a:t>
             </a:r>
             <a:r>
               <a:rPr lang="en-US" sz="2600" dirty="0" err="1" smtClean="0"/>
@@ -6853,9 +7415,17 @@
             <a:pPr lvl="2"/>
             <a:r>
               <a:rPr lang="en-US" sz="2600" dirty="0" smtClean="0"/>
-              <a:t>Reduce size</a:t>
-            </a:r>
-            <a:endParaRPr lang="en-US" sz="2600" dirty="0"/>
+              <a:t>Reduce</a:t>
+            </a:r>
+            <a:r>
+              <a:rPr lang="en-US" sz="2600" dirty="0" smtClean="0"/>
+              <a:t> </a:t>
+            </a:r>
+            <a:r>
+              <a:rPr sz="2600" dirty="0" smtClean="0"/>
+              <a:t>dimensionality of data set</a:t>
+            </a:r>
+            <a:endParaRPr lang="en-US" sz="2600" dirty="0" smtClean="0"/>
           </a:p>
           <a:p>
             <a:pPr lvl="2"/>
@@ -6866,7 +7436,7 @@
     </p:spTree>
     <p:extLst>
       <p:ext uri="{BB962C8B-B14F-4D97-AF65-F5344CB8AC3E}">
-        <p14:creationId xmlns:p14="http://schemas.microsoft.com/office/powerpoint/2010/main" val="315625226"/>
+        <p14:creationId xmlns:p14="http://schemas.microsoft.com/office/powerpoint/2010/main" xmlns:p="http://schemas.openxmlformats.org/presentationml/2006/main" xmlns:r="http://schemas.openxmlformats.org/officeDocument/2006/relationships" xmlns:a="http://schemas.openxmlformats.org/drawingml/2006/main" xmlns="" val="315625226"/>
       </p:ext>
     </p:extLst>
   </p:cSld>
@@ -6887,7 +7457,7 @@
 </file>
 
 <file path=ppt/slides/slide4.xml><?xml version="1.0" encoding="utf-8"?>
-<p:sld xmlns:a="http://schemas.openxmlformats.org/drawingml/2006/main" xmlns:r="http://schemas.openxmlformats.org/officeDocument/2006/relationships" xmlns:p="http://schemas.openxmlformats.org/presentationml/2006/main">
+<p:sld xmlns:a="http://schemas.openxmlformats.org/drawingml/2006/main" xmlns:r="http://schemas.openxmlformats.org/officeDocument/2006/relationships" xmlns:mc="http://schemas.openxmlformats.org/markup-compatibility/2006" xmlns:mv="urn:schemas-microsoft-com:mac:vml" xmlns:p="http://schemas.openxmlformats.org/presentationml/2006/main" mc:Ignorable="mv" mc:PreserveAttributes="mv:*">
   <p:cSld>
     <p:spTree>
       <p:nvGrpSpPr>
@@ -7003,7 +7573,7 @@
     </p:spTree>
     <p:extLst>
       <p:ext uri="{BB962C8B-B14F-4D97-AF65-F5344CB8AC3E}">
-        <p14:creationId xmlns:p14="http://schemas.microsoft.com/office/powerpoint/2010/main" val="355273917"/>
+        <p14:creationId xmlns:p14="http://schemas.microsoft.com/office/powerpoint/2010/main" xmlns:p="http://schemas.openxmlformats.org/presentationml/2006/main" xmlns:r="http://schemas.openxmlformats.org/officeDocument/2006/relationships" xmlns:a="http://schemas.openxmlformats.org/drawingml/2006/main" xmlns="" val="355273917"/>
       </p:ext>
     </p:extLst>
   </p:cSld>
@@ -7017,7 +7587,7 @@
 </file>
 
 <file path=ppt/slides/slide5.xml><?xml version="1.0" encoding="utf-8"?>
-<p:sld xmlns:a="http://schemas.openxmlformats.org/drawingml/2006/main" xmlns:r="http://schemas.openxmlformats.org/officeDocument/2006/relationships" xmlns:p="http://schemas.openxmlformats.org/presentationml/2006/main">
+<p:sld xmlns:a="http://schemas.openxmlformats.org/drawingml/2006/main" xmlns:r="http://schemas.openxmlformats.org/officeDocument/2006/relationships" xmlns:mc="http://schemas.openxmlformats.org/markup-compatibility/2006" xmlns:mv="urn:schemas-microsoft-com:mac:vml" xmlns:p="http://schemas.openxmlformats.org/presentationml/2006/main" mc:Ignorable="mv" mc:PreserveAttributes="mv:*">
   <p:cSld>
     <p:spTree>
       <p:nvGrpSpPr>
@@ -7133,7 +7703,7 @@
     </p:spTree>
     <p:extLst>
       <p:ext uri="{BB962C8B-B14F-4D97-AF65-F5344CB8AC3E}">
-        <p14:creationId xmlns:p14="http://schemas.microsoft.com/office/powerpoint/2010/main" val="2591775415"/>
+        <p14:creationId xmlns:p14="http://schemas.microsoft.com/office/powerpoint/2010/main" xmlns:p="http://schemas.openxmlformats.org/presentationml/2006/main" xmlns:r="http://schemas.openxmlformats.org/officeDocument/2006/relationships" xmlns:a="http://schemas.openxmlformats.org/drawingml/2006/main" xmlns="" val="2591775415"/>
       </p:ext>
     </p:extLst>
   </p:cSld>
@@ -7147,7 +7717,7 @@
 </file>
 
 <file path=ppt/slides/slide6.xml><?xml version="1.0" encoding="utf-8"?>
-<p:sld xmlns:a="http://schemas.openxmlformats.org/drawingml/2006/main" xmlns:r="http://schemas.openxmlformats.org/officeDocument/2006/relationships" xmlns:p="http://schemas.openxmlformats.org/presentationml/2006/main">
+<p:sld xmlns:a="http://schemas.openxmlformats.org/drawingml/2006/main" xmlns:r="http://schemas.openxmlformats.org/officeDocument/2006/relationships" xmlns:mc="http://schemas.openxmlformats.org/markup-compatibility/2006" xmlns:mv="urn:schemas-microsoft-com:mac:vml" xmlns:p="http://schemas.openxmlformats.org/presentationml/2006/main" mc:Ignorable="mv" mc:PreserveAttributes="mv:*">
   <p:cSld>
     <p:spTree>
       <p:nvGrpSpPr>
@@ -7263,7 +7833,7 @@
     </p:spTree>
     <p:extLst>
       <p:ext uri="{BB962C8B-B14F-4D97-AF65-F5344CB8AC3E}">
-        <p14:creationId xmlns:p14="http://schemas.microsoft.com/office/powerpoint/2010/main" val="206703692"/>
+        <p14:creationId xmlns:p14="http://schemas.microsoft.com/office/powerpoint/2010/main" xmlns:p="http://schemas.openxmlformats.org/presentationml/2006/main" xmlns:r="http://schemas.openxmlformats.org/officeDocument/2006/relationships" xmlns:a="http://schemas.openxmlformats.org/drawingml/2006/main" xmlns="" val="206703692"/>
       </p:ext>
     </p:extLst>
   </p:cSld>
@@ -7277,7 +7847,7 @@
 </file>
 
 <file path=ppt/slides/slide7.xml><?xml version="1.0" encoding="utf-8"?>
-<p:sld xmlns:a="http://schemas.openxmlformats.org/drawingml/2006/main" xmlns:r="http://schemas.openxmlformats.org/officeDocument/2006/relationships" xmlns:p="http://schemas.openxmlformats.org/presentationml/2006/main">
+<p:sld xmlns:a="http://schemas.openxmlformats.org/drawingml/2006/main" xmlns:r="http://schemas.openxmlformats.org/officeDocument/2006/relationships" xmlns:mc="http://schemas.openxmlformats.org/markup-compatibility/2006" xmlns:mv="urn:schemas-microsoft-com:mac:vml" xmlns:p="http://schemas.openxmlformats.org/presentationml/2006/main" mc:Ignorable="mv" mc:PreserveAttributes="mv:*">
   <p:cSld>
     <p:spTree>
       <p:nvGrpSpPr>
@@ -7293,6 +7863,43 @@
           <a:chExt cx="0" cy="0"/>
         </a:xfrm>
       </p:grpSpPr>
+      <p:pic>
+        <p:nvPicPr>
+          <p:cNvPr id="6" name="Content Placeholder 5" descr="year_dist.pdf"/>
+          <p:cNvPicPr>
+            <a:picLocks noGrp="1" noChangeAspect="1"/>
+          </p:cNvPicPr>
+          <p:nvPr>
+            <p:ph idx="1"/>
+          </p:nvPr>
+        </p:nvPicPr>
+        <mc:AlternateContent>
+          <mc:Choice xmlns:ma="http://schemas.microsoft.com/office/mac/drawingml/2008/main" Requires="ma">
+            <p:blipFill>
+              <a:blip r:embed="rId3"/>
+              <a:srcRect l="-2632" r="-2632"/>
+              <a:stretch>
+                <a:fillRect/>
+              </a:stretch>
+            </p:blipFill>
+          </mc:Choice>
+          <mc:Fallback>
+            <p:blipFill>
+              <a:blip r:embed="rId4"/>
+              <a:srcRect l="-2632" r="-2632"/>
+              <a:stretch>
+                <a:fillRect/>
+              </a:stretch>
+            </p:blipFill>
+          </mc:Fallback>
+        </mc:AlternateContent>
+        <p:spPr>
+          <a:xfrm>
+            <a:off x="228600" y="1143000"/>
+            <a:ext cx="8686800" cy="4584700"/>
+          </a:xfrm>
+        </p:spPr>
+      </p:pic>
       <p:sp>
         <p:nvSpPr>
           <p:cNvPr id="2" name="Title 1"/>
@@ -7313,25 +7920,6 @@
               <a:t>Findings</a:t>
             </a:r>
             <a:endParaRPr lang="en-US" sz="4400" dirty="0"/>
-          </a:p>
-        </p:txBody>
-      </p:sp>
-      <p:sp>
-        <p:nvSpPr>
-          <p:cNvPr id="3" name="Content Placeholder 2"/>
-          <p:cNvSpPr>
-            <a:spLocks noGrp="1"/>
-          </p:cNvSpPr>
-          <p:nvPr>
-            <p:ph idx="1"/>
-          </p:nvPr>
-        </p:nvSpPr>
-        <p:spPr/>
-        <p:txBody>
-          <a:bodyPr/>
-          <a:lstStyle/>
-          <a:p>
-            <a:endParaRPr lang="en-US" dirty="0"/>
           </a:p>
         </p:txBody>
       </p:sp>
@@ -7393,7 +7981,7 @@
     </p:spTree>
     <p:extLst>
       <p:ext uri="{BB962C8B-B14F-4D97-AF65-F5344CB8AC3E}">
-        <p14:creationId xmlns:p14="http://schemas.microsoft.com/office/powerpoint/2010/main" val="3170237878"/>
+        <p14:creationId xmlns:p14="http://schemas.microsoft.com/office/powerpoint/2010/main" xmlns:p="http://schemas.openxmlformats.org/presentationml/2006/main" xmlns:r="http://schemas.openxmlformats.org/officeDocument/2006/relationships" xmlns:a="http://schemas.openxmlformats.org/drawingml/2006/main" xmlns="" val="3170237878"/>
       </p:ext>
     </p:extLst>
   </p:cSld>
@@ -7403,11 +7991,18 @@
   <p:transition>
     <p:fade/>
   </p:transition>
+  <p:timing>
+    <p:tnLst>
+      <p:par>
+        <p:cTn id="1" dur="indefinite" restart="never" nodeType="tmRoot"/>
+      </p:par>
+    </p:tnLst>
+  </p:timing>
 </p:sld>
 </file>
 
 <file path=ppt/slides/slide8.xml><?xml version="1.0" encoding="utf-8"?>
-<p:sld xmlns:a="http://schemas.openxmlformats.org/drawingml/2006/main" xmlns:r="http://schemas.openxmlformats.org/officeDocument/2006/relationships" xmlns:p="http://schemas.openxmlformats.org/presentationml/2006/main">
+<p:sld xmlns:a="http://schemas.openxmlformats.org/drawingml/2006/main" xmlns:r="http://schemas.openxmlformats.org/officeDocument/2006/relationships" xmlns:mc="http://schemas.openxmlformats.org/markup-compatibility/2006" xmlns:mv="urn:schemas-microsoft-com:mac:vml" xmlns:p="http://schemas.openxmlformats.org/presentationml/2006/main" mc:Ignorable="mv" mc:PreserveAttributes="mv:*">
   <p:cSld>
     <p:spTree>
       <p:nvGrpSpPr>
@@ -7423,6 +8018,43 @@
           <a:chExt cx="0" cy="0"/>
         </a:xfrm>
       </p:grpSpPr>
+      <p:pic>
+        <p:nvPicPr>
+          <p:cNvPr id="10" name="Content Placeholder 9" descr="predict_plot.pdf"/>
+          <p:cNvPicPr>
+            <a:picLocks noGrp="1" noChangeAspect="1"/>
+          </p:cNvPicPr>
+          <p:nvPr>
+            <p:ph idx="1"/>
+          </p:nvPr>
+        </p:nvPicPr>
+        <mc:AlternateContent>
+          <mc:Choice xmlns:ma="http://schemas.microsoft.com/office/mac/drawingml/2008/main" Requires="ma">
+            <p:blipFill>
+              <a:blip r:embed="rId3"/>
+              <a:srcRect l="-2632" r="-2632"/>
+              <a:stretch>
+                <a:fillRect/>
+              </a:stretch>
+            </p:blipFill>
+          </mc:Choice>
+          <mc:Fallback>
+            <p:blipFill>
+              <a:blip r:embed="rId4"/>
+              <a:srcRect l="-2632" r="-2632"/>
+              <a:stretch>
+                <a:fillRect/>
+              </a:stretch>
+            </p:blipFill>
+          </mc:Fallback>
+        </mc:AlternateContent>
+        <p:spPr>
+          <a:xfrm>
+            <a:off x="152400" y="1066800"/>
+            <a:ext cx="8915400" cy="4705350"/>
+          </a:xfrm>
+        </p:spPr>
+      </p:pic>
       <p:sp>
         <p:nvSpPr>
           <p:cNvPr id="2" name="Title 1"/>
@@ -7439,8 +8071,8 @@
           <a:lstStyle/>
           <a:p>
             <a:r>
-              <a:rPr lang="en-US" sz="4400" dirty="0" smtClean="0"/>
-              <a:t>Assumptions &amp; Limitations</a:t>
+              <a:rPr sz="4400" dirty="0" smtClean="0"/>
+              <a:t>Findings</a:t>
             </a:r>
             <a:endParaRPr lang="en-US" sz="4400" dirty="0"/>
           </a:p>
@@ -7448,12 +8080,12 @@
       </p:sp>
       <p:sp>
         <p:nvSpPr>
-          <p:cNvPr id="3" name="Content Placeholder 2"/>
-          <p:cNvSpPr>
-            <a:spLocks noGrp="1"/>
-          </p:cNvSpPr>
-          <p:nvPr>
-            <p:ph idx="1"/>
+          <p:cNvPr id="4" name="Date Placeholder 3"/>
+          <p:cNvSpPr>
+            <a:spLocks noGrp="1"/>
+          </p:cNvSpPr>
+          <p:nvPr>
+            <p:ph type="dt" sz="half" idx="10"/>
           </p:nvPr>
         </p:nvSpPr>
         <p:spPr/>
@@ -7461,33 +8093,17 @@
           <a:bodyPr/>
           <a:lstStyle/>
           <a:p>
-            <a:endParaRPr lang="en-US" dirty="0"/>
-          </a:p>
-        </p:txBody>
-      </p:sp>
-      <p:sp>
-        <p:nvSpPr>
-          <p:cNvPr id="4" name="Date Placeholder 3"/>
-          <p:cNvSpPr>
-            <a:spLocks noGrp="1"/>
-          </p:cNvSpPr>
-          <p:nvPr>
-            <p:ph type="dt" sz="half" idx="10"/>
-          </p:nvPr>
-        </p:nvSpPr>
-        <p:spPr/>
-        <p:txBody>
-          <a:bodyPr/>
-          <a:lstStyle/>
-          <a:p>
             <a:pPr>
               <a:defRPr/>
             </a:pPr>
-            <a:r>
-              <a:rPr lang="en-US" dirty="0" smtClean="0"/>
-              <a:t>June 2, 2014</a:t>
-            </a:r>
-            <a:endParaRPr lang="en-US" dirty="0"/>
+            <a:fld id="{9FA58BE5-6E22-0540-8A03-007D680D93DA}" type="datetime4">
+              <a:rPr lang="en-US" smtClean="0"/>
+              <a:pPr>
+                <a:defRPr/>
+              </a:pPr>
+              <a:t>June 1, 2014</a:t>
+            </a:fld>
+            <a:endParaRPr lang="en-US"/>
           </a:p>
         </p:txBody>
       </p:sp>
@@ -7521,23 +8137,22 @@
         </p:txBody>
       </p:sp>
     </p:spTree>
-    <p:extLst>
-      <p:ext uri="{BB962C8B-B14F-4D97-AF65-F5344CB8AC3E}">
-        <p14:creationId xmlns:p14="http://schemas.microsoft.com/office/powerpoint/2010/main" val="2860658135"/>
-      </p:ext>
-    </p:extLst>
   </p:cSld>
   <p:clrMapOvr>
     <a:masterClrMapping/>
   </p:clrMapOvr>
-  <p:transition>
-    <p:fade/>
-  </p:transition>
+  <p:timing>
+    <p:tnLst>
+      <p:par>
+        <p:cTn id="1" dur="indefinite" restart="never" nodeType="tmRoot"/>
+      </p:par>
+    </p:tnLst>
+  </p:timing>
 </p:sld>
 </file>
 
 <file path=ppt/slides/slide9.xml><?xml version="1.0" encoding="utf-8"?>
-<p:sld xmlns:a="http://schemas.openxmlformats.org/drawingml/2006/main" xmlns:r="http://schemas.openxmlformats.org/officeDocument/2006/relationships" xmlns:p="http://schemas.openxmlformats.org/presentationml/2006/main">
+<p:sld xmlns:a="http://schemas.openxmlformats.org/drawingml/2006/main" xmlns:r="http://schemas.openxmlformats.org/officeDocument/2006/relationships" xmlns:mc="http://schemas.openxmlformats.org/markup-compatibility/2006" xmlns:mv="urn:schemas-microsoft-com:mac:vml" xmlns:p="http://schemas.openxmlformats.org/presentationml/2006/main" mc:Ignorable="mv" mc:PreserveAttributes="mv:*">
   <p:cSld>
     <p:spTree>
       <p:nvGrpSpPr>
@@ -7553,6 +8168,43 @@
           <a:chExt cx="0" cy="0"/>
         </a:xfrm>
       </p:grpSpPr>
+      <p:pic>
+        <p:nvPicPr>
+          <p:cNvPr id="6" name="Content Placeholder 5" descr="plot_resids.pdf"/>
+          <p:cNvPicPr>
+            <a:picLocks noGrp="1" noChangeAspect="1"/>
+          </p:cNvPicPr>
+          <p:nvPr>
+            <p:ph idx="1"/>
+          </p:nvPr>
+        </p:nvPicPr>
+        <mc:AlternateContent>
+          <mc:Choice xmlns:ma="http://schemas.microsoft.com/office/mac/drawingml/2008/main" Requires="ma">
+            <p:blipFill>
+              <a:blip r:embed="rId3"/>
+              <a:srcRect l="-2632" r="-2632"/>
+              <a:stretch>
+                <a:fillRect/>
+              </a:stretch>
+            </p:blipFill>
+          </mc:Choice>
+          <mc:Fallback>
+            <p:blipFill>
+              <a:blip r:embed="rId4"/>
+              <a:srcRect l="-2632" r="-2632"/>
+              <a:stretch>
+                <a:fillRect/>
+              </a:stretch>
+            </p:blipFill>
+          </mc:Fallback>
+        </mc:AlternateContent>
+        <p:spPr>
+          <a:xfrm>
+            <a:off x="184484" y="1143000"/>
+            <a:ext cx="8807116" cy="4648200"/>
+          </a:xfrm>
+        </p:spPr>
+      </p:pic>
       <p:sp>
         <p:nvSpPr>
           <p:cNvPr id="2" name="Title 1"/>
@@ -7569,8 +8221,8 @@
           <a:lstStyle/>
           <a:p>
             <a:r>
-              <a:rPr lang="en-US" sz="4400" dirty="0" smtClean="0"/>
-              <a:t>Scalability </a:t>
+              <a:rPr sz="4400" dirty="0" smtClean="0"/>
+              <a:t>Findings</a:t>
             </a:r>
             <a:endParaRPr lang="en-US" sz="4400" dirty="0"/>
           </a:p>
@@ -7578,12 +8230,12 @@
       </p:sp>
       <p:sp>
         <p:nvSpPr>
-          <p:cNvPr id="3" name="Content Placeholder 2"/>
-          <p:cNvSpPr>
-            <a:spLocks noGrp="1"/>
-          </p:cNvSpPr>
-          <p:nvPr>
-            <p:ph idx="1"/>
+          <p:cNvPr id="4" name="Date Placeholder 3"/>
+          <p:cNvSpPr>
+            <a:spLocks noGrp="1"/>
+          </p:cNvSpPr>
+          <p:nvPr>
+            <p:ph type="dt" sz="half" idx="10"/>
           </p:nvPr>
         </p:nvSpPr>
         <p:spPr/>
@@ -7591,43 +8243,17 @@
           <a:bodyPr/>
           <a:lstStyle/>
           <a:p>
-            <a:r>
-              <a:rPr lang="en-US" sz="3200" dirty="0" smtClean="0"/>
-              <a:t>Practiced with small subset (10,000 songs)</a:t>
-            </a:r>
-          </a:p>
-          <a:p>
-            <a:r>
-              <a:rPr lang="en-US" sz="3200" dirty="0" smtClean="0"/>
-              <a:t>Revealed same number of PCs as full data set (515,345 songs) with 80% of variance explained.</a:t>
-            </a:r>
-            <a:endParaRPr lang="en-US" sz="3200" dirty="0"/>
-          </a:p>
-        </p:txBody>
-      </p:sp>
-      <p:sp>
-        <p:nvSpPr>
-          <p:cNvPr id="4" name="Date Placeholder 3"/>
-          <p:cNvSpPr>
-            <a:spLocks noGrp="1"/>
-          </p:cNvSpPr>
-          <p:nvPr>
-            <p:ph type="dt" sz="half" idx="10"/>
-          </p:nvPr>
-        </p:nvSpPr>
-        <p:spPr/>
-        <p:txBody>
-          <a:bodyPr/>
-          <a:lstStyle/>
-          <a:p>
             <a:pPr>
               <a:defRPr/>
             </a:pPr>
-            <a:r>
-              <a:rPr lang="en-US" dirty="0" smtClean="0"/>
-              <a:t>June 2, 2014</a:t>
-            </a:r>
-            <a:endParaRPr lang="en-US" dirty="0"/>
+            <a:fld id="{9FA58BE5-6E22-0540-8A03-007D680D93DA}" type="datetime4">
+              <a:rPr lang="en-US" smtClean="0"/>
+              <a:pPr>
+                <a:defRPr/>
+              </a:pPr>
+              <a:t>June 1, 2014</a:t>
+            </a:fld>
+            <a:endParaRPr lang="en-US"/>
           </a:p>
         </p:txBody>
       </p:sp>
@@ -7661,18 +8287,17 @@
         </p:txBody>
       </p:sp>
     </p:spTree>
-    <p:extLst>
-      <p:ext uri="{BB962C8B-B14F-4D97-AF65-F5344CB8AC3E}">
-        <p14:creationId xmlns:p14="http://schemas.microsoft.com/office/powerpoint/2010/main" val="655401942"/>
-      </p:ext>
-    </p:extLst>
   </p:cSld>
   <p:clrMapOvr>
     <a:masterClrMapping/>
   </p:clrMapOvr>
-  <p:transition>
-    <p:fade/>
-  </p:transition>
+  <p:timing>
+    <p:tnLst>
+      <p:par>
+        <p:cTn id="1" dur="indefinite" restart="never" nodeType="tmRoot"/>
+      </p:par>
+    </p:tnLst>
+  </p:timing>
 </p:sld>
 </file>
 

</xml_diff>

<commit_message>
modified presentation and sorry andy I had to create a .docx of our final report b/c formatting purposes
</commit_message>
<xml_diff>
--- a/Project3_presentation.pptx
+++ b/Project3_presentation.pptx
@@ -1,6 +1,6 @@
 
 <file path=ppt/presentation.xml><?xml version="1.0" encoding="utf-8"?>
-<p:presentation xmlns:a="http://schemas.openxmlformats.org/drawingml/2006/main" xmlns:r="http://schemas.openxmlformats.org/officeDocument/2006/relationships" xmlns:mc="http://schemas.openxmlformats.org/markup-compatibility/2006" xmlns:mv="urn:schemas-microsoft-com:mac:vml" xmlns:p="http://schemas.openxmlformats.org/presentationml/2006/main" mc:Ignorable="mv" mc:PreserveAttributes="mv:*" saveSubsetFonts="1">
+<p:presentation xmlns:a="http://schemas.openxmlformats.org/drawingml/2006/main" xmlns:r="http://schemas.openxmlformats.org/officeDocument/2006/relationships" xmlns:p="http://schemas.openxmlformats.org/presentationml/2006/main" saveSubsetFonts="1">
   <p:sldMasterIdLst>
     <p:sldMasterId id="2147483660" r:id="rId1"/>
   </p:sldMasterIdLst>
@@ -122,7 +122,7 @@
 </file>
 
 <file path=ppt/notesMasters/notesMaster1.xml><?xml version="1.0" encoding="utf-8"?>
-<p:notesMaster xmlns:a="http://schemas.openxmlformats.org/drawingml/2006/main" xmlns:r="http://schemas.openxmlformats.org/officeDocument/2006/relationships" xmlns:mc="http://schemas.openxmlformats.org/markup-compatibility/2006" xmlns:mv="urn:schemas-microsoft-com:mac:vml" xmlns:p="http://schemas.openxmlformats.org/presentationml/2006/main" mc:Ignorable="mv" mc:PreserveAttributes="mv:*">
+<p:notesMaster xmlns:a="http://schemas.openxmlformats.org/drawingml/2006/main" xmlns:r="http://schemas.openxmlformats.org/officeDocument/2006/relationships" xmlns:p="http://schemas.openxmlformats.org/presentationml/2006/main">
   <p:cSld>
     <p:bg>
       <p:bgRef idx="1001">
@@ -204,7 +204,7 @@
             <a:fld id="{75E2F141-3BF4-41B4-8A22-B2C832AFABE3}" type="datetimeFigureOut">
               <a:rPr lang="en-US" smtClean="0"/>
               <a:pPr/>
-              <a:t>5/31/14</a:t>
+              <a:t>6/1/2014</a:t>
             </a:fld>
             <a:endParaRPr lang="en-US"/>
           </a:p>
@@ -373,7 +373,7 @@
     </p:spTree>
     <p:extLst>
       <p:ext uri="{BB962C8B-B14F-4D97-AF65-F5344CB8AC3E}">
-        <p14:creationId xmlns:p14="http://schemas.microsoft.com/office/powerpoint/2010/main" xmlns:p="http://schemas.openxmlformats.org/presentationml/2006/main" xmlns:r="http://schemas.openxmlformats.org/officeDocument/2006/relationships" xmlns:a="http://schemas.openxmlformats.org/drawingml/2006/main" xmlns="" val="387075886"/>
+        <p14:creationId xmlns:p14="http://schemas.microsoft.com/office/powerpoint/2010/main" val="387075886"/>
       </p:ext>
     </p:extLst>
   </p:cSld>
@@ -474,7 +474,7 @@
 </file>
 
 <file path=ppt/notesSlides/notesSlide1.xml><?xml version="1.0" encoding="utf-8"?>
-<p:notes xmlns:a="http://schemas.openxmlformats.org/drawingml/2006/main" xmlns:r="http://schemas.openxmlformats.org/officeDocument/2006/relationships" xmlns:mc="http://schemas.openxmlformats.org/markup-compatibility/2006" xmlns:mv="urn:schemas-microsoft-com:mac:vml" xmlns:p="http://schemas.openxmlformats.org/presentationml/2006/main" mc:Ignorable="mv" mc:PreserveAttributes="mv:*">
+<p:notes xmlns:a="http://schemas.openxmlformats.org/drawingml/2006/main" xmlns:r="http://schemas.openxmlformats.org/officeDocument/2006/relationships" xmlns:p="http://schemas.openxmlformats.org/presentationml/2006/main">
   <p:cSld>
     <p:spTree>
       <p:nvGrpSpPr>
@@ -561,7 +561,7 @@
     </p:spTree>
     <p:extLst>
       <p:ext uri="{BB962C8B-B14F-4D97-AF65-F5344CB8AC3E}">
-        <p14:creationId xmlns:p14="http://schemas.microsoft.com/office/powerpoint/2010/main" xmlns:p="http://schemas.openxmlformats.org/presentationml/2006/main" xmlns:r="http://schemas.openxmlformats.org/officeDocument/2006/relationships" xmlns:a="http://schemas.openxmlformats.org/drawingml/2006/main" xmlns="" val="3839019637"/>
+        <p14:creationId xmlns:p14="http://schemas.microsoft.com/office/powerpoint/2010/main" val="3839019637"/>
       </p:ext>
     </p:extLst>
   </p:cSld>
@@ -572,7 +572,7 @@
 </file>
 
 <file path=ppt/notesSlides/notesSlide2.xml><?xml version="1.0" encoding="utf-8"?>
-<p:notes xmlns:a="http://schemas.openxmlformats.org/drawingml/2006/main" xmlns:r="http://schemas.openxmlformats.org/officeDocument/2006/relationships" xmlns:mc="http://schemas.openxmlformats.org/markup-compatibility/2006" xmlns:mv="urn:schemas-microsoft-com:mac:vml" xmlns:p="http://schemas.openxmlformats.org/presentationml/2006/main" mc:Ignorable="mv" mc:PreserveAttributes="mv:*">
+<p:notes xmlns:a="http://schemas.openxmlformats.org/drawingml/2006/main" xmlns:r="http://schemas.openxmlformats.org/officeDocument/2006/relationships" xmlns:p="http://schemas.openxmlformats.org/presentationml/2006/main">
   <p:cSld>
     <p:spTree>
       <p:nvGrpSpPr>
@@ -657,7 +657,7 @@
     </p:spTree>
     <p:extLst>
       <p:ext uri="{BB962C8B-B14F-4D97-AF65-F5344CB8AC3E}">
-        <p14:creationId xmlns:p14="http://schemas.microsoft.com/office/powerpoint/2010/main" xmlns:p="http://schemas.openxmlformats.org/presentationml/2006/main" xmlns:r="http://schemas.openxmlformats.org/officeDocument/2006/relationships" xmlns:a="http://schemas.openxmlformats.org/drawingml/2006/main" xmlns="" val="847528997"/>
+        <p14:creationId xmlns:p14="http://schemas.microsoft.com/office/powerpoint/2010/main" val="847528997"/>
       </p:ext>
     </p:extLst>
   </p:cSld>
@@ -668,7 +668,7 @@
 </file>
 
 <file path=ppt/notesSlides/notesSlide3.xml><?xml version="1.0" encoding="utf-8"?>
-<p:notes xmlns:a="http://schemas.openxmlformats.org/drawingml/2006/main" xmlns:r="http://schemas.openxmlformats.org/officeDocument/2006/relationships" xmlns:mc="http://schemas.openxmlformats.org/markup-compatibility/2006" xmlns:mv="urn:schemas-microsoft-com:mac:vml" xmlns:p="http://schemas.openxmlformats.org/presentationml/2006/main" mc:Ignorable="mv" mc:PreserveAttributes="mv:*">
+<p:notes xmlns:a="http://schemas.openxmlformats.org/drawingml/2006/main" xmlns:r="http://schemas.openxmlformats.org/officeDocument/2006/relationships" xmlns:p="http://schemas.openxmlformats.org/presentationml/2006/main">
   <p:cSld>
     <p:spTree>
       <p:nvGrpSpPr>
@@ -785,7 +785,7 @@
     </p:spTree>
     <p:extLst>
       <p:ext uri="{BB962C8B-B14F-4D97-AF65-F5344CB8AC3E}">
-        <p14:creationId xmlns:p14="http://schemas.microsoft.com/office/powerpoint/2010/main" xmlns:p="http://schemas.openxmlformats.org/presentationml/2006/main" xmlns:r="http://schemas.openxmlformats.org/officeDocument/2006/relationships" xmlns:a="http://schemas.openxmlformats.org/drawingml/2006/main" xmlns="" val="1542757321"/>
+        <p14:creationId xmlns:p14="http://schemas.microsoft.com/office/powerpoint/2010/main" val="1542757321"/>
       </p:ext>
     </p:extLst>
   </p:cSld>
@@ -796,7 +796,7 @@
 </file>
 
 <file path=ppt/notesSlides/notesSlide4.xml><?xml version="1.0" encoding="utf-8"?>
-<p:notes xmlns:a="http://schemas.openxmlformats.org/drawingml/2006/main" xmlns:r="http://schemas.openxmlformats.org/officeDocument/2006/relationships" xmlns:mc="http://schemas.openxmlformats.org/markup-compatibility/2006" xmlns:mv="urn:schemas-microsoft-com:mac:vml" xmlns:p="http://schemas.openxmlformats.org/presentationml/2006/main" mc:Ignorable="mv" mc:PreserveAttributes="mv:*">
+<p:notes xmlns:a="http://schemas.openxmlformats.org/drawingml/2006/main" xmlns:r="http://schemas.openxmlformats.org/officeDocument/2006/relationships" xmlns:p="http://schemas.openxmlformats.org/presentationml/2006/main">
   <p:cSld>
     <p:spTree>
       <p:nvGrpSpPr>
@@ -882,7 +882,7 @@
 </file>
 
 <file path=ppt/notesSlides/notesSlide5.xml><?xml version="1.0" encoding="utf-8"?>
-<p:notes xmlns:a="http://schemas.openxmlformats.org/drawingml/2006/main" xmlns:r="http://schemas.openxmlformats.org/officeDocument/2006/relationships" xmlns:mc="http://schemas.openxmlformats.org/markup-compatibility/2006" xmlns:mv="urn:schemas-microsoft-com:mac:vml" xmlns:p="http://schemas.openxmlformats.org/presentationml/2006/main" mc:Ignorable="mv" mc:PreserveAttributes="mv:*">
+<p:notes xmlns:a="http://schemas.openxmlformats.org/drawingml/2006/main" xmlns:r="http://schemas.openxmlformats.org/officeDocument/2006/relationships" xmlns:p="http://schemas.openxmlformats.org/presentationml/2006/main">
   <p:cSld>
     <p:spTree>
       <p:nvGrpSpPr>
@@ -968,7 +968,7 @@
 </file>
 
 <file path=ppt/notesSlides/notesSlide6.xml><?xml version="1.0" encoding="utf-8"?>
-<p:notes xmlns:a="http://schemas.openxmlformats.org/drawingml/2006/main" xmlns:r="http://schemas.openxmlformats.org/officeDocument/2006/relationships" xmlns:mc="http://schemas.openxmlformats.org/markup-compatibility/2006" xmlns:mv="urn:schemas-microsoft-com:mac:vml" xmlns:p="http://schemas.openxmlformats.org/presentationml/2006/main" mc:Ignorable="mv" mc:PreserveAttributes="mv:*">
+<p:notes xmlns:a="http://schemas.openxmlformats.org/drawingml/2006/main" xmlns:r="http://schemas.openxmlformats.org/officeDocument/2006/relationships" xmlns:p="http://schemas.openxmlformats.org/presentationml/2006/main">
   <p:cSld>
     <p:spTree>
       <p:nvGrpSpPr>
@@ -1050,7 +1050,7 @@
 </file>
 
 <file path=ppt/notesSlides/notesSlide7.xml><?xml version="1.0" encoding="utf-8"?>
-<p:notes xmlns:a="http://schemas.openxmlformats.org/drawingml/2006/main" xmlns:r="http://schemas.openxmlformats.org/officeDocument/2006/relationships" xmlns:mc="http://schemas.openxmlformats.org/markup-compatibility/2006" xmlns:mv="urn:schemas-microsoft-com:mac:vml" xmlns:p="http://schemas.openxmlformats.org/presentationml/2006/main" mc:Ignorable="mv" mc:PreserveAttributes="mv:*">
+<p:notes xmlns:a="http://schemas.openxmlformats.org/drawingml/2006/main" xmlns:r="http://schemas.openxmlformats.org/officeDocument/2006/relationships" xmlns:p="http://schemas.openxmlformats.org/presentationml/2006/main">
   <p:cSld>
     <p:spTree>
       <p:nvGrpSpPr>
@@ -1124,7 +1124,7 @@
     </p:spTree>
     <p:extLst>
       <p:ext uri="{BB962C8B-B14F-4D97-AF65-F5344CB8AC3E}">
-        <p14:creationId xmlns:p14="http://schemas.microsoft.com/office/powerpoint/2010/main" xmlns:p="http://schemas.openxmlformats.org/presentationml/2006/main" xmlns:r="http://schemas.openxmlformats.org/officeDocument/2006/relationships" xmlns:a="http://schemas.openxmlformats.org/drawingml/2006/main" xmlns="" val="3886919401"/>
+        <p14:creationId xmlns:p14="http://schemas.microsoft.com/office/powerpoint/2010/main" val="3886919401"/>
       </p:ext>
     </p:extLst>
   </p:cSld>
@@ -1135,7 +1135,7 @@
 </file>
 
 <file path=ppt/slideLayouts/slideLayout1.xml><?xml version="1.0" encoding="utf-8"?>
-<p:sldLayout xmlns:a="http://schemas.openxmlformats.org/drawingml/2006/main" xmlns:r="http://schemas.openxmlformats.org/officeDocument/2006/relationships" xmlns:mc="http://schemas.openxmlformats.org/markup-compatibility/2006" xmlns:mv="urn:schemas-microsoft-com:mac:vml" xmlns:p="http://schemas.openxmlformats.org/presentationml/2006/main" mc:Ignorable="mv" mc:PreserveAttributes="mv:*" type="title" preserve="1">
+<p:sldLayout xmlns:a="http://schemas.openxmlformats.org/drawingml/2006/main" xmlns:r="http://schemas.openxmlformats.org/officeDocument/2006/relationships" xmlns:p="http://schemas.openxmlformats.org/presentationml/2006/main" type="title" preserve="1">
   <p:cSld name="Title Slide Option 1">
     <p:spTree>
       <p:nvGrpSpPr>
@@ -1175,7 +1175,7 @@
           </a:ln>
           <a:extLst>
             <a:ext uri="{91240B29-F687-4F45-9708-019B960494DF}">
-              <a14:hiddenLine xmlns:a14="http://schemas.microsoft.com/office/drawing/2010/main" xmlns:p="http://schemas.openxmlformats.org/presentationml/2006/main" xmlns:r="http://schemas.openxmlformats.org/officeDocument/2006/relationships" xmlns:a="http://schemas.openxmlformats.org/drawingml/2006/main" xmlns="" w="9525">
+              <a14:hiddenLine xmlns:a14="http://schemas.microsoft.com/office/drawing/2010/main" w="9525">
                 <a:solidFill>
                   <a:srgbClr val="000000"/>
                 </a:solidFill>
@@ -1231,7 +1231,7 @@
           </a:ln>
           <a:extLst>
             <a:ext uri="{91240B29-F687-4F45-9708-019B960494DF}">
-              <a14:hiddenLine xmlns:a14="http://schemas.microsoft.com/office/drawing/2010/main" xmlns:p="http://schemas.openxmlformats.org/presentationml/2006/main" xmlns:r="http://schemas.openxmlformats.org/officeDocument/2006/relationships" xmlns:a="http://schemas.openxmlformats.org/drawingml/2006/main" xmlns="" w="9525">
+              <a14:hiddenLine xmlns:a14="http://schemas.microsoft.com/office/drawing/2010/main" w="9525">
                 <a:solidFill>
                   <a:srgbClr val="000000"/>
                 </a:solidFill>
@@ -1275,7 +1275,7 @@
           <a:blip r:embed="rId2">
             <a:extLst>
               <a:ext uri="{28A0092B-C50C-407E-A947-70E740481C1C}">
-                <a14:useLocalDpi xmlns:a14="http://schemas.microsoft.com/office/drawing/2010/main" xmlns:p="http://schemas.openxmlformats.org/presentationml/2006/main" xmlns:r="http://schemas.openxmlformats.org/officeDocument/2006/relationships" xmlns:a="http://schemas.openxmlformats.org/drawingml/2006/main" xmlns="" val="0"/>
+                <a14:useLocalDpi xmlns:a14="http://schemas.microsoft.com/office/drawing/2010/main" val="0"/>
               </a:ext>
             </a:extLst>
           </a:blip>
@@ -1298,14 +1298,14 @@
           </a:ln>
           <a:extLst>
             <a:ext uri="{909E8E84-426E-40DD-AFC4-6F175D3DCCD1}">
-              <a14:hiddenFill xmlns:a14="http://schemas.microsoft.com/office/drawing/2010/main" xmlns:p="http://schemas.openxmlformats.org/presentationml/2006/main" xmlns:r="http://schemas.openxmlformats.org/officeDocument/2006/relationships" xmlns:a="http://schemas.openxmlformats.org/drawingml/2006/main" xmlns="">
+              <a14:hiddenFill xmlns:a14="http://schemas.microsoft.com/office/drawing/2010/main">
                 <a:solidFill>
                   <a:srgbClr val="FFFFFF"/>
                 </a:solidFill>
               </a14:hiddenFill>
             </a:ext>
             <a:ext uri="{91240B29-F687-4F45-9708-019B960494DF}">
-              <a14:hiddenLine xmlns:a14="http://schemas.microsoft.com/office/drawing/2010/main" xmlns:p="http://schemas.openxmlformats.org/presentationml/2006/main" xmlns:r="http://schemas.openxmlformats.org/officeDocument/2006/relationships" xmlns:a="http://schemas.openxmlformats.org/drawingml/2006/main" xmlns="" w="9525">
+              <a14:hiddenLine xmlns:a14="http://schemas.microsoft.com/office/drawing/2010/main" w="9525">
                 <a:solidFill>
                   <a:srgbClr val="000000"/>
                 </a:solidFill>
@@ -1395,7 +1395,7 @@
     </p:spTree>
     <p:extLst>
       <p:ext uri="{BB962C8B-B14F-4D97-AF65-F5344CB8AC3E}">
-        <p14:creationId xmlns:p14="http://schemas.microsoft.com/office/powerpoint/2010/main" xmlns:p="http://schemas.openxmlformats.org/presentationml/2006/main" xmlns:r="http://schemas.openxmlformats.org/officeDocument/2006/relationships" xmlns:a="http://schemas.openxmlformats.org/drawingml/2006/main" xmlns="" val="3300341227"/>
+        <p14:creationId xmlns:p14="http://schemas.microsoft.com/office/powerpoint/2010/main" val="3300341227"/>
       </p:ext>
     </p:extLst>
   </p:cSld>
@@ -1409,7 +1409,7 @@
 </file>
 
 <file path=ppt/slideLayouts/slideLayout10.xml><?xml version="1.0" encoding="utf-8"?>
-<p:sldLayout xmlns:a="http://schemas.openxmlformats.org/drawingml/2006/main" xmlns:r="http://schemas.openxmlformats.org/officeDocument/2006/relationships" xmlns:mc="http://schemas.openxmlformats.org/markup-compatibility/2006" xmlns:mv="urn:schemas-microsoft-com:mac:vml" xmlns:p="http://schemas.openxmlformats.org/presentationml/2006/main" mc:Ignorable="mv" mc:PreserveAttributes="mv:*" preserve="1" userDrawn="1">
+<p:sldLayout xmlns:a="http://schemas.openxmlformats.org/drawingml/2006/main" xmlns:r="http://schemas.openxmlformats.org/officeDocument/2006/relationships" xmlns:p="http://schemas.openxmlformats.org/presentationml/2006/main" preserve="1" userDrawn="1">
   <p:cSld name="1 column w/number">
     <p:spTree>
       <p:nvGrpSpPr>
@@ -1590,7 +1590,7 @@
               <a:pPr>
                 <a:defRPr/>
               </a:pPr>
-              <a:t>May 31, 2014</a:t>
+              <a:t>June 1, 2014</a:t>
             </a:fld>
             <a:endParaRPr lang="en-US"/>
           </a:p>
@@ -1658,7 +1658,7 @@
     </p:spTree>
     <p:extLst>
       <p:ext uri="{BB962C8B-B14F-4D97-AF65-F5344CB8AC3E}">
-        <p14:creationId xmlns:p14="http://schemas.microsoft.com/office/powerpoint/2010/main" xmlns:p="http://schemas.openxmlformats.org/presentationml/2006/main" xmlns:r="http://schemas.openxmlformats.org/officeDocument/2006/relationships" xmlns:a="http://schemas.openxmlformats.org/drawingml/2006/main" xmlns="" val="4144772904"/>
+        <p14:creationId xmlns:p14="http://schemas.microsoft.com/office/powerpoint/2010/main" val="4144772904"/>
       </p:ext>
     </p:extLst>
   </p:cSld>
@@ -1672,7 +1672,7 @@
 </file>
 
 <file path=ppt/slideLayouts/slideLayout11.xml><?xml version="1.0" encoding="utf-8"?>
-<p:sldLayout xmlns:a="http://schemas.openxmlformats.org/drawingml/2006/main" xmlns:r="http://schemas.openxmlformats.org/officeDocument/2006/relationships" xmlns:mc="http://schemas.openxmlformats.org/markup-compatibility/2006" xmlns:mv="urn:schemas-microsoft-com:mac:vml" xmlns:p="http://schemas.openxmlformats.org/presentationml/2006/main" mc:Ignorable="mv" mc:PreserveAttributes="mv:*" preserve="1" userDrawn="1">
+<p:sldLayout xmlns:a="http://schemas.openxmlformats.org/drawingml/2006/main" xmlns:r="http://schemas.openxmlformats.org/officeDocument/2006/relationships" xmlns:p="http://schemas.openxmlformats.org/presentationml/2006/main" preserve="1" userDrawn="1">
   <p:cSld name="1 column no bullets and thumbnail">
     <p:spTree>
       <p:nvGrpSpPr>
@@ -1888,7 +1888,7 @@
               <a:pPr>
                 <a:defRPr/>
               </a:pPr>
-              <a:t>May 31, 2014</a:t>
+              <a:t>June 1, 2014</a:t>
             </a:fld>
             <a:endParaRPr lang="en-US"/>
           </a:p>
@@ -1956,7 +1956,7 @@
     </p:spTree>
     <p:extLst>
       <p:ext uri="{BB962C8B-B14F-4D97-AF65-F5344CB8AC3E}">
-        <p14:creationId xmlns:p14="http://schemas.microsoft.com/office/powerpoint/2010/main" xmlns:p="http://schemas.openxmlformats.org/presentationml/2006/main" xmlns:r="http://schemas.openxmlformats.org/officeDocument/2006/relationships" xmlns:a="http://schemas.openxmlformats.org/drawingml/2006/main" xmlns="" val="403905213"/>
+        <p14:creationId xmlns:p14="http://schemas.microsoft.com/office/powerpoint/2010/main" val="403905213"/>
       </p:ext>
     </p:extLst>
   </p:cSld>
@@ -1970,7 +1970,7 @@
 </file>
 
 <file path=ppt/slideLayouts/slideLayout12.xml><?xml version="1.0" encoding="utf-8"?>
-<p:sldLayout xmlns:a="http://schemas.openxmlformats.org/drawingml/2006/main" xmlns:r="http://schemas.openxmlformats.org/officeDocument/2006/relationships" xmlns:mc="http://schemas.openxmlformats.org/markup-compatibility/2006" xmlns:mv="urn:schemas-microsoft-com:mac:vml" xmlns:p="http://schemas.openxmlformats.org/presentationml/2006/main" mc:Ignorable="mv" mc:PreserveAttributes="mv:*" preserve="1" userDrawn="1">
+<p:sldLayout xmlns:a="http://schemas.openxmlformats.org/drawingml/2006/main" xmlns:r="http://schemas.openxmlformats.org/officeDocument/2006/relationships" xmlns:p="http://schemas.openxmlformats.org/presentationml/2006/main" preserve="1" userDrawn="1">
   <p:cSld name="1 column w/number and thumbnail">
     <p:spTree>
       <p:nvGrpSpPr>
@@ -2182,7 +2182,7 @@
               <a:pPr>
                 <a:defRPr/>
               </a:pPr>
-              <a:t>May 31, 2014</a:t>
+              <a:t>June 1, 2014</a:t>
             </a:fld>
             <a:endParaRPr lang="en-US"/>
           </a:p>
@@ -2250,7 +2250,7 @@
     </p:spTree>
     <p:extLst>
       <p:ext uri="{BB962C8B-B14F-4D97-AF65-F5344CB8AC3E}">
-        <p14:creationId xmlns:p14="http://schemas.microsoft.com/office/powerpoint/2010/main" xmlns:p="http://schemas.openxmlformats.org/presentationml/2006/main" xmlns:r="http://schemas.openxmlformats.org/officeDocument/2006/relationships" xmlns:a="http://schemas.openxmlformats.org/drawingml/2006/main" xmlns="" val="2925629604"/>
+        <p14:creationId xmlns:p14="http://schemas.microsoft.com/office/powerpoint/2010/main" val="2925629604"/>
       </p:ext>
     </p:extLst>
   </p:cSld>
@@ -2264,7 +2264,7 @@
 </file>
 
 <file path=ppt/slideLayouts/slideLayout13.xml><?xml version="1.0" encoding="utf-8"?>
-<p:sldLayout xmlns:a="http://schemas.openxmlformats.org/drawingml/2006/main" xmlns:r="http://schemas.openxmlformats.org/officeDocument/2006/relationships" xmlns:mc="http://schemas.openxmlformats.org/markup-compatibility/2006" xmlns:mv="urn:schemas-microsoft-com:mac:vml" xmlns:p="http://schemas.openxmlformats.org/presentationml/2006/main" mc:Ignorable="mv" mc:PreserveAttributes="mv:*" preserve="1" userDrawn="1">
+<p:sldLayout xmlns:a="http://schemas.openxmlformats.org/drawingml/2006/main" xmlns:r="http://schemas.openxmlformats.org/officeDocument/2006/relationships" xmlns:p="http://schemas.openxmlformats.org/presentationml/2006/main" preserve="1" userDrawn="1">
   <p:cSld name="2 column w/bullets">
     <p:spTree>
       <p:nvGrpSpPr>
@@ -2501,7 +2501,7 @@
               <a:pPr>
                 <a:defRPr/>
               </a:pPr>
-              <a:t>May 31, 2014</a:t>
+              <a:t>June 1, 2014</a:t>
             </a:fld>
             <a:endParaRPr lang="en-US"/>
           </a:p>
@@ -2569,7 +2569,7 @@
     </p:spTree>
     <p:extLst>
       <p:ext uri="{BB962C8B-B14F-4D97-AF65-F5344CB8AC3E}">
-        <p14:creationId xmlns:p14="http://schemas.microsoft.com/office/powerpoint/2010/main" xmlns:p="http://schemas.openxmlformats.org/presentationml/2006/main" xmlns:r="http://schemas.openxmlformats.org/officeDocument/2006/relationships" xmlns:a="http://schemas.openxmlformats.org/drawingml/2006/main" xmlns="" val="431892090"/>
+        <p14:creationId xmlns:p14="http://schemas.microsoft.com/office/powerpoint/2010/main" val="431892090"/>
       </p:ext>
     </p:extLst>
   </p:cSld>
@@ -2583,7 +2583,7 @@
 </file>
 
 <file path=ppt/slideLayouts/slideLayout14.xml><?xml version="1.0" encoding="utf-8"?>
-<p:sldLayout xmlns:a="http://schemas.openxmlformats.org/drawingml/2006/main" xmlns:r="http://schemas.openxmlformats.org/officeDocument/2006/relationships" xmlns:mc="http://schemas.openxmlformats.org/markup-compatibility/2006" xmlns:mv="urn:schemas-microsoft-com:mac:vml" xmlns:p="http://schemas.openxmlformats.org/presentationml/2006/main" mc:Ignorable="mv" mc:PreserveAttributes="mv:*" preserve="1" userDrawn="1">
+<p:sldLayout xmlns:a="http://schemas.openxmlformats.org/drawingml/2006/main" xmlns:r="http://schemas.openxmlformats.org/officeDocument/2006/relationships" xmlns:p="http://schemas.openxmlformats.org/presentationml/2006/main" preserve="1" userDrawn="1">
   <p:cSld name="2 column no bullets">
     <p:spTree>
       <p:nvGrpSpPr>
@@ -2820,7 +2820,7 @@
               <a:pPr>
                 <a:defRPr/>
               </a:pPr>
-              <a:t>May 31, 2014</a:t>
+              <a:t>June 1, 2014</a:t>
             </a:fld>
             <a:endParaRPr lang="en-US"/>
           </a:p>
@@ -2888,7 +2888,7 @@
     </p:spTree>
     <p:extLst>
       <p:ext uri="{BB962C8B-B14F-4D97-AF65-F5344CB8AC3E}">
-        <p14:creationId xmlns:p14="http://schemas.microsoft.com/office/powerpoint/2010/main" xmlns:p="http://schemas.openxmlformats.org/presentationml/2006/main" xmlns:r="http://schemas.openxmlformats.org/officeDocument/2006/relationships" xmlns:a="http://schemas.openxmlformats.org/drawingml/2006/main" xmlns="" val="4108607386"/>
+        <p14:creationId xmlns:p14="http://schemas.microsoft.com/office/powerpoint/2010/main" val="4108607386"/>
       </p:ext>
     </p:extLst>
   </p:cSld>
@@ -2902,7 +2902,7 @@
 </file>
 
 <file path=ppt/slideLayouts/slideLayout15.xml><?xml version="1.0" encoding="utf-8"?>
-<p:sldLayout xmlns:a="http://schemas.openxmlformats.org/drawingml/2006/main" xmlns:r="http://schemas.openxmlformats.org/officeDocument/2006/relationships" xmlns:mc="http://schemas.openxmlformats.org/markup-compatibility/2006" xmlns:mv="urn:schemas-microsoft-com:mac:vml" xmlns:p="http://schemas.openxmlformats.org/presentationml/2006/main" mc:Ignorable="mv" mc:PreserveAttributes="mv:*" preserve="1" userDrawn="1">
+<p:sldLayout xmlns:a="http://schemas.openxmlformats.org/drawingml/2006/main" xmlns:r="http://schemas.openxmlformats.org/officeDocument/2006/relationships" xmlns:p="http://schemas.openxmlformats.org/presentationml/2006/main" preserve="1" userDrawn="1">
   <p:cSld name="2 column w/number">
     <p:spTree>
       <p:nvGrpSpPr>
@@ -3131,7 +3131,7 @@
               <a:pPr>
                 <a:defRPr/>
               </a:pPr>
-              <a:t>May 31, 2014</a:t>
+              <a:t>June 1, 2014</a:t>
             </a:fld>
             <a:endParaRPr lang="en-US"/>
           </a:p>
@@ -3199,7 +3199,7 @@
     </p:spTree>
     <p:extLst>
       <p:ext uri="{BB962C8B-B14F-4D97-AF65-F5344CB8AC3E}">
-        <p14:creationId xmlns:p14="http://schemas.microsoft.com/office/powerpoint/2010/main" xmlns:p="http://schemas.openxmlformats.org/presentationml/2006/main" xmlns:r="http://schemas.openxmlformats.org/officeDocument/2006/relationships" xmlns:a="http://schemas.openxmlformats.org/drawingml/2006/main" xmlns="" val="3966559409"/>
+        <p14:creationId xmlns:p14="http://schemas.microsoft.com/office/powerpoint/2010/main" val="3966559409"/>
       </p:ext>
     </p:extLst>
   </p:cSld>
@@ -3213,7 +3213,7 @@
 </file>
 
 <file path=ppt/slideLayouts/slideLayout16.xml><?xml version="1.0" encoding="utf-8"?>
-<p:sldLayout xmlns:a="http://schemas.openxmlformats.org/drawingml/2006/main" xmlns:r="http://schemas.openxmlformats.org/officeDocument/2006/relationships" xmlns:mc="http://schemas.openxmlformats.org/markup-compatibility/2006" xmlns:mv="urn:schemas-microsoft-com:mac:vml" xmlns:p="http://schemas.openxmlformats.org/presentationml/2006/main" mc:Ignorable="mv" mc:PreserveAttributes="mv:*" type="blank" preserve="1">
+<p:sldLayout xmlns:a="http://schemas.openxmlformats.org/drawingml/2006/main" xmlns:r="http://schemas.openxmlformats.org/officeDocument/2006/relationships" xmlns:p="http://schemas.openxmlformats.org/presentationml/2006/main" type="blank" preserve="1">
   <p:cSld name="Blank">
     <p:spTree>
       <p:nvGrpSpPr>
@@ -3256,7 +3256,7 @@
               <a:pPr>
                 <a:defRPr/>
               </a:pPr>
-              <a:t>May 31, 2014</a:t>
+              <a:t>June 1, 2014</a:t>
             </a:fld>
             <a:endParaRPr lang="en-US"/>
           </a:p>
@@ -3324,7 +3324,7 @@
     </p:spTree>
     <p:extLst>
       <p:ext uri="{BB962C8B-B14F-4D97-AF65-F5344CB8AC3E}">
-        <p14:creationId xmlns:p14="http://schemas.microsoft.com/office/powerpoint/2010/main" xmlns:p="http://schemas.openxmlformats.org/presentationml/2006/main" xmlns:r="http://schemas.openxmlformats.org/officeDocument/2006/relationships" xmlns:a="http://schemas.openxmlformats.org/drawingml/2006/main" xmlns="" val="626709248"/>
+        <p14:creationId xmlns:p14="http://schemas.microsoft.com/office/powerpoint/2010/main" val="626709248"/>
       </p:ext>
     </p:extLst>
   </p:cSld>
@@ -3338,7 +3338,7 @@
 </file>
 
 <file path=ppt/slideLayouts/slideLayout17.xml><?xml version="1.0" encoding="utf-8"?>
-<p:sldLayout xmlns:a="http://schemas.openxmlformats.org/drawingml/2006/main" xmlns:r="http://schemas.openxmlformats.org/officeDocument/2006/relationships" xmlns:mc="http://schemas.openxmlformats.org/markup-compatibility/2006" xmlns:mv="urn:schemas-microsoft-com:mac:vml" xmlns:p="http://schemas.openxmlformats.org/presentationml/2006/main" mc:Ignorable="mv" mc:PreserveAttributes="mv:*" preserve="1" userDrawn="1">
+<p:sldLayout xmlns:a="http://schemas.openxmlformats.org/drawingml/2006/main" xmlns:r="http://schemas.openxmlformats.org/officeDocument/2006/relationships" xmlns:p="http://schemas.openxmlformats.org/presentationml/2006/main" preserve="1" userDrawn="1">
   <p:cSld name="Blank Layout No Tag">
     <p:bg>
       <p:bgPr>
@@ -3419,7 +3419,7 @@
               <a:pPr>
                 <a:defRPr/>
               </a:pPr>
-              <a:t>May 31, 2014</a:t>
+              <a:t>June 1, 2014</a:t>
             </a:fld>
             <a:endParaRPr lang="en-US" dirty="0"/>
           </a:p>
@@ -3461,7 +3461,7 @@
     </p:spTree>
     <p:extLst>
       <p:ext uri="{BB962C8B-B14F-4D97-AF65-F5344CB8AC3E}">
-        <p14:creationId xmlns:p14="http://schemas.microsoft.com/office/powerpoint/2010/main" xmlns:p="http://schemas.openxmlformats.org/presentationml/2006/main" xmlns:r="http://schemas.openxmlformats.org/officeDocument/2006/relationships" xmlns:a="http://schemas.openxmlformats.org/drawingml/2006/main" xmlns="" val="2632892429"/>
+        <p14:creationId xmlns:p14="http://schemas.microsoft.com/office/powerpoint/2010/main" val="2632892429"/>
       </p:ext>
     </p:extLst>
   </p:cSld>
@@ -3472,7 +3472,7 @@
 </file>
 
 <file path=ppt/slideLayouts/slideLayout2.xml><?xml version="1.0" encoding="utf-8"?>
-<p:sldLayout xmlns:a="http://schemas.openxmlformats.org/drawingml/2006/main" xmlns:r="http://schemas.openxmlformats.org/officeDocument/2006/relationships" xmlns:mc="http://schemas.openxmlformats.org/markup-compatibility/2006" xmlns:mv="urn:schemas-microsoft-com:mac:vml" xmlns:p="http://schemas.openxmlformats.org/presentationml/2006/main" mc:Ignorable="mv" mc:PreserveAttributes="mv:*" preserve="1">
+<p:sldLayout xmlns:a="http://schemas.openxmlformats.org/drawingml/2006/main" xmlns:r="http://schemas.openxmlformats.org/officeDocument/2006/relationships" xmlns:p="http://schemas.openxmlformats.org/presentationml/2006/main" preserve="1">
   <p:cSld name="Full width w/bullets">
     <p:spTree>
       <p:nvGrpSpPr>
@@ -3622,7 +3622,7 @@
               <a:pPr>
                 <a:defRPr/>
               </a:pPr>
-              <a:t>May 31, 2014</a:t>
+              <a:t>June 1, 2014</a:t>
             </a:fld>
             <a:endParaRPr lang="en-US"/>
           </a:p>
@@ -3690,7 +3690,7 @@
     </p:spTree>
     <p:extLst>
       <p:ext uri="{BB962C8B-B14F-4D97-AF65-F5344CB8AC3E}">
-        <p14:creationId xmlns:p14="http://schemas.microsoft.com/office/powerpoint/2010/main" xmlns:p="http://schemas.openxmlformats.org/presentationml/2006/main" xmlns:r="http://schemas.openxmlformats.org/officeDocument/2006/relationships" xmlns:a="http://schemas.openxmlformats.org/drawingml/2006/main" xmlns="" val="1168923685"/>
+        <p14:creationId xmlns:p14="http://schemas.microsoft.com/office/powerpoint/2010/main" val="1168923685"/>
       </p:ext>
     </p:extLst>
   </p:cSld>
@@ -3704,7 +3704,7 @@
 </file>
 
 <file path=ppt/slideLayouts/slideLayout3.xml><?xml version="1.0" encoding="utf-8"?>
-<p:sldLayout xmlns:a="http://schemas.openxmlformats.org/drawingml/2006/main" xmlns:r="http://schemas.openxmlformats.org/officeDocument/2006/relationships" xmlns:mc="http://schemas.openxmlformats.org/markup-compatibility/2006" xmlns:mv="urn:schemas-microsoft-com:mac:vml" xmlns:p="http://schemas.openxmlformats.org/presentationml/2006/main" mc:Ignorable="mv" mc:PreserveAttributes="mv:*" preserve="1" userDrawn="1">
+<p:sldLayout xmlns:a="http://schemas.openxmlformats.org/drawingml/2006/main" xmlns:r="http://schemas.openxmlformats.org/officeDocument/2006/relationships" xmlns:p="http://schemas.openxmlformats.org/presentationml/2006/main" preserve="1" userDrawn="1">
   <p:cSld name="1 column w/bullets">
     <p:spTree>
       <p:nvGrpSpPr>
@@ -3889,7 +3889,7 @@
               <a:pPr>
                 <a:defRPr/>
               </a:pPr>
-              <a:t>May 31, 2014</a:t>
+              <a:t>June 1, 2014</a:t>
             </a:fld>
             <a:endParaRPr lang="en-US"/>
           </a:p>
@@ -3957,7 +3957,7 @@
     </p:spTree>
     <p:extLst>
       <p:ext uri="{BB962C8B-B14F-4D97-AF65-F5344CB8AC3E}">
-        <p14:creationId xmlns:p14="http://schemas.microsoft.com/office/powerpoint/2010/main" xmlns:p="http://schemas.openxmlformats.org/presentationml/2006/main" xmlns:r="http://schemas.openxmlformats.org/officeDocument/2006/relationships" xmlns:a="http://schemas.openxmlformats.org/drawingml/2006/main" xmlns="" val="2969271736"/>
+        <p14:creationId xmlns:p14="http://schemas.microsoft.com/office/powerpoint/2010/main" val="2969271736"/>
       </p:ext>
     </p:extLst>
   </p:cSld>
@@ -3971,7 +3971,7 @@
 </file>
 
 <file path=ppt/slideLayouts/slideLayout4.xml><?xml version="1.0" encoding="utf-8"?>
-<p:sldLayout xmlns:a="http://schemas.openxmlformats.org/drawingml/2006/main" xmlns:r="http://schemas.openxmlformats.org/officeDocument/2006/relationships" xmlns:mc="http://schemas.openxmlformats.org/markup-compatibility/2006" xmlns:mv="urn:schemas-microsoft-com:mac:vml" xmlns:p="http://schemas.openxmlformats.org/presentationml/2006/main" mc:Ignorable="mv" mc:PreserveAttributes="mv:*" preserve="1">
+<p:sldLayout xmlns:a="http://schemas.openxmlformats.org/drawingml/2006/main" xmlns:r="http://schemas.openxmlformats.org/officeDocument/2006/relationships" xmlns:p="http://schemas.openxmlformats.org/presentationml/2006/main" preserve="1">
   <p:cSld name="1 column w/bullets and thumbnail">
     <p:spTree>
       <p:nvGrpSpPr>
@@ -4187,7 +4187,7 @@
               <a:pPr>
                 <a:defRPr/>
               </a:pPr>
-              <a:t>May 31, 2014</a:t>
+              <a:t>June 1, 2014</a:t>
             </a:fld>
             <a:endParaRPr lang="en-US"/>
           </a:p>
@@ -4255,7 +4255,7 @@
     </p:spTree>
     <p:extLst>
       <p:ext uri="{BB962C8B-B14F-4D97-AF65-F5344CB8AC3E}">
-        <p14:creationId xmlns:p14="http://schemas.microsoft.com/office/powerpoint/2010/main" xmlns:p="http://schemas.openxmlformats.org/presentationml/2006/main" xmlns:r="http://schemas.openxmlformats.org/officeDocument/2006/relationships" xmlns:a="http://schemas.openxmlformats.org/drawingml/2006/main" xmlns="" val="2931305199"/>
+        <p14:creationId xmlns:p14="http://schemas.microsoft.com/office/powerpoint/2010/main" val="2931305199"/>
       </p:ext>
     </p:extLst>
   </p:cSld>
@@ -4269,7 +4269,7 @@
 </file>
 
 <file path=ppt/slideLayouts/slideLayout5.xml><?xml version="1.0" encoding="utf-8"?>
-<p:sldLayout xmlns:a="http://schemas.openxmlformats.org/drawingml/2006/main" xmlns:r="http://schemas.openxmlformats.org/officeDocument/2006/relationships" xmlns:mc="http://schemas.openxmlformats.org/markup-compatibility/2006" xmlns:mv="urn:schemas-microsoft-com:mac:vml" xmlns:p="http://schemas.openxmlformats.org/presentationml/2006/main" mc:Ignorable="mv" mc:PreserveAttributes="mv:*" preserve="1" userDrawn="1">
+<p:sldLayout xmlns:a="http://schemas.openxmlformats.org/drawingml/2006/main" xmlns:r="http://schemas.openxmlformats.org/officeDocument/2006/relationships" xmlns:p="http://schemas.openxmlformats.org/presentationml/2006/main" preserve="1" userDrawn="1">
   <p:cSld name="Full width picture">
     <p:spTree>
       <p:nvGrpSpPr>
@@ -4376,7 +4376,7 @@
               <a:pPr>
                 <a:defRPr/>
               </a:pPr>
-              <a:t>May 31, 2014</a:t>
+              <a:t>June 1, 2014</a:t>
             </a:fld>
             <a:endParaRPr lang="en-US"/>
           </a:p>
@@ -4444,7 +4444,7 @@
     </p:spTree>
     <p:extLst>
       <p:ext uri="{BB962C8B-B14F-4D97-AF65-F5344CB8AC3E}">
-        <p14:creationId xmlns:p14="http://schemas.microsoft.com/office/powerpoint/2010/main" xmlns:p="http://schemas.openxmlformats.org/presentationml/2006/main" xmlns:r="http://schemas.openxmlformats.org/officeDocument/2006/relationships" xmlns:a="http://schemas.openxmlformats.org/drawingml/2006/main" xmlns="" val="1336574129"/>
+        <p14:creationId xmlns:p14="http://schemas.microsoft.com/office/powerpoint/2010/main" val="1336574129"/>
       </p:ext>
     </p:extLst>
   </p:cSld>
@@ -4458,7 +4458,7 @@
 </file>
 
 <file path=ppt/slideLayouts/slideLayout6.xml><?xml version="1.0" encoding="utf-8"?>
-<p:sldLayout xmlns:a="http://schemas.openxmlformats.org/drawingml/2006/main" xmlns:r="http://schemas.openxmlformats.org/officeDocument/2006/relationships" xmlns:mc="http://schemas.openxmlformats.org/markup-compatibility/2006" xmlns:mv="urn:schemas-microsoft-com:mac:vml" xmlns:p="http://schemas.openxmlformats.org/presentationml/2006/main" mc:Ignorable="mv" mc:PreserveAttributes="mv:*" preserve="1" userDrawn="1">
+<p:sldLayout xmlns:a="http://schemas.openxmlformats.org/drawingml/2006/main" xmlns:r="http://schemas.openxmlformats.org/officeDocument/2006/relationships" xmlns:p="http://schemas.openxmlformats.org/presentationml/2006/main" preserve="1" userDrawn="1">
   <p:cSld name="Title Only">
     <p:spTree>
       <p:nvGrpSpPr>
@@ -4529,7 +4529,7 @@
               <a:pPr>
                 <a:defRPr/>
               </a:pPr>
-              <a:t>May 31, 2014</a:t>
+              <a:t>June 1, 2014</a:t>
             </a:fld>
             <a:endParaRPr lang="en-US"/>
           </a:p>
@@ -4597,7 +4597,7 @@
     </p:spTree>
     <p:extLst>
       <p:ext uri="{BB962C8B-B14F-4D97-AF65-F5344CB8AC3E}">
-        <p14:creationId xmlns:p14="http://schemas.microsoft.com/office/powerpoint/2010/main" xmlns:p="http://schemas.openxmlformats.org/presentationml/2006/main" xmlns:r="http://schemas.openxmlformats.org/officeDocument/2006/relationships" xmlns:a="http://schemas.openxmlformats.org/drawingml/2006/main" xmlns="" val="2520306882"/>
+        <p14:creationId xmlns:p14="http://schemas.microsoft.com/office/powerpoint/2010/main" val="2520306882"/>
       </p:ext>
     </p:extLst>
   </p:cSld>
@@ -4611,7 +4611,7 @@
 </file>
 
 <file path=ppt/slideLayouts/slideLayout7.xml><?xml version="1.0" encoding="utf-8"?>
-<p:sldLayout xmlns:a="http://schemas.openxmlformats.org/drawingml/2006/main" xmlns:r="http://schemas.openxmlformats.org/officeDocument/2006/relationships" xmlns:mc="http://schemas.openxmlformats.org/markup-compatibility/2006" xmlns:mv="urn:schemas-microsoft-com:mac:vml" xmlns:p="http://schemas.openxmlformats.org/presentationml/2006/main" mc:Ignorable="mv" mc:PreserveAttributes="mv:*" type="obj" preserve="1">
+<p:sldLayout xmlns:a="http://schemas.openxmlformats.org/drawingml/2006/main" xmlns:r="http://schemas.openxmlformats.org/officeDocument/2006/relationships" xmlns:p="http://schemas.openxmlformats.org/presentationml/2006/main" type="obj" preserve="1">
   <p:cSld name="Full width no bullets">
     <p:spTree>
       <p:nvGrpSpPr>
@@ -4763,7 +4763,7 @@
               <a:pPr>
                 <a:defRPr/>
               </a:pPr>
-              <a:t>May 31, 2014</a:t>
+              <a:t>June 1, 2014</a:t>
             </a:fld>
             <a:endParaRPr lang="en-US"/>
           </a:p>
@@ -4831,7 +4831,7 @@
     </p:spTree>
     <p:extLst>
       <p:ext uri="{BB962C8B-B14F-4D97-AF65-F5344CB8AC3E}">
-        <p14:creationId xmlns:p14="http://schemas.microsoft.com/office/powerpoint/2010/main" xmlns:p="http://schemas.openxmlformats.org/presentationml/2006/main" xmlns:r="http://schemas.openxmlformats.org/officeDocument/2006/relationships" xmlns:a="http://schemas.openxmlformats.org/drawingml/2006/main" xmlns="" val="3209058712"/>
+        <p14:creationId xmlns:p14="http://schemas.microsoft.com/office/powerpoint/2010/main" val="3209058712"/>
       </p:ext>
     </p:extLst>
   </p:cSld>
@@ -4845,7 +4845,7 @@
 </file>
 
 <file path=ppt/slideLayouts/slideLayout8.xml><?xml version="1.0" encoding="utf-8"?>
-<p:sldLayout xmlns:a="http://schemas.openxmlformats.org/drawingml/2006/main" xmlns:r="http://schemas.openxmlformats.org/officeDocument/2006/relationships" xmlns:mc="http://schemas.openxmlformats.org/markup-compatibility/2006" xmlns:mv="urn:schemas-microsoft-com:mac:vml" xmlns:p="http://schemas.openxmlformats.org/presentationml/2006/main" mc:Ignorable="mv" mc:PreserveAttributes="mv:*" preserve="1">
+<p:sldLayout xmlns:a="http://schemas.openxmlformats.org/drawingml/2006/main" xmlns:r="http://schemas.openxmlformats.org/officeDocument/2006/relationships" xmlns:p="http://schemas.openxmlformats.org/presentationml/2006/main" preserve="1">
   <p:cSld name="Full width w/number">
     <p:spTree>
       <p:nvGrpSpPr>
@@ -4995,7 +4995,7 @@
               <a:pPr>
                 <a:defRPr/>
               </a:pPr>
-              <a:t>May 31, 2014</a:t>
+              <a:t>June 1, 2014</a:t>
             </a:fld>
             <a:endParaRPr lang="en-US"/>
           </a:p>
@@ -5063,7 +5063,7 @@
     </p:spTree>
     <p:extLst>
       <p:ext uri="{BB962C8B-B14F-4D97-AF65-F5344CB8AC3E}">
-        <p14:creationId xmlns:p14="http://schemas.microsoft.com/office/powerpoint/2010/main" xmlns:p="http://schemas.openxmlformats.org/presentationml/2006/main" xmlns:r="http://schemas.openxmlformats.org/officeDocument/2006/relationships" xmlns:a="http://schemas.openxmlformats.org/drawingml/2006/main" xmlns="" val="946531670"/>
+        <p14:creationId xmlns:p14="http://schemas.microsoft.com/office/powerpoint/2010/main" val="946531670"/>
       </p:ext>
     </p:extLst>
   </p:cSld>
@@ -5077,7 +5077,7 @@
 </file>
 
 <file path=ppt/slideLayouts/slideLayout9.xml><?xml version="1.0" encoding="utf-8"?>
-<p:sldLayout xmlns:a="http://schemas.openxmlformats.org/drawingml/2006/main" xmlns:r="http://schemas.openxmlformats.org/officeDocument/2006/relationships" xmlns:mc="http://schemas.openxmlformats.org/markup-compatibility/2006" xmlns:mv="urn:schemas-microsoft-com:mac:vml" xmlns:p="http://schemas.openxmlformats.org/presentationml/2006/main" mc:Ignorable="mv" mc:PreserveAttributes="mv:*" preserve="1" userDrawn="1">
+<p:sldLayout xmlns:a="http://schemas.openxmlformats.org/drawingml/2006/main" xmlns:r="http://schemas.openxmlformats.org/officeDocument/2006/relationships" xmlns:p="http://schemas.openxmlformats.org/presentationml/2006/main" preserve="1" userDrawn="1">
   <p:cSld name="1 column no bullets">
     <p:spTree>
       <p:nvGrpSpPr>
@@ -5262,7 +5262,7 @@
               <a:pPr>
                 <a:defRPr/>
               </a:pPr>
-              <a:t>May 31, 2014</a:t>
+              <a:t>June 1, 2014</a:t>
             </a:fld>
             <a:endParaRPr lang="en-US"/>
           </a:p>
@@ -5330,7 +5330,7 @@
     </p:spTree>
     <p:extLst>
       <p:ext uri="{BB962C8B-B14F-4D97-AF65-F5344CB8AC3E}">
-        <p14:creationId xmlns:p14="http://schemas.microsoft.com/office/powerpoint/2010/main" xmlns:p="http://schemas.openxmlformats.org/presentationml/2006/main" xmlns:r="http://schemas.openxmlformats.org/officeDocument/2006/relationships" xmlns:a="http://schemas.openxmlformats.org/drawingml/2006/main" xmlns="" val="2052283023"/>
+        <p14:creationId xmlns:p14="http://schemas.microsoft.com/office/powerpoint/2010/main" val="2052283023"/>
       </p:ext>
     </p:extLst>
   </p:cSld>
@@ -5344,7 +5344,7 @@
 </file>
 
 <file path=ppt/slideMasters/slideMaster1.xml><?xml version="1.0" encoding="utf-8"?>
-<p:sldMaster xmlns:a="http://schemas.openxmlformats.org/drawingml/2006/main" xmlns:r="http://schemas.openxmlformats.org/officeDocument/2006/relationships" xmlns:mc="http://schemas.openxmlformats.org/markup-compatibility/2006" xmlns:mv="urn:schemas-microsoft-com:mac:vml" xmlns:p="http://schemas.openxmlformats.org/presentationml/2006/main" mc:Ignorable="mv" mc:PreserveAttributes="mv:*">
+<p:sldMaster xmlns:a="http://schemas.openxmlformats.org/drawingml/2006/main" xmlns:r="http://schemas.openxmlformats.org/officeDocument/2006/relationships" xmlns:p="http://schemas.openxmlformats.org/presentationml/2006/main">
   <p:cSld>
     <p:bg>
       <p:bgPr>
@@ -5392,7 +5392,7 @@
           </a:ln>
           <a:extLst>
             <a:ext uri="{91240B29-F687-4F45-9708-019B960494DF}">
-              <a14:hiddenLine xmlns:a14="http://schemas.microsoft.com/office/drawing/2010/main" xmlns:p="http://schemas.openxmlformats.org/presentationml/2006/main" xmlns:r="http://schemas.openxmlformats.org/officeDocument/2006/relationships" xmlns:a="http://schemas.openxmlformats.org/drawingml/2006/main" xmlns="" w="9525">
+              <a14:hiddenLine xmlns:a14="http://schemas.microsoft.com/office/drawing/2010/main" w="9525">
                 <a:solidFill>
                   <a:srgbClr val="000000"/>
                 </a:solidFill>
@@ -5436,7 +5436,7 @@
           <a:blip r:embed="rId19">
             <a:extLst>
               <a:ext uri="{28A0092B-C50C-407E-A947-70E740481C1C}">
-                <a14:useLocalDpi xmlns:a14="http://schemas.microsoft.com/office/drawing/2010/main" xmlns:p="http://schemas.openxmlformats.org/presentationml/2006/main" xmlns:r="http://schemas.openxmlformats.org/officeDocument/2006/relationships" xmlns:a="http://schemas.openxmlformats.org/drawingml/2006/main" xmlns="" val="0"/>
+                <a14:useLocalDpi xmlns:a14="http://schemas.microsoft.com/office/drawing/2010/main" val="0"/>
               </a:ext>
             </a:extLst>
           </a:blip>
@@ -5459,14 +5459,14 @@
           </a:ln>
           <a:extLst>
             <a:ext uri="{909E8E84-426E-40DD-AFC4-6F175D3DCCD1}">
-              <a14:hiddenFill xmlns:a14="http://schemas.microsoft.com/office/drawing/2010/main" xmlns:p="http://schemas.openxmlformats.org/presentationml/2006/main" xmlns:r="http://schemas.openxmlformats.org/officeDocument/2006/relationships" xmlns:a="http://schemas.openxmlformats.org/drawingml/2006/main" xmlns="">
+              <a14:hiddenFill xmlns:a14="http://schemas.microsoft.com/office/drawing/2010/main">
                 <a:solidFill>
                   <a:srgbClr val="FFFFFF"/>
                 </a:solidFill>
               </a14:hiddenFill>
             </a:ext>
             <a:ext uri="{91240B29-F687-4F45-9708-019B960494DF}">
-              <a14:hiddenLine xmlns:a14="http://schemas.microsoft.com/office/drawing/2010/main" xmlns:p="http://schemas.openxmlformats.org/presentationml/2006/main" xmlns:r="http://schemas.openxmlformats.org/officeDocument/2006/relationships" xmlns:a="http://schemas.openxmlformats.org/drawingml/2006/main" xmlns="" w="9525">
+              <a14:hiddenLine xmlns:a14="http://schemas.microsoft.com/office/drawing/2010/main" w="9525">
                 <a:solidFill>
                   <a:srgbClr val="000000"/>
                 </a:solidFill>
@@ -5502,14 +5502,14 @@
           </a:ln>
           <a:extLst>
             <a:ext uri="{909E8E84-426E-40DD-AFC4-6F175D3DCCD1}">
-              <a14:hiddenFill xmlns:a14="http://schemas.microsoft.com/office/drawing/2010/main" xmlns:p="http://schemas.openxmlformats.org/presentationml/2006/main" xmlns:r="http://schemas.openxmlformats.org/officeDocument/2006/relationships" xmlns:a="http://schemas.openxmlformats.org/drawingml/2006/main" xmlns="">
+              <a14:hiddenFill xmlns:a14="http://schemas.microsoft.com/office/drawing/2010/main">
                 <a:solidFill>
                   <a:srgbClr val="FFFFFF"/>
                 </a:solidFill>
               </a14:hiddenFill>
             </a:ext>
             <a:ext uri="{91240B29-F687-4F45-9708-019B960494DF}">
-              <a14:hiddenLine xmlns:a14="http://schemas.microsoft.com/office/drawing/2010/main" xmlns:p="http://schemas.openxmlformats.org/presentationml/2006/main" xmlns:r="http://schemas.openxmlformats.org/officeDocument/2006/relationships" xmlns:a="http://schemas.openxmlformats.org/drawingml/2006/main" xmlns="" w="9525">
+              <a14:hiddenLine xmlns:a14="http://schemas.microsoft.com/office/drawing/2010/main" w="9525">
                 <a:solidFill>
                   <a:srgbClr val="000000"/>
                 </a:solidFill>
@@ -5519,7 +5519,7 @@
               </a14:hiddenLine>
             </a:ext>
             <a:ext uri="{FAA26D3D-D897-4be2-8F04-BA451C77F1D7}">
-              <ma14:placeholderFlag xmlns:ma14="http://schemas.microsoft.com/office/mac/drawingml/2011/main" xmlns="" xmlns:p="http://schemas.openxmlformats.org/presentationml/2006/main" xmlns:r="http://schemas.openxmlformats.org/officeDocument/2006/relationships" xmlns:a="http://schemas.openxmlformats.org/drawingml/2006/main" val="1"/>
+              <ma14:placeholderFlag xmlns="" xmlns:ma14="http://schemas.microsoft.com/office/mac/drawingml/2011/main" xmlns:mv="urn:schemas-microsoft-com:mac:vml" xmlns:mc="http://schemas.openxmlformats.org/markup-compatibility/2006" val="1"/>
             </a:ext>
           </a:extLst>
         </p:spPr>
@@ -5563,14 +5563,14 @@
           </a:ln>
           <a:extLst>
             <a:ext uri="{909E8E84-426E-40DD-AFC4-6F175D3DCCD1}">
-              <a14:hiddenFill xmlns:a14="http://schemas.microsoft.com/office/drawing/2010/main" xmlns:p="http://schemas.openxmlformats.org/presentationml/2006/main" xmlns:r="http://schemas.openxmlformats.org/officeDocument/2006/relationships" xmlns:a="http://schemas.openxmlformats.org/drawingml/2006/main" xmlns="">
+              <a14:hiddenFill xmlns:a14="http://schemas.microsoft.com/office/drawing/2010/main">
                 <a:solidFill>
                   <a:srgbClr val="FFFFFF"/>
                 </a:solidFill>
               </a14:hiddenFill>
             </a:ext>
             <a:ext uri="{91240B29-F687-4F45-9708-019B960494DF}">
-              <a14:hiddenLine xmlns:a14="http://schemas.microsoft.com/office/drawing/2010/main" xmlns:p="http://schemas.openxmlformats.org/presentationml/2006/main" xmlns:r="http://schemas.openxmlformats.org/officeDocument/2006/relationships" xmlns:a="http://schemas.openxmlformats.org/drawingml/2006/main" xmlns="" w="9525">
+              <a14:hiddenLine xmlns:a14="http://schemas.microsoft.com/office/drawing/2010/main" w="9525">
                 <a:solidFill>
                   <a:srgbClr val="000000"/>
                 </a:solidFill>
@@ -5580,7 +5580,7 @@
               </a14:hiddenLine>
             </a:ext>
             <a:ext uri="{FAA26D3D-D897-4be2-8F04-BA451C77F1D7}">
-              <ma14:placeholderFlag xmlns:ma14="http://schemas.microsoft.com/office/mac/drawingml/2011/main" xmlns="" xmlns:p="http://schemas.openxmlformats.org/presentationml/2006/main" xmlns:r="http://schemas.openxmlformats.org/officeDocument/2006/relationships" xmlns:a="http://schemas.openxmlformats.org/drawingml/2006/main" val="1"/>
+              <ma14:placeholderFlag xmlns="" xmlns:ma14="http://schemas.microsoft.com/office/mac/drawingml/2011/main" xmlns:mv="urn:schemas-microsoft-com:mac:vml" xmlns:mc="http://schemas.openxmlformats.org/markup-compatibility/2006" val="1"/>
             </a:ext>
           </a:extLst>
         </p:spPr>
@@ -5723,7 +5723,7 @@
               <a:pPr defTabSz="457200">
                 <a:defRPr/>
               </a:pPr>
-              <a:t>May 31, 2014</a:t>
+              <a:t>June 1, 2014</a:t>
             </a:fld>
             <a:endParaRPr lang="en-US" dirty="0"/>
           </a:p>
@@ -5786,7 +5786,7 @@
     </p:spTree>
     <p:extLst>
       <p:ext uri="{BB962C8B-B14F-4D97-AF65-F5344CB8AC3E}">
-        <p14:creationId xmlns:p14="http://schemas.microsoft.com/office/powerpoint/2010/main" xmlns:p="http://schemas.openxmlformats.org/presentationml/2006/main" xmlns:r="http://schemas.openxmlformats.org/officeDocument/2006/relationships" xmlns:a="http://schemas.openxmlformats.org/drawingml/2006/main" xmlns="" val="1848995723"/>
+        <p14:creationId xmlns:p14="http://schemas.microsoft.com/office/powerpoint/2010/main" val="1848995723"/>
       </p:ext>
     </p:extLst>
   </p:cSld>
@@ -6249,7 +6249,7 @@
 </file>
 
 <file path=ppt/slides/slide1.xml><?xml version="1.0" encoding="utf-8"?>
-<p:sld xmlns:a="http://schemas.openxmlformats.org/drawingml/2006/main" xmlns:r="http://schemas.openxmlformats.org/officeDocument/2006/relationships" xmlns:mc="http://schemas.openxmlformats.org/markup-compatibility/2006" xmlns:mv="urn:schemas-microsoft-com:mac:vml" xmlns:p="http://schemas.openxmlformats.org/presentationml/2006/main" mc:Ignorable="mv" mc:PreserveAttributes="mv:*">
+<p:sld xmlns:a="http://schemas.openxmlformats.org/drawingml/2006/main" xmlns:r="http://schemas.openxmlformats.org/officeDocument/2006/relationships" xmlns:p="http://schemas.openxmlformats.org/presentationml/2006/main">
   <p:cSld>
     <p:spTree>
       <p:nvGrpSpPr>
@@ -6467,7 +6467,7 @@
     </p:spTree>
     <p:extLst>
       <p:ext uri="{BB962C8B-B14F-4D97-AF65-F5344CB8AC3E}">
-        <p14:creationId xmlns:p14="http://schemas.microsoft.com/office/powerpoint/2010/main" xmlns:p="http://schemas.openxmlformats.org/presentationml/2006/main" xmlns:r="http://schemas.openxmlformats.org/officeDocument/2006/relationships" xmlns:a="http://schemas.openxmlformats.org/drawingml/2006/main" xmlns="" val="3386317806"/>
+        <p14:creationId xmlns:p14="http://schemas.microsoft.com/office/powerpoint/2010/main" val="3386317806"/>
       </p:ext>
     </p:extLst>
   </p:cSld>
@@ -6485,7 +6485,7 @@
 </file>
 
 <file path=ppt/slides/slide10.xml><?xml version="1.0" encoding="utf-8"?>
-<p:sld xmlns:a="http://schemas.openxmlformats.org/drawingml/2006/main" xmlns:r="http://schemas.openxmlformats.org/officeDocument/2006/relationships" xmlns:mc="http://schemas.openxmlformats.org/markup-compatibility/2006" xmlns:mv="urn:schemas-microsoft-com:mac:vml" xmlns:p="http://schemas.openxmlformats.org/presentationml/2006/main" mc:Ignorable="mv" mc:PreserveAttributes="mv:*">
+<p:sld xmlns:a="http://schemas.openxmlformats.org/drawingml/2006/main" xmlns:r="http://schemas.openxmlformats.org/officeDocument/2006/relationships" xmlns:p="http://schemas.openxmlformats.org/presentationml/2006/main">
   <p:cSld>
     <p:spTree>
       <p:nvGrpSpPr>
@@ -6503,6 +6503,64 @@
       </p:grpSpPr>
       <p:sp>
         <p:nvSpPr>
+          <p:cNvPr id="3" name="Content Placeholder 2"/>
+          <p:cNvSpPr>
+            <a:spLocks noGrp="1"/>
+          </p:cNvSpPr>
+          <p:nvPr>
+            <p:ph idx="1"/>
+          </p:nvPr>
+        </p:nvSpPr>
+        <p:spPr/>
+        <p:txBody>
+          <a:bodyPr/>
+          <a:lstStyle/>
+          <a:p>
+            <a:r>
+              <a:rPr lang="en-US" sz="3200" dirty="0" smtClean="0"/>
+              <a:t>Considered year as continuous variable</a:t>
+            </a:r>
+          </a:p>
+          <a:p>
+            <a:r>
+              <a:rPr lang="en-US" sz="3200" dirty="0" smtClean="0"/>
+              <a:t>80/20 rule to get PC</a:t>
+            </a:r>
+            <a:endParaRPr lang="en-US" sz="3200" dirty="0" smtClean="0"/>
+          </a:p>
+          <a:p>
+            <a:pPr marL="0" indent="0">
+              <a:buNone/>
+            </a:pPr>
+            <a:endParaRPr lang="en-US" dirty="0"/>
+          </a:p>
+        </p:txBody>
+      </p:sp>
+      <p:sp>
+        <p:nvSpPr>
+          <p:cNvPr id="6" name="Content Placeholder 5"/>
+          <p:cNvSpPr>
+            <a:spLocks noGrp="1"/>
+          </p:cNvSpPr>
+          <p:nvPr>
+            <p:ph idx="10"/>
+          </p:nvPr>
+        </p:nvSpPr>
+        <p:spPr/>
+        <p:txBody>
+          <a:bodyPr/>
+          <a:lstStyle/>
+          <a:p>
+            <a:r>
+              <a:rPr lang="en-US" sz="3200" dirty="0" smtClean="0"/>
+              <a:t>Difficult to interpret results with PCA</a:t>
+            </a:r>
+            <a:endParaRPr lang="en-US" sz="3200" dirty="0"/>
+          </a:p>
+        </p:txBody>
+      </p:sp>
+      <p:sp>
+        <p:nvSpPr>
           <p:cNvPr id="2" name="Title 1"/>
           <p:cNvSpPr>
             <a:spLocks noGrp="1"/>
@@ -6518,7 +6576,11 @@
           <a:p>
             <a:r>
               <a:rPr lang="en-US" sz="4400" dirty="0" smtClean="0"/>
-              <a:t>Assumptions &amp; Limitations</a:t>
+              <a:t>Assumptions </a:t>
+            </a:r>
+            <a:r>
+              <a:rPr lang="en-US" sz="4400" dirty="0" smtClean="0"/>
+              <a:t>  &amp;   Limitations</a:t>
             </a:r>
             <a:endParaRPr lang="en-US" sz="4400" dirty="0"/>
           </a:p>
@@ -6526,31 +6588,12 @@
       </p:sp>
       <p:sp>
         <p:nvSpPr>
-          <p:cNvPr id="3" name="Content Placeholder 2"/>
-          <p:cNvSpPr>
-            <a:spLocks noGrp="1"/>
-          </p:cNvSpPr>
-          <p:nvPr>
-            <p:ph idx="1"/>
-          </p:nvPr>
-        </p:nvSpPr>
-        <p:spPr/>
-        <p:txBody>
-          <a:bodyPr/>
-          <a:lstStyle/>
-          <a:p>
-            <a:endParaRPr lang="en-US" dirty="0"/>
-          </a:p>
-        </p:txBody>
-      </p:sp>
-      <p:sp>
-        <p:nvSpPr>
           <p:cNvPr id="4" name="Date Placeholder 3"/>
           <p:cNvSpPr>
             <a:spLocks noGrp="1"/>
           </p:cNvSpPr>
           <p:nvPr>
-            <p:ph type="dt" sz="half" idx="10"/>
+            <p:ph type="dt" sz="half" idx="11"/>
           </p:nvPr>
         </p:nvSpPr>
         <p:spPr/>
@@ -6576,7 +6619,7 @@
             <a:spLocks noGrp="1"/>
           </p:cNvSpPr>
           <p:nvPr>
-            <p:ph type="sldNum" sz="quarter" idx="11"/>
+            <p:ph type="sldNum" sz="quarter" idx="12"/>
           </p:nvPr>
         </p:nvSpPr>
         <p:spPr/>
@@ -6601,7 +6644,7 @@
     </p:spTree>
     <p:extLst>
       <p:ext uri="{BB962C8B-B14F-4D97-AF65-F5344CB8AC3E}">
-        <p14:creationId xmlns:p14="http://schemas.microsoft.com/office/powerpoint/2010/main" xmlns:p="http://schemas.openxmlformats.org/presentationml/2006/main" xmlns:r="http://schemas.openxmlformats.org/officeDocument/2006/relationships" xmlns:a="http://schemas.openxmlformats.org/drawingml/2006/main" xmlns="" val="2860658135"/>
+        <p14:creationId xmlns:p14="http://schemas.microsoft.com/office/powerpoint/2010/main" val="2860658135"/>
       </p:ext>
     </p:extLst>
   </p:cSld>
@@ -6622,7 +6665,7 @@
 </file>
 
 <file path=ppt/slides/slide11.xml><?xml version="1.0" encoding="utf-8"?>
-<p:sld xmlns:a="http://schemas.openxmlformats.org/drawingml/2006/main" xmlns:r="http://schemas.openxmlformats.org/officeDocument/2006/relationships" xmlns:mc="http://schemas.openxmlformats.org/markup-compatibility/2006" xmlns:mv="urn:schemas-microsoft-com:mac:vml" xmlns:p="http://schemas.openxmlformats.org/presentationml/2006/main" mc:Ignorable="mv" mc:PreserveAttributes="mv:*">
+<p:sld xmlns:a="http://schemas.openxmlformats.org/drawingml/2006/main" xmlns:r="http://schemas.openxmlformats.org/officeDocument/2006/relationships" xmlns:p="http://schemas.openxmlformats.org/presentationml/2006/main">
   <p:cSld>
     <p:spTree>
       <p:nvGrpSpPr>
@@ -6684,7 +6727,7 @@
           <a:p>
             <a:r>
               <a:rPr lang="en-US" sz="3200" dirty="0" smtClean="0"/>
-              <a:t>Revealed same number of PCs as full data set (515,345 songs) with 80% of variance explained.</a:t>
+              <a:t>Revealed same number of PCs as full data set (515,345 songs) </a:t>
             </a:r>
             <a:endParaRPr lang="en-US" sz="3200" dirty="0"/>
           </a:p>
@@ -6748,7 +6791,7 @@
     </p:spTree>
     <p:extLst>
       <p:ext uri="{BB962C8B-B14F-4D97-AF65-F5344CB8AC3E}">
-        <p14:creationId xmlns:p14="http://schemas.microsoft.com/office/powerpoint/2010/main" xmlns:p="http://schemas.openxmlformats.org/presentationml/2006/main" xmlns:r="http://schemas.openxmlformats.org/officeDocument/2006/relationships" xmlns:a="http://schemas.openxmlformats.org/drawingml/2006/main" xmlns="" val="655401942"/>
+        <p14:creationId xmlns:p14="http://schemas.microsoft.com/office/powerpoint/2010/main" val="655401942"/>
       </p:ext>
     </p:extLst>
   </p:cSld>
@@ -6762,7 +6805,7 @@
 </file>
 
 <file path=ppt/slides/slide12.xml><?xml version="1.0" encoding="utf-8"?>
-<p:sld xmlns:a="http://schemas.openxmlformats.org/drawingml/2006/main" xmlns:r="http://schemas.openxmlformats.org/officeDocument/2006/relationships" xmlns:mc="http://schemas.openxmlformats.org/markup-compatibility/2006" xmlns:mv="urn:schemas-microsoft-com:mac:vml" xmlns:p="http://schemas.openxmlformats.org/presentationml/2006/main" mc:Ignorable="mv" mc:PreserveAttributes="mv:*">
+<p:sld xmlns:a="http://schemas.openxmlformats.org/drawingml/2006/main" xmlns:r="http://schemas.openxmlformats.org/officeDocument/2006/relationships" xmlns:p="http://schemas.openxmlformats.org/presentationml/2006/main">
   <p:cSld>
     <p:spTree>
       <p:nvGrpSpPr>
@@ -6995,7 +7038,7 @@
     </p:spTree>
     <p:extLst>
       <p:ext uri="{BB962C8B-B14F-4D97-AF65-F5344CB8AC3E}">
-        <p14:creationId xmlns:p14="http://schemas.microsoft.com/office/powerpoint/2010/main" xmlns:p="http://schemas.openxmlformats.org/presentationml/2006/main" xmlns:r="http://schemas.openxmlformats.org/officeDocument/2006/relationships" xmlns:a="http://schemas.openxmlformats.org/drawingml/2006/main" xmlns="" val="704769989"/>
+        <p14:creationId xmlns:p14="http://schemas.microsoft.com/office/powerpoint/2010/main" val="704769989"/>
       </p:ext>
     </p:extLst>
   </p:cSld>
@@ -7016,7 +7059,7 @@
 </file>
 
 <file path=ppt/slides/slide2.xml><?xml version="1.0" encoding="utf-8"?>
-<p:sld xmlns:a="http://schemas.openxmlformats.org/drawingml/2006/main" xmlns:r="http://schemas.openxmlformats.org/officeDocument/2006/relationships" xmlns:mc="http://schemas.openxmlformats.org/markup-compatibility/2006" xmlns:mv="urn:schemas-microsoft-com:mac:vml" xmlns:p="http://schemas.openxmlformats.org/presentationml/2006/main" mc:Ignorable="mv" mc:PreserveAttributes="mv:*">
+<p:sld xmlns:a="http://schemas.openxmlformats.org/drawingml/2006/main" xmlns:r="http://schemas.openxmlformats.org/officeDocument/2006/relationships" xmlns:p="http://schemas.openxmlformats.org/presentationml/2006/main">
   <p:cSld>
     <p:spTree>
       <p:nvGrpSpPr>
@@ -7209,7 +7252,7 @@
     </p:spTree>
     <p:extLst>
       <p:ext uri="{BB962C8B-B14F-4D97-AF65-F5344CB8AC3E}">
-        <p14:creationId xmlns:p14="http://schemas.microsoft.com/office/powerpoint/2010/main" xmlns:p="http://schemas.openxmlformats.org/presentationml/2006/main" xmlns:r="http://schemas.openxmlformats.org/officeDocument/2006/relationships" xmlns:a="http://schemas.openxmlformats.org/drawingml/2006/main" xmlns="" val="468957901"/>
+        <p14:creationId xmlns:p14="http://schemas.microsoft.com/office/powerpoint/2010/main" val="468957901"/>
       </p:ext>
     </p:extLst>
   </p:cSld>
@@ -7230,7 +7273,7 @@
 </file>
 
 <file path=ppt/slides/slide3.xml><?xml version="1.0" encoding="utf-8"?>
-<p:sld xmlns:a="http://schemas.openxmlformats.org/drawingml/2006/main" xmlns:r="http://schemas.openxmlformats.org/officeDocument/2006/relationships" xmlns:mc="http://schemas.openxmlformats.org/markup-compatibility/2006" xmlns:mv="urn:schemas-microsoft-com:mac:vml" xmlns:p="http://schemas.openxmlformats.org/presentationml/2006/main" mc:Ignorable="mv" mc:PreserveAttributes="mv:*">
+<p:sld xmlns:a="http://schemas.openxmlformats.org/drawingml/2006/main" xmlns:r="http://schemas.openxmlformats.org/officeDocument/2006/relationships" xmlns:p="http://schemas.openxmlformats.org/presentationml/2006/main">
   <p:cSld>
     <p:spTree>
       <p:nvGrpSpPr>
@@ -7355,11 +7398,7 @@
             <a:pPr lvl="2"/>
             <a:r>
               <a:rPr lang="en-US" sz="2600" dirty="0" smtClean="0"/>
-              <a:t>91 attributes (year, 12 mean timbre </a:t>
-            </a:r>
-            <a:r>
-              <a:rPr lang="en-US" sz="2600" dirty="0" smtClean="0"/>
-              <a:t>feature</a:t>
+              <a:t>91 attributes (year, 12 mean timbre feature</a:t>
             </a:r>
             <a:r>
               <a:rPr sz="2600" dirty="0" smtClean="0"/>
@@ -7415,11 +7454,7 @@
             <a:pPr lvl="2"/>
             <a:r>
               <a:rPr lang="en-US" sz="2600" dirty="0" smtClean="0"/>
-              <a:t>Reduce</a:t>
-            </a:r>
-            <a:r>
-              <a:rPr lang="en-US" sz="2600" dirty="0" smtClean="0"/>
-              <a:t> </a:t>
+              <a:t>Reduce </a:t>
             </a:r>
             <a:r>
               <a:rPr sz="2600" dirty="0" smtClean="0"/>
@@ -7436,7 +7471,7 @@
     </p:spTree>
     <p:extLst>
       <p:ext uri="{BB962C8B-B14F-4D97-AF65-F5344CB8AC3E}">
-        <p14:creationId xmlns:p14="http://schemas.microsoft.com/office/powerpoint/2010/main" xmlns:p="http://schemas.openxmlformats.org/presentationml/2006/main" xmlns:r="http://schemas.openxmlformats.org/officeDocument/2006/relationships" xmlns:a="http://schemas.openxmlformats.org/drawingml/2006/main" xmlns="" val="315625226"/>
+        <p14:creationId xmlns:p14="http://schemas.microsoft.com/office/powerpoint/2010/main" val="315625226"/>
       </p:ext>
     </p:extLst>
   </p:cSld>
@@ -7457,7 +7492,7 @@
 </file>
 
 <file path=ppt/slides/slide4.xml><?xml version="1.0" encoding="utf-8"?>
-<p:sld xmlns:a="http://schemas.openxmlformats.org/drawingml/2006/main" xmlns:r="http://schemas.openxmlformats.org/officeDocument/2006/relationships" xmlns:mc="http://schemas.openxmlformats.org/markup-compatibility/2006" xmlns:mv="urn:schemas-microsoft-com:mac:vml" xmlns:p="http://schemas.openxmlformats.org/presentationml/2006/main" mc:Ignorable="mv" mc:PreserveAttributes="mv:*">
+<p:sld xmlns:a="http://schemas.openxmlformats.org/drawingml/2006/main" xmlns:r="http://schemas.openxmlformats.org/officeDocument/2006/relationships" xmlns:p="http://schemas.openxmlformats.org/presentationml/2006/main">
   <p:cSld>
     <p:spTree>
       <p:nvGrpSpPr>
@@ -7573,7 +7608,7 @@
     </p:spTree>
     <p:extLst>
       <p:ext uri="{BB962C8B-B14F-4D97-AF65-F5344CB8AC3E}">
-        <p14:creationId xmlns:p14="http://schemas.microsoft.com/office/powerpoint/2010/main" xmlns:p="http://schemas.openxmlformats.org/presentationml/2006/main" xmlns:r="http://schemas.openxmlformats.org/officeDocument/2006/relationships" xmlns:a="http://schemas.openxmlformats.org/drawingml/2006/main" xmlns="" val="355273917"/>
+        <p14:creationId xmlns:p14="http://schemas.microsoft.com/office/powerpoint/2010/main" val="355273917"/>
       </p:ext>
     </p:extLst>
   </p:cSld>
@@ -7587,7 +7622,7 @@
 </file>
 
 <file path=ppt/slides/slide5.xml><?xml version="1.0" encoding="utf-8"?>
-<p:sld xmlns:a="http://schemas.openxmlformats.org/drawingml/2006/main" xmlns:r="http://schemas.openxmlformats.org/officeDocument/2006/relationships" xmlns:mc="http://schemas.openxmlformats.org/markup-compatibility/2006" xmlns:mv="urn:schemas-microsoft-com:mac:vml" xmlns:p="http://schemas.openxmlformats.org/presentationml/2006/main" mc:Ignorable="mv" mc:PreserveAttributes="mv:*">
+<p:sld xmlns:a="http://schemas.openxmlformats.org/drawingml/2006/main" xmlns:r="http://schemas.openxmlformats.org/officeDocument/2006/relationships" xmlns:p="http://schemas.openxmlformats.org/presentationml/2006/main">
   <p:cSld>
     <p:spTree>
       <p:nvGrpSpPr>
@@ -7703,7 +7738,7 @@
     </p:spTree>
     <p:extLst>
       <p:ext uri="{BB962C8B-B14F-4D97-AF65-F5344CB8AC3E}">
-        <p14:creationId xmlns:p14="http://schemas.microsoft.com/office/powerpoint/2010/main" xmlns:p="http://schemas.openxmlformats.org/presentationml/2006/main" xmlns:r="http://schemas.openxmlformats.org/officeDocument/2006/relationships" xmlns:a="http://schemas.openxmlformats.org/drawingml/2006/main" xmlns="" val="2591775415"/>
+        <p14:creationId xmlns:p14="http://schemas.microsoft.com/office/powerpoint/2010/main" val="2591775415"/>
       </p:ext>
     </p:extLst>
   </p:cSld>
@@ -7717,7 +7752,7 @@
 </file>
 
 <file path=ppt/slides/slide6.xml><?xml version="1.0" encoding="utf-8"?>
-<p:sld xmlns:a="http://schemas.openxmlformats.org/drawingml/2006/main" xmlns:r="http://schemas.openxmlformats.org/officeDocument/2006/relationships" xmlns:mc="http://schemas.openxmlformats.org/markup-compatibility/2006" xmlns:mv="urn:schemas-microsoft-com:mac:vml" xmlns:p="http://schemas.openxmlformats.org/presentationml/2006/main" mc:Ignorable="mv" mc:PreserveAttributes="mv:*">
+<p:sld xmlns:a="http://schemas.openxmlformats.org/drawingml/2006/main" xmlns:r="http://schemas.openxmlformats.org/officeDocument/2006/relationships" xmlns:p="http://schemas.openxmlformats.org/presentationml/2006/main">
   <p:cSld>
     <p:spTree>
       <p:nvGrpSpPr>
@@ -7833,7 +7868,7 @@
     </p:spTree>
     <p:extLst>
       <p:ext uri="{BB962C8B-B14F-4D97-AF65-F5344CB8AC3E}">
-        <p14:creationId xmlns:p14="http://schemas.microsoft.com/office/powerpoint/2010/main" xmlns:p="http://schemas.openxmlformats.org/presentationml/2006/main" xmlns:r="http://schemas.openxmlformats.org/officeDocument/2006/relationships" xmlns:a="http://schemas.openxmlformats.org/drawingml/2006/main" xmlns="" val="206703692"/>
+        <p14:creationId xmlns:p14="http://schemas.microsoft.com/office/powerpoint/2010/main" val="206703692"/>
       </p:ext>
     </p:extLst>
   </p:cSld>
@@ -7847,7 +7882,7 @@
 </file>
 
 <file path=ppt/slides/slide7.xml><?xml version="1.0" encoding="utf-8"?>
-<p:sld xmlns:a="http://schemas.openxmlformats.org/drawingml/2006/main" xmlns:r="http://schemas.openxmlformats.org/officeDocument/2006/relationships" xmlns:mc="http://schemas.openxmlformats.org/markup-compatibility/2006" xmlns:mv="urn:schemas-microsoft-com:mac:vml" xmlns:p="http://schemas.openxmlformats.org/presentationml/2006/main" mc:Ignorable="mv" mc:PreserveAttributes="mv:*">
+<p:sld xmlns:a="http://schemas.openxmlformats.org/drawingml/2006/main" xmlns:r="http://schemas.openxmlformats.org/officeDocument/2006/relationships" xmlns:p="http://schemas.openxmlformats.org/presentationml/2006/main">
   <p:cSld>
     <p:spTree>
       <p:nvGrpSpPr>
@@ -7873,8 +7908,8 @@
             <p:ph idx="1"/>
           </p:nvPr>
         </p:nvPicPr>
-        <mc:AlternateContent>
-          <mc:Choice xmlns:ma="http://schemas.microsoft.com/office/mac/drawingml/2008/main" Requires="ma">
+        <mc:AlternateContent xmlns:mc="http://schemas.openxmlformats.org/markup-compatibility/2006">
+          <mc:Choice xmlns:ma="http://schemas.microsoft.com/office/mac/drawingml/2008/main" xmlns:mv="urn:schemas-microsoft-com:mac:vml" xmlns="" Requires="ma">
             <p:blipFill>
               <a:blip r:embed="rId3"/>
               <a:srcRect l="-2632" r="-2632"/>
@@ -7981,7 +8016,7 @@
     </p:spTree>
     <p:extLst>
       <p:ext uri="{BB962C8B-B14F-4D97-AF65-F5344CB8AC3E}">
-        <p14:creationId xmlns:p14="http://schemas.microsoft.com/office/powerpoint/2010/main" xmlns:p="http://schemas.openxmlformats.org/presentationml/2006/main" xmlns:r="http://schemas.openxmlformats.org/officeDocument/2006/relationships" xmlns:a="http://schemas.openxmlformats.org/drawingml/2006/main" xmlns="" val="3170237878"/>
+        <p14:creationId xmlns:p14="http://schemas.microsoft.com/office/powerpoint/2010/main" val="3170237878"/>
       </p:ext>
     </p:extLst>
   </p:cSld>
@@ -8002,7 +8037,7 @@
 </file>
 
 <file path=ppt/slides/slide8.xml><?xml version="1.0" encoding="utf-8"?>
-<p:sld xmlns:a="http://schemas.openxmlformats.org/drawingml/2006/main" xmlns:r="http://schemas.openxmlformats.org/officeDocument/2006/relationships" xmlns:mc="http://schemas.openxmlformats.org/markup-compatibility/2006" xmlns:mv="urn:schemas-microsoft-com:mac:vml" xmlns:p="http://schemas.openxmlformats.org/presentationml/2006/main" mc:Ignorable="mv" mc:PreserveAttributes="mv:*">
+<p:sld xmlns:a="http://schemas.openxmlformats.org/drawingml/2006/main" xmlns:r="http://schemas.openxmlformats.org/officeDocument/2006/relationships" xmlns:p="http://schemas.openxmlformats.org/presentationml/2006/main">
   <p:cSld>
     <p:spTree>
       <p:nvGrpSpPr>
@@ -8028,8 +8063,8 @@
             <p:ph idx="1"/>
           </p:nvPr>
         </p:nvPicPr>
-        <mc:AlternateContent>
-          <mc:Choice xmlns:ma="http://schemas.microsoft.com/office/mac/drawingml/2008/main" Requires="ma">
+        <mc:AlternateContent xmlns:mc="http://schemas.openxmlformats.org/markup-compatibility/2006">
+          <mc:Choice xmlns:ma="http://schemas.microsoft.com/office/mac/drawingml/2008/main" xmlns:mv="urn:schemas-microsoft-com:mac:vml" xmlns="" Requires="ma">
             <p:blipFill>
               <a:blip r:embed="rId3"/>
               <a:srcRect l="-2632" r="-2632"/>
@@ -8152,7 +8187,7 @@
 </file>
 
 <file path=ppt/slides/slide9.xml><?xml version="1.0" encoding="utf-8"?>
-<p:sld xmlns:a="http://schemas.openxmlformats.org/drawingml/2006/main" xmlns:r="http://schemas.openxmlformats.org/officeDocument/2006/relationships" xmlns:mc="http://schemas.openxmlformats.org/markup-compatibility/2006" xmlns:mv="urn:schemas-microsoft-com:mac:vml" xmlns:p="http://schemas.openxmlformats.org/presentationml/2006/main" mc:Ignorable="mv" mc:PreserveAttributes="mv:*">
+<p:sld xmlns:a="http://schemas.openxmlformats.org/drawingml/2006/main" xmlns:r="http://schemas.openxmlformats.org/officeDocument/2006/relationships" xmlns:p="http://schemas.openxmlformats.org/presentationml/2006/main">
   <p:cSld>
     <p:spTree>
       <p:nvGrpSpPr>
@@ -8178,8 +8213,8 @@
             <p:ph idx="1"/>
           </p:nvPr>
         </p:nvPicPr>
-        <mc:AlternateContent>
-          <mc:Choice xmlns:ma="http://schemas.microsoft.com/office/mac/drawingml/2008/main" Requires="ma">
+        <mc:AlternateContent xmlns:mc="http://schemas.openxmlformats.org/markup-compatibility/2006">
+          <mc:Choice xmlns:ma="http://schemas.microsoft.com/office/mac/drawingml/2008/main" xmlns:mv="urn:schemas-microsoft-com:mac:vml" xmlns="" Requires="ma">
             <p:blipFill>
               <a:blip r:embed="rId3"/>
               <a:srcRect l="-2632" r="-2632"/>

</xml_diff>